<commit_message>
menambahkan misa minggu biasa xxxi dan misa arwah orang beriman
</commit_message>
<xml_diff>
--- a/2020 10 tanggal 24 - 25/SLide Misa Bahasa Indonesia.pptx
+++ b/2020 10 tanggal 24 - 25/SLide Misa Bahasa Indonesia.pptx
@@ -28,28 +28,29 @@
     <p:sldId id="271" r:id="rId22"/>
     <p:sldId id="272" r:id="rId23"/>
     <p:sldId id="273" r:id="rId24"/>
-    <p:sldId id="274" r:id="rId25"/>
-    <p:sldId id="275" r:id="rId26"/>
-    <p:sldId id="276" r:id="rId27"/>
-    <p:sldId id="277" r:id="rId28"/>
-    <p:sldId id="278" r:id="rId29"/>
-    <p:sldId id="279" r:id="rId30"/>
-    <p:sldId id="280" r:id="rId31"/>
-    <p:sldId id="281" r:id="rId32"/>
-    <p:sldId id="282" r:id="rId33"/>
-    <p:sldId id="283" r:id="rId34"/>
-    <p:sldId id="284" r:id="rId35"/>
-    <p:sldId id="285" r:id="rId36"/>
-    <p:sldId id="286" r:id="rId37"/>
-    <p:sldId id="287" r:id="rId38"/>
-    <p:sldId id="291" r:id="rId39"/>
-    <p:sldId id="312" r:id="rId40"/>
-    <p:sldId id="313" r:id="rId41"/>
-    <p:sldId id="314" r:id="rId42"/>
-    <p:sldId id="315" r:id="rId43"/>
-    <p:sldId id="296" r:id="rId44"/>
-    <p:sldId id="316" r:id="rId45"/>
-    <p:sldId id="317" r:id="rId46"/>
+    <p:sldId id="318" r:id="rId25"/>
+    <p:sldId id="274" r:id="rId26"/>
+    <p:sldId id="275" r:id="rId27"/>
+    <p:sldId id="276" r:id="rId28"/>
+    <p:sldId id="277" r:id="rId29"/>
+    <p:sldId id="278" r:id="rId30"/>
+    <p:sldId id="279" r:id="rId31"/>
+    <p:sldId id="280" r:id="rId32"/>
+    <p:sldId id="281" r:id="rId33"/>
+    <p:sldId id="282" r:id="rId34"/>
+    <p:sldId id="283" r:id="rId35"/>
+    <p:sldId id="284" r:id="rId36"/>
+    <p:sldId id="285" r:id="rId37"/>
+    <p:sldId id="286" r:id="rId38"/>
+    <p:sldId id="287" r:id="rId39"/>
+    <p:sldId id="291" r:id="rId40"/>
+    <p:sldId id="312" r:id="rId41"/>
+    <p:sldId id="313" r:id="rId42"/>
+    <p:sldId id="314" r:id="rId43"/>
+    <p:sldId id="315" r:id="rId44"/>
+    <p:sldId id="296" r:id="rId45"/>
+    <p:sldId id="316" r:id="rId46"/>
+    <p:sldId id="317" r:id="rId47"/>
   </p:sldIdLst>
   <p:sldSz cx="12192000" cy="6858000"/>
   <p:notesSz cx="6858000" cy="9144000"/>
@@ -194,6 +195,11 @@
             <p14:sldId id="273"/>
           </p14:sldIdLst>
         </p14:section>
+        <p14:section name="Mazmur" id="{19E855C7-C993-4C36-B4CD-CA827321E006}">
+          <p14:sldIdLst>
+            <p14:sldId id="318"/>
+          </p14:sldIdLst>
+        </p14:section>
         <p14:section name="Syahadat" id="{B21124D5-F718-44DA-B208-D728792E0360}">
           <p14:sldIdLst>
             <p14:sldId id="274"/>
@@ -448,7 +454,7 @@
             <a:fld id="{B61BEF0D-F0BB-DE4B-95CE-6DB70DBA9567}" type="datetimeFigureOut">
               <a:rPr lang="en-US" smtClean="0"/>
               <a:pPr/>
-              <a:t>10/23/2020</a:t>
+              <a:t>10/25/2020</a:t>
             </a:fld>
             <a:endParaRPr lang="en-US" dirty="0"/>
           </a:p>
@@ -741,7 +747,7 @@
             <a:fld id="{B61BEF0D-F0BB-DE4B-95CE-6DB70DBA9567}" type="datetimeFigureOut">
               <a:rPr lang="en-US" smtClean="0"/>
               <a:pPr/>
-              <a:t>10/23/2020</a:t>
+              <a:t>10/25/2020</a:t>
             </a:fld>
             <a:endParaRPr lang="en-US" dirty="0"/>
           </a:p>
@@ -991,7 +997,7 @@
             <a:fld id="{B61BEF0D-F0BB-DE4B-95CE-6DB70DBA9567}" type="datetimeFigureOut">
               <a:rPr lang="en-US" smtClean="0"/>
               <a:pPr/>
-              <a:t>10/23/2020</a:t>
+              <a:t>10/25/2020</a:t>
             </a:fld>
             <a:endParaRPr lang="en-US" dirty="0"/>
           </a:p>
@@ -1529,7 +1535,7 @@
             <a:fld id="{B61BEF0D-F0BB-DE4B-95CE-6DB70DBA9567}" type="datetimeFigureOut">
               <a:rPr lang="en-US" smtClean="0"/>
               <a:pPr/>
-              <a:t>10/23/2020</a:t>
+              <a:t>10/25/2020</a:t>
             </a:fld>
             <a:endParaRPr lang="en-US" dirty="0"/>
           </a:p>
@@ -1779,7 +1785,7 @@
             <a:fld id="{B61BEF0D-F0BB-DE4B-95CE-6DB70DBA9567}" type="datetimeFigureOut">
               <a:rPr lang="en-US" smtClean="0"/>
               <a:pPr/>
-              <a:t>10/23/2020</a:t>
+              <a:t>10/25/2020</a:t>
             </a:fld>
             <a:endParaRPr lang="en-US" dirty="0"/>
           </a:p>
@@ -2324,7 +2330,7 @@
             <a:fld id="{B61BEF0D-F0BB-DE4B-95CE-6DB70DBA9567}" type="datetimeFigureOut">
               <a:rPr lang="en-US" smtClean="0"/>
               <a:pPr/>
-              <a:t>10/23/2020</a:t>
+              <a:t>10/25/2020</a:t>
             </a:fld>
             <a:endParaRPr lang="en-US" dirty="0"/>
           </a:p>
@@ -2636,7 +2642,7 @@
             <a:fld id="{B61BEF0D-F0BB-DE4B-95CE-6DB70DBA9567}" type="datetimeFigureOut">
               <a:rPr lang="en-US" smtClean="0"/>
               <a:pPr/>
-              <a:t>10/23/2020</a:t>
+              <a:t>10/25/2020</a:t>
             </a:fld>
             <a:endParaRPr lang="en-US" dirty="0"/>
           </a:p>
@@ -2813,7 +2819,7 @@
             <a:fld id="{B61BEF0D-F0BB-DE4B-95CE-6DB70DBA9567}" type="datetimeFigureOut">
               <a:rPr lang="en-US" smtClean="0"/>
               <a:pPr/>
-              <a:t>10/23/2020</a:t>
+              <a:t>10/25/2020</a:t>
             </a:fld>
             <a:endParaRPr lang="en-US" dirty="0"/>
           </a:p>
@@ -2995,7 +3001,7 @@
             <a:fld id="{B61BEF0D-F0BB-DE4B-95CE-6DB70DBA9567}" type="datetimeFigureOut">
               <a:rPr lang="en-US" smtClean="0"/>
               <a:pPr/>
-              <a:t>10/23/2020</a:t>
+              <a:t>10/25/2020</a:t>
             </a:fld>
             <a:endParaRPr lang="en-US" dirty="0"/>
           </a:p>
@@ -3167,7 +3173,7 @@
             <a:fld id="{B61BEF0D-F0BB-DE4B-95CE-6DB70DBA9567}" type="datetimeFigureOut">
               <a:rPr lang="en-US" smtClean="0"/>
               <a:pPr/>
-              <a:t>10/23/2020</a:t>
+              <a:t>10/25/2020</a:t>
             </a:fld>
             <a:endParaRPr lang="en-US" dirty="0"/>
           </a:p>
@@ -3415,7 +3421,7 @@
             <a:fld id="{B61BEF0D-F0BB-DE4B-95CE-6DB70DBA9567}" type="datetimeFigureOut">
               <a:rPr lang="en-US" smtClean="0"/>
               <a:pPr/>
-              <a:t>10/23/2020</a:t>
+              <a:t>10/25/2020</a:t>
             </a:fld>
             <a:endParaRPr lang="en-US" dirty="0"/>
           </a:p>
@@ -3709,7 +3715,7 @@
             <a:fld id="{B61BEF0D-F0BB-DE4B-95CE-6DB70DBA9567}" type="datetimeFigureOut">
               <a:rPr lang="en-US" smtClean="0"/>
               <a:pPr/>
-              <a:t>10/23/2020</a:t>
+              <a:t>10/25/2020</a:t>
             </a:fld>
             <a:endParaRPr lang="en-US" dirty="0"/>
           </a:p>
@@ -4141,7 +4147,7 @@
             <a:fld id="{B61BEF0D-F0BB-DE4B-95CE-6DB70DBA9567}" type="datetimeFigureOut">
               <a:rPr lang="en-US" smtClean="0"/>
               <a:pPr/>
-              <a:t>10/23/2020</a:t>
+              <a:t>10/25/2020</a:t>
             </a:fld>
             <a:endParaRPr lang="en-US" dirty="0"/>
           </a:p>
@@ -4266,7 +4272,7 @@
             <a:fld id="{B61BEF0D-F0BB-DE4B-95CE-6DB70DBA9567}" type="datetimeFigureOut">
               <a:rPr lang="en-US" smtClean="0"/>
               <a:pPr/>
-              <a:t>10/23/2020</a:t>
+              <a:t>10/25/2020</a:t>
             </a:fld>
             <a:endParaRPr lang="en-US" dirty="0"/>
           </a:p>
@@ -4363,7 +4369,7 @@
             <a:fld id="{B61BEF0D-F0BB-DE4B-95CE-6DB70DBA9567}" type="datetimeFigureOut">
               <a:rPr lang="en-US" smtClean="0"/>
               <a:pPr/>
-              <a:t>10/23/2020</a:t>
+              <a:t>10/25/2020</a:t>
             </a:fld>
             <a:endParaRPr lang="en-US" dirty="0"/>
           </a:p>
@@ -4648,7 +4654,7 @@
             <a:fld id="{B61BEF0D-F0BB-DE4B-95CE-6DB70DBA9567}" type="datetimeFigureOut">
               <a:rPr lang="en-US" smtClean="0"/>
               <a:pPr/>
-              <a:t>10/23/2020</a:t>
+              <a:t>10/25/2020</a:t>
             </a:fld>
             <a:endParaRPr lang="en-US" dirty="0"/>
           </a:p>
@@ -4941,7 +4947,7 @@
             <a:fld id="{B61BEF0D-F0BB-DE4B-95CE-6DB70DBA9567}" type="datetimeFigureOut">
               <a:rPr lang="en-US" smtClean="0"/>
               <a:pPr/>
-              <a:t>10/23/2020</a:t>
+              <a:t>10/25/2020</a:t>
             </a:fld>
             <a:endParaRPr lang="en-US" dirty="0"/>
           </a:p>
@@ -5174,7 +5180,7 @@
             <a:fld id="{B61BEF0D-F0BB-DE4B-95CE-6DB70DBA9567}" type="datetimeFigureOut">
               <a:rPr lang="en-US" smtClean="0"/>
               <a:pPr/>
-              <a:t>10/23/2020</a:t>
+              <a:t>10/25/2020</a:t>
             </a:fld>
             <a:endParaRPr lang="en-US" dirty="0"/>
           </a:p>
@@ -5951,7 +5957,7 @@
           <p:cNvPr id="4" name="Picture 3">
             <a:extLst>
               <a:ext uri="{FF2B5EF4-FFF2-40B4-BE49-F238E27FC236}">
-                <a16:creationId xmlns:a16="http://schemas.microsoft.com/office/drawing/2014/main" xmlns="" id="{088FFC9D-E551-4D55-B47D-46D1847914DB}"/>
+                <a16:creationId xmlns="" xmlns:a16="http://schemas.microsoft.com/office/drawing/2014/main" id="{088FFC9D-E551-4D55-B47D-46D1847914DB}"/>
               </a:ext>
             </a:extLst>
           </p:cNvPr>
@@ -5985,6 +5991,13 @@
   <p:clrMapOvr>
     <a:masterClrMapping/>
   </p:clrMapOvr>
+  <p:timing>
+    <p:tnLst>
+      <p:par>
+        <p:cTn id="1" dur="indefinite" restart="never" nodeType="tmRoot"/>
+      </p:par>
+    </p:tnLst>
+  </p:timing>
 </p:sld>
 </file>
 
@@ -6413,6 +6426,13 @@
   <p:clrMapOvr>
     <a:masterClrMapping/>
   </p:clrMapOvr>
+  <p:timing>
+    <p:tnLst>
+      <p:par>
+        <p:cTn id="1" dur="indefinite" restart="never" nodeType="tmRoot"/>
+      </p:par>
+    </p:tnLst>
+  </p:timing>
 </p:sld>
 </file>
 
@@ -6500,6 +6520,13 @@
   <p:clrMapOvr>
     <a:masterClrMapping/>
   </p:clrMapOvr>
+  <p:timing>
+    <p:tnLst>
+      <p:par>
+        <p:cTn id="1" dur="indefinite" restart="never" nodeType="tmRoot"/>
+      </p:par>
+    </p:tnLst>
+  </p:timing>
 </p:sld>
 </file>
 
@@ -6581,6 +6608,13 @@
   <p:clrMapOvr>
     <a:masterClrMapping/>
   </p:clrMapOvr>
+  <p:timing>
+    <p:tnLst>
+      <p:par>
+        <p:cTn id="1" dur="indefinite" restart="never" nodeType="tmRoot"/>
+      </p:par>
+    </p:tnLst>
+  </p:timing>
 </p:sld>
 </file>
 
@@ -6828,6 +6862,13 @@
   <p:clrMapOvr>
     <a:masterClrMapping/>
   </p:clrMapOvr>
+  <p:timing>
+    <p:tnLst>
+      <p:par>
+        <p:cTn id="1" dur="indefinite" restart="never" nodeType="tmRoot"/>
+      </p:par>
+    </p:tnLst>
+  </p:timing>
 </p:sld>
 </file>
 
@@ -7113,6 +7154,13 @@
   <p:clrMapOvr>
     <a:masterClrMapping/>
   </p:clrMapOvr>
+  <p:timing>
+    <p:tnLst>
+      <p:par>
+        <p:cTn id="1" dur="indefinite" restart="never" nodeType="tmRoot"/>
+      </p:par>
+    </p:tnLst>
+  </p:timing>
 </p:sld>
 </file>
 
@@ -7407,6 +7455,13 @@
   <p:clrMapOvr>
     <a:masterClrMapping/>
   </p:clrMapOvr>
+  <p:timing>
+    <p:tnLst>
+      <p:par>
+        <p:cTn id="1" dur="indefinite" restart="never" nodeType="tmRoot"/>
+      </p:par>
+    </p:tnLst>
+  </p:timing>
 </p:sld>
 </file>
 
@@ -7536,6 +7591,13 @@
   <p:clrMapOvr>
     <a:masterClrMapping/>
   </p:clrMapOvr>
+  <p:timing>
+    <p:tnLst>
+      <p:par>
+        <p:cTn id="1" dur="indefinite" restart="never" nodeType="tmRoot"/>
+      </p:par>
+    </p:tnLst>
+  </p:timing>
 </p:sld>
 </file>
 
@@ -7623,6 +7685,13 @@
   <p:clrMapOvr>
     <a:masterClrMapping/>
   </p:clrMapOvr>
+  <p:timing>
+    <p:tnLst>
+      <p:par>
+        <p:cTn id="1" dur="indefinite" restart="never" nodeType="tmRoot"/>
+      </p:par>
+    </p:tnLst>
+  </p:timing>
 </p:sld>
 </file>
 
@@ -8373,6 +8442,13 @@
   <p:clrMapOvr>
     <a:masterClrMapping/>
   </p:clrMapOvr>
+  <p:timing>
+    <p:tnLst>
+      <p:par>
+        <p:cTn id="1" dur="indefinite" restart="never" nodeType="tmRoot"/>
+      </p:par>
+    </p:tnLst>
+  </p:timing>
 </p:sld>
 </file>
 
@@ -8474,6 +8550,13 @@
   <p:clrMapOvr>
     <a:masterClrMapping/>
   </p:clrMapOvr>
+  <p:timing>
+    <p:tnLst>
+      <p:par>
+        <p:cTn id="1" dur="indefinite" restart="never" nodeType="tmRoot"/>
+      </p:par>
+    </p:tnLst>
+  </p:timing>
 </p:sld>
 </file>
 
@@ -8621,6 +8704,13 @@
   <p:clrMapOvr>
     <a:masterClrMapping/>
   </p:clrMapOvr>
+  <p:timing>
+    <p:tnLst>
+      <p:par>
+        <p:cTn id="1" dur="indefinite" restart="never" nodeType="tmRoot"/>
+      </p:par>
+    </p:tnLst>
+  </p:timing>
 </p:sld>
 </file>
 
@@ -8787,6 +8877,13 @@
   <p:clrMapOvr>
     <a:masterClrMapping/>
   </p:clrMapOvr>
+  <p:timing>
+    <p:tnLst>
+      <p:par>
+        <p:cTn id="1" dur="indefinite" restart="never" nodeType="tmRoot"/>
+      </p:par>
+    </p:tnLst>
+  </p:timing>
 </p:sld>
 </file>
 
@@ -8916,10 +9013,338 @@
   <p:clrMapOvr>
     <a:masterClrMapping/>
   </p:clrMapOvr>
+  <p:timing>
+    <p:tnLst>
+      <p:par>
+        <p:cTn id="1" dur="indefinite" restart="never" nodeType="tmRoot"/>
+      </p:par>
+    </p:tnLst>
+  </p:timing>
 </p:sld>
 </file>
 
 <file path=ppt/slides/slide24.xml><?xml version="1.0" encoding="utf-8"?>
+<p:sld xmlns:a="http://schemas.openxmlformats.org/drawingml/2006/main" xmlns:r="http://schemas.openxmlformats.org/officeDocument/2006/relationships" xmlns:p="http://schemas.openxmlformats.org/presentationml/2006/main">
+  <p:cSld>
+    <p:spTree>
+      <p:nvGrpSpPr>
+        <p:cNvPr id="1" name=""/>
+        <p:cNvGrpSpPr/>
+        <p:nvPr/>
+      </p:nvGrpSpPr>
+      <p:grpSpPr>
+        <a:xfrm>
+          <a:off x="0" y="0"/>
+          <a:ext cx="0" cy="0"/>
+          <a:chOff x="0" y="0"/>
+          <a:chExt cx="0" cy="0"/>
+        </a:xfrm>
+      </p:grpSpPr>
+      <p:sp>
+        <p:nvSpPr>
+          <p:cNvPr id="2" name="Title 1"/>
+          <p:cNvSpPr>
+            <a:spLocks noGrp="1"/>
+          </p:cNvSpPr>
+          <p:nvPr>
+            <p:ph type="title"/>
+          </p:nvPr>
+        </p:nvSpPr>
+        <p:spPr/>
+        <p:txBody>
+          <a:bodyPr>
+            <a:normAutofit/>
+          </a:bodyPr>
+          <a:lstStyle/>
+          <a:p>
+            <a:pPr algn="ctr"/>
+            <a:r>
+              <a:rPr lang="en-ID" sz="6000" cap="none" dirty="0" err="1">
+                <a:solidFill>
+                  <a:srgbClr val="FFFF00"/>
+                </a:solidFill>
+                <a:effectLst>
+                  <a:glow rad="38100">
+                    <a:schemeClr val="bg1">
+                      <a:lumMod val="50000"/>
+                      <a:lumOff val="50000"/>
+                      <a:alpha val="20000"/>
+                    </a:schemeClr>
+                  </a:glow>
+                  <a:outerShdw blurRad="44450" dist="12700" dir="13860000" algn="tl" rotWithShape="0">
+                    <a:srgbClr val="000000">
+                      <a:alpha val="20000"/>
+                    </a:srgbClr>
+                  </a:outerShdw>
+                </a:effectLst>
+                <a:latin typeface="Arial Black" panose="020B0A04020102020204" pitchFamily="34" charset="0"/>
+                <a:ea typeface="+mn-ea"/>
+                <a:cs typeface="+mn-cs"/>
+              </a:rPr>
+              <a:t>Mazmur</a:t>
+            </a:r>
+            <a:r>
+              <a:rPr lang="en-ID" sz="6000" cap="none" dirty="0">
+                <a:solidFill>
+                  <a:srgbClr val="FFFF00"/>
+                </a:solidFill>
+                <a:effectLst>
+                  <a:glow rad="38100">
+                    <a:schemeClr val="bg1">
+                      <a:lumMod val="50000"/>
+                      <a:lumOff val="50000"/>
+                      <a:alpha val="20000"/>
+                    </a:schemeClr>
+                  </a:glow>
+                  <a:outerShdw blurRad="44450" dist="12700" dir="13860000" algn="tl" rotWithShape="0">
+                    <a:srgbClr val="000000">
+                      <a:alpha val="20000"/>
+                    </a:srgbClr>
+                  </a:outerShdw>
+                </a:effectLst>
+                <a:latin typeface="Arial Black" panose="020B0A04020102020204" pitchFamily="34" charset="0"/>
+                <a:ea typeface="+mn-ea"/>
+                <a:cs typeface="+mn-cs"/>
+              </a:rPr>
+              <a:t> </a:t>
+            </a:r>
+            <a:r>
+              <a:rPr lang="en-ID" sz="6000" cap="none" dirty="0" err="1">
+                <a:solidFill>
+                  <a:srgbClr val="FFFF00"/>
+                </a:solidFill>
+                <a:effectLst>
+                  <a:glow rad="38100">
+                    <a:schemeClr val="bg1">
+                      <a:lumMod val="50000"/>
+                      <a:lumOff val="50000"/>
+                      <a:alpha val="20000"/>
+                    </a:schemeClr>
+                  </a:glow>
+                  <a:outerShdw blurRad="44450" dist="12700" dir="13860000" algn="tl" rotWithShape="0">
+                    <a:srgbClr val="000000">
+                      <a:alpha val="20000"/>
+                    </a:srgbClr>
+                  </a:outerShdw>
+                </a:effectLst>
+                <a:latin typeface="Arial Black" panose="020B0A04020102020204" pitchFamily="34" charset="0"/>
+                <a:ea typeface="+mn-ea"/>
+                <a:cs typeface="+mn-cs"/>
+              </a:rPr>
+              <a:t>tanggapan</a:t>
+            </a:r>
+            <a:endParaRPr lang="en-US" sz="6000" cap="none" dirty="0">
+              <a:solidFill>
+                <a:srgbClr val="FFFF00"/>
+              </a:solidFill>
+              <a:effectLst>
+                <a:glow rad="38100">
+                  <a:schemeClr val="bg1">
+                    <a:lumMod val="50000"/>
+                    <a:lumOff val="50000"/>
+                    <a:alpha val="20000"/>
+                  </a:schemeClr>
+                </a:glow>
+                <a:outerShdw blurRad="44450" dist="12700" dir="13860000" algn="tl" rotWithShape="0">
+                  <a:srgbClr val="000000">
+                    <a:alpha val="20000"/>
+                  </a:srgbClr>
+                </a:outerShdw>
+              </a:effectLst>
+              <a:latin typeface="Arial Black" panose="020B0A04020102020204" pitchFamily="34" charset="0"/>
+              <a:ea typeface="+mn-ea"/>
+              <a:cs typeface="+mn-cs"/>
+            </a:endParaRPr>
+          </a:p>
+        </p:txBody>
+      </p:sp>
+      <p:sp>
+        <p:nvSpPr>
+          <p:cNvPr id="3" name="Content Placeholder 2"/>
+          <p:cNvSpPr>
+            <a:spLocks noGrp="1"/>
+          </p:cNvSpPr>
+          <p:nvPr>
+            <p:ph idx="1"/>
+          </p:nvPr>
+        </p:nvSpPr>
+        <p:spPr/>
+        <p:txBody>
+          <a:bodyPr>
+            <a:normAutofit/>
+          </a:bodyPr>
+          <a:lstStyle/>
+          <a:p>
+            <a:pPr marL="0" indent="0" algn="ctr">
+              <a:buNone/>
+            </a:pPr>
+            <a:r>
+              <a:rPr lang="en-ID" sz="6000" cap="none" dirty="0" err="1" smtClean="0">
+                <a:solidFill>
+                  <a:srgbClr val="FFFF00"/>
+                </a:solidFill>
+                <a:latin typeface="Arial Black" panose="020B0A04020102020204" pitchFamily="34" charset="0"/>
+              </a:rPr>
+              <a:t>Aku</a:t>
+            </a:r>
+            <a:r>
+              <a:rPr lang="en-ID" sz="6000" cap="none" dirty="0" smtClean="0">
+                <a:solidFill>
+                  <a:srgbClr val="FFFF00"/>
+                </a:solidFill>
+                <a:latin typeface="Arial Black" panose="020B0A04020102020204" pitchFamily="34" charset="0"/>
+              </a:rPr>
+              <a:t> </a:t>
+            </a:r>
+            <a:r>
+              <a:rPr lang="en-ID" sz="6000" cap="none" dirty="0" err="1">
+                <a:solidFill>
+                  <a:srgbClr val="FFFF00"/>
+                </a:solidFill>
+                <a:latin typeface="Arial Black" panose="020B0A04020102020204" pitchFamily="34" charset="0"/>
+              </a:rPr>
+              <a:t>cinta</a:t>
+            </a:r>
+            <a:r>
+              <a:rPr lang="en-ID" sz="6000" cap="none" dirty="0">
+                <a:solidFill>
+                  <a:srgbClr val="FFFF00"/>
+                </a:solidFill>
+                <a:latin typeface="Arial Black" panose="020B0A04020102020204" pitchFamily="34" charset="0"/>
+              </a:rPr>
+              <a:t> </a:t>
+            </a:r>
+            <a:r>
+              <a:rPr lang="en-ID" sz="6000" cap="none" dirty="0" err="1" smtClean="0">
+                <a:solidFill>
+                  <a:srgbClr val="FFFF00"/>
+                </a:solidFill>
+                <a:latin typeface="Arial Black" panose="020B0A04020102020204" pitchFamily="34" charset="0"/>
+              </a:rPr>
+              <a:t>pada</a:t>
+            </a:r>
+            <a:r>
+              <a:rPr lang="en-ID" sz="6000" cap="none" dirty="0" smtClean="0">
+                <a:solidFill>
+                  <a:srgbClr val="FFFF00"/>
+                </a:solidFill>
+                <a:latin typeface="Arial Black" panose="020B0A04020102020204" pitchFamily="34" charset="0"/>
+              </a:rPr>
+              <a:t>-Mu</a:t>
+            </a:r>
+            <a:r>
+              <a:rPr lang="en-ID" sz="6000" cap="none" dirty="0">
+                <a:solidFill>
+                  <a:srgbClr val="FFFF00"/>
+                </a:solidFill>
+                <a:latin typeface="Arial Black" panose="020B0A04020102020204" pitchFamily="34" charset="0"/>
+              </a:rPr>
+              <a:t>, </a:t>
+            </a:r>
+            <a:endParaRPr lang="en-ID" sz="6000" cap="none" dirty="0" smtClean="0">
+              <a:solidFill>
+                <a:srgbClr val="FFFF00"/>
+              </a:solidFill>
+              <a:latin typeface="Arial Black" panose="020B0A04020102020204" pitchFamily="34" charset="0"/>
+            </a:endParaRPr>
+          </a:p>
+          <a:p>
+            <a:pPr marL="0" indent="0" algn="ctr">
+              <a:buNone/>
+            </a:pPr>
+            <a:r>
+              <a:rPr lang="en-ID" sz="6000" cap="none" dirty="0" err="1">
+                <a:solidFill>
+                  <a:srgbClr val="FFFF00"/>
+                </a:solidFill>
+                <a:latin typeface="Arial Black" panose="020B0A04020102020204" pitchFamily="34" charset="0"/>
+              </a:rPr>
+              <a:t>Y</a:t>
+            </a:r>
+            <a:r>
+              <a:rPr lang="en-ID" sz="6000" cap="none" dirty="0" err="1" smtClean="0">
+                <a:solidFill>
+                  <a:srgbClr val="FFFF00"/>
+                </a:solidFill>
+                <a:latin typeface="Arial Black" panose="020B0A04020102020204" pitchFamily="34" charset="0"/>
+              </a:rPr>
+              <a:t>a</a:t>
+            </a:r>
+            <a:r>
+              <a:rPr lang="en-ID" sz="6000" cap="none" dirty="0" smtClean="0">
+                <a:solidFill>
+                  <a:srgbClr val="FFFF00"/>
+                </a:solidFill>
+                <a:latin typeface="Arial Black" panose="020B0A04020102020204" pitchFamily="34" charset="0"/>
+              </a:rPr>
+              <a:t> </a:t>
+            </a:r>
+            <a:r>
+              <a:rPr lang="en-ID" sz="6000" cap="none" dirty="0" err="1" smtClean="0">
+                <a:solidFill>
+                  <a:srgbClr val="FFFF00"/>
+                </a:solidFill>
+                <a:latin typeface="Arial Black" panose="020B0A04020102020204" pitchFamily="34" charset="0"/>
+              </a:rPr>
+              <a:t>Tuhan</a:t>
+            </a:r>
+            <a:r>
+              <a:rPr lang="en-ID" sz="6000" cap="none" dirty="0">
+                <a:solidFill>
+                  <a:srgbClr val="FFFF00"/>
+                </a:solidFill>
+                <a:latin typeface="Arial Black" panose="020B0A04020102020204" pitchFamily="34" charset="0"/>
+              </a:rPr>
+              <a:t>, </a:t>
+            </a:r>
+            <a:r>
+              <a:rPr lang="en-ID" sz="6000" cap="none" dirty="0" err="1">
+                <a:solidFill>
+                  <a:srgbClr val="FFFF00"/>
+                </a:solidFill>
+                <a:latin typeface="Arial Black" panose="020B0A04020102020204" pitchFamily="34" charset="0"/>
+              </a:rPr>
+              <a:t>kekuatanku</a:t>
+            </a:r>
+            <a:r>
+              <a:rPr lang="en-ID" sz="6000" cap="none" dirty="0">
+                <a:solidFill>
+                  <a:srgbClr val="FFFF00"/>
+                </a:solidFill>
+                <a:latin typeface="Arial Black" panose="020B0A04020102020204" pitchFamily="34" charset="0"/>
+              </a:rPr>
+              <a:t> </a:t>
+            </a:r>
+            <a:endParaRPr lang="en-US" sz="6000" cap="none" dirty="0">
+              <a:solidFill>
+                <a:srgbClr val="FFFF00"/>
+              </a:solidFill>
+              <a:latin typeface="Arial Black" panose="020B0A04020102020204" pitchFamily="34" charset="0"/>
+            </a:endParaRPr>
+          </a:p>
+        </p:txBody>
+      </p:sp>
+    </p:spTree>
+    <p:extLst>
+      <p:ext uri="{BB962C8B-B14F-4D97-AF65-F5344CB8AC3E}">
+        <p14:creationId xmlns:p14="http://schemas.microsoft.com/office/powerpoint/2010/main" val="736778372"/>
+      </p:ext>
+    </p:extLst>
+  </p:cSld>
+  <p:clrMapOvr>
+    <a:masterClrMapping/>
+  </p:clrMapOvr>
+  <p:timing>
+    <p:tnLst>
+      <p:par>
+        <p:cTn id="1" dur="indefinite" restart="never" nodeType="tmRoot"/>
+      </p:par>
+    </p:tnLst>
+  </p:timing>
+</p:sld>
+</file>
+
+<file path=ppt/slides/slide25.xml><?xml version="1.0" encoding="utf-8"?>
 <p:sld xmlns:a="http://schemas.openxmlformats.org/drawingml/2006/main" xmlns:r="http://schemas.openxmlformats.org/officeDocument/2006/relationships" xmlns:p="http://schemas.openxmlformats.org/presentationml/2006/main">
   <p:cSld>
     <p:spTree>
@@ -9184,121 +9609,13 @@
   <p:clrMapOvr>
     <a:masterClrMapping/>
   </p:clrMapOvr>
-</p:sld>
-</file>
-
-<file path=ppt/slides/slide25.xml><?xml version="1.0" encoding="utf-8"?>
-<p:sld xmlns:a="http://schemas.openxmlformats.org/drawingml/2006/main" xmlns:r="http://schemas.openxmlformats.org/officeDocument/2006/relationships" xmlns:p="http://schemas.openxmlformats.org/presentationml/2006/main">
-  <p:cSld>
-    <p:spTree>
-      <p:nvGrpSpPr>
-        <p:cNvPr id="1" name=""/>
-        <p:cNvGrpSpPr/>
-        <p:nvPr/>
-      </p:nvGrpSpPr>
-      <p:grpSpPr>
-        <a:xfrm>
-          <a:off x="0" y="0"/>
-          <a:ext cx="0" cy="0"/>
-          <a:chOff x="0" y="0"/>
-          <a:chExt cx="0" cy="0"/>
-        </a:xfrm>
-      </p:grpSpPr>
-      <p:sp>
-        <p:nvSpPr>
-          <p:cNvPr id="3" name="Content Placeholder 2"/>
-          <p:cNvSpPr>
-            <a:spLocks noGrp="1"/>
-          </p:cNvSpPr>
-          <p:nvPr>
-            <p:ph idx="1"/>
-          </p:nvPr>
-        </p:nvSpPr>
-        <p:spPr>
-          <a:xfrm>
-            <a:off x="1088369" y="1331259"/>
-            <a:ext cx="10015262" cy="4195481"/>
-          </a:xfrm>
-        </p:spPr>
-        <p:txBody>
-          <a:bodyPr>
-            <a:normAutofit fontScale="92500" lnSpcReduction="10000"/>
-          </a:bodyPr>
-          <a:lstStyle/>
-          <a:p>
-            <a:pPr marL="0" indent="0" algn="ctr">
-              <a:buNone/>
-            </a:pPr>
-            <a:r>
-              <a:rPr lang="fi-FI" sz="6000" cap="none" dirty="0">
-                <a:solidFill>
-                  <a:srgbClr val="FFFF00"/>
-                </a:solidFill>
-                <a:latin typeface="Arial Black" panose="020B0A04020102020204" pitchFamily="34" charset="0"/>
-              </a:rPr>
-              <a:t>dan akan</a:t>
-            </a:r>
-          </a:p>
-          <a:p>
-            <a:pPr marL="0" indent="0" algn="ctr">
-              <a:buNone/>
-            </a:pPr>
-            <a:r>
-              <a:rPr lang="fi-FI" sz="6000" cap="none" dirty="0">
-                <a:solidFill>
-                  <a:srgbClr val="FFFF00"/>
-                </a:solidFill>
-                <a:latin typeface="Arial Black" panose="020B0A04020102020204" pitchFamily="34" charset="0"/>
-              </a:rPr>
-              <a:t>Yesus Kristus, </a:t>
-            </a:r>
-          </a:p>
-          <a:p>
-            <a:pPr marL="0" indent="0" algn="ctr">
-              <a:buNone/>
-            </a:pPr>
-            <a:r>
-              <a:rPr lang="fi-FI" sz="6000" cap="none" dirty="0">
-                <a:solidFill>
-                  <a:srgbClr val="FFFF00"/>
-                </a:solidFill>
-                <a:latin typeface="Arial Black" panose="020B0A04020102020204" pitchFamily="34" charset="0"/>
-              </a:rPr>
-              <a:t>Putra-Nya yang tunggal,</a:t>
-            </a:r>
-          </a:p>
-          <a:p>
-            <a:pPr marL="0" indent="0" algn="ctr">
-              <a:buNone/>
-            </a:pPr>
-            <a:r>
-              <a:rPr lang="fi-FI" sz="6000" cap="none" dirty="0">
-                <a:solidFill>
-                  <a:srgbClr val="FFFF00"/>
-                </a:solidFill>
-                <a:latin typeface="Arial Black" panose="020B0A04020102020204" pitchFamily="34" charset="0"/>
-              </a:rPr>
-              <a:t>Tuhan kita</a:t>
-            </a:r>
-            <a:endParaRPr lang="en-US" sz="6000" cap="none" dirty="0">
-              <a:solidFill>
-                <a:srgbClr val="FFFF00"/>
-              </a:solidFill>
-              <a:latin typeface="Arial Black" panose="020B0A04020102020204" pitchFamily="34" charset="0"/>
-            </a:endParaRPr>
-          </a:p>
-        </p:txBody>
-      </p:sp>
-    </p:spTree>
-    <p:extLst>
-      <p:ext uri="{BB962C8B-B14F-4D97-AF65-F5344CB8AC3E}">
-        <p14:creationId xmlns:p14="http://schemas.microsoft.com/office/powerpoint/2010/main" val="2853845156"/>
-      </p:ext>
-    </p:extLst>
-  </p:cSld>
-  <p:clrMapOvr>
-    <a:masterClrMapping/>
-  </p:clrMapOvr>
+  <p:timing>
+    <p:tnLst>
+      <p:par>
+        <p:cTn id="1" dur="indefinite" restart="never" nodeType="tmRoot"/>
+      </p:par>
+    </p:tnLst>
+  </p:timing>
 </p:sld>
 </file>
 
@@ -9337,7 +9654,7 @@
         </p:spPr>
         <p:txBody>
           <a:bodyPr>
-            <a:normAutofit lnSpcReduction="10000"/>
+            <a:normAutofit fontScale="92500" lnSpcReduction="10000"/>
           </a:bodyPr>
           <a:lstStyle/>
           <a:p>
@@ -9351,7 +9668,7 @@
                 </a:solidFill>
                 <a:latin typeface="Arial Black" panose="020B0A04020102020204" pitchFamily="34" charset="0"/>
               </a:rPr>
-              <a:t>Yang dikandung dari</a:t>
+              <a:t>dan akan</a:t>
             </a:r>
           </a:p>
           <a:p>
@@ -9365,7 +9682,7 @@
                 </a:solidFill>
                 <a:latin typeface="Arial Black" panose="020B0A04020102020204" pitchFamily="34" charset="0"/>
               </a:rPr>
-              <a:t>Roh Kudus, </a:t>
+              <a:t>Yesus Kristus, </a:t>
             </a:r>
           </a:p>
           <a:p>
@@ -9379,7 +9696,7 @@
                 </a:solidFill>
                 <a:latin typeface="Arial Black" panose="020B0A04020102020204" pitchFamily="34" charset="0"/>
               </a:rPr>
-              <a:t>dilahirkan oleh</a:t>
+              <a:t>Putra-Nya yang tunggal,</a:t>
             </a:r>
           </a:p>
           <a:p>
@@ -9393,7 +9710,7 @@
                 </a:solidFill>
                 <a:latin typeface="Arial Black" panose="020B0A04020102020204" pitchFamily="34" charset="0"/>
               </a:rPr>
-              <a:t>perawan Maria.</a:t>
+              <a:t>Tuhan kita</a:t>
             </a:r>
             <a:endParaRPr lang="en-US" sz="6000" cap="none" dirty="0">
               <a:solidFill>
@@ -9407,13 +9724,20 @@
     </p:spTree>
     <p:extLst>
       <p:ext uri="{BB962C8B-B14F-4D97-AF65-F5344CB8AC3E}">
-        <p14:creationId xmlns:p14="http://schemas.microsoft.com/office/powerpoint/2010/main" val="1861516823"/>
+        <p14:creationId xmlns:p14="http://schemas.microsoft.com/office/powerpoint/2010/main" val="2853845156"/>
       </p:ext>
     </p:extLst>
   </p:cSld>
   <p:clrMapOvr>
     <a:masterClrMapping/>
   </p:clrMapOvr>
+  <p:timing>
+    <p:tnLst>
+      <p:par>
+        <p:cTn id="1" dur="indefinite" restart="never" nodeType="tmRoot"/>
+      </p:par>
+    </p:tnLst>
+  </p:timing>
 </p:sld>
 </file>
 
@@ -9452,7 +9776,7 @@
         </p:spPr>
         <p:txBody>
           <a:bodyPr>
-            <a:normAutofit fontScale="85000" lnSpcReduction="20000"/>
+            <a:normAutofit lnSpcReduction="10000"/>
           </a:bodyPr>
           <a:lstStyle/>
           <a:p>
@@ -9466,7 +9790,7 @@
                 </a:solidFill>
                 <a:latin typeface="Arial Black" panose="020B0A04020102020204" pitchFamily="34" charset="0"/>
               </a:rPr>
-              <a:t>Yang menderita sengsara </a:t>
+              <a:t>Yang dikandung dari</a:t>
             </a:r>
           </a:p>
           <a:p>
@@ -9480,7 +9804,7 @@
                 </a:solidFill>
                 <a:latin typeface="Arial Black" panose="020B0A04020102020204" pitchFamily="34" charset="0"/>
               </a:rPr>
-              <a:t>dalam pemerintahan</a:t>
+              <a:t>Roh Kudus, </a:t>
             </a:r>
           </a:p>
           <a:p>
@@ -9494,7 +9818,7 @@
                 </a:solidFill>
                 <a:latin typeface="Arial Black" panose="020B0A04020102020204" pitchFamily="34" charset="0"/>
               </a:rPr>
-              <a:t>Ponsius Pilatus, </a:t>
+              <a:t>dilahirkan oleh</a:t>
             </a:r>
           </a:p>
           <a:p>
@@ -9508,21 +9832,7 @@
                 </a:solidFill>
                 <a:latin typeface="Arial Black" panose="020B0A04020102020204" pitchFamily="34" charset="0"/>
               </a:rPr>
-              <a:t>disalibkan, wafat dan</a:t>
-            </a:r>
-          </a:p>
-          <a:p>
-            <a:pPr marL="0" indent="0" algn="ctr">
-              <a:buNone/>
-            </a:pPr>
-            <a:r>
-              <a:rPr lang="fi-FI" sz="6000" cap="none" dirty="0">
-                <a:solidFill>
-                  <a:srgbClr val="FFFF00"/>
-                </a:solidFill>
-                <a:latin typeface="Arial Black" panose="020B0A04020102020204" pitchFamily="34" charset="0"/>
-              </a:rPr>
-              <a:t>dimakamkan.</a:t>
+              <a:t>perawan Maria.</a:t>
             </a:r>
             <a:endParaRPr lang="en-US" sz="6000" cap="none" dirty="0">
               <a:solidFill>
@@ -9536,13 +9846,20 @@
     </p:spTree>
     <p:extLst>
       <p:ext uri="{BB962C8B-B14F-4D97-AF65-F5344CB8AC3E}">
-        <p14:creationId xmlns:p14="http://schemas.microsoft.com/office/powerpoint/2010/main" val="1394542805"/>
+        <p14:creationId xmlns:p14="http://schemas.microsoft.com/office/powerpoint/2010/main" val="1861516823"/>
       </p:ext>
     </p:extLst>
   </p:cSld>
   <p:clrMapOvr>
     <a:masterClrMapping/>
   </p:clrMapOvr>
+  <p:timing>
+    <p:tnLst>
+      <p:par>
+        <p:cTn id="1" dur="indefinite" restart="never" nodeType="tmRoot"/>
+      </p:par>
+    </p:tnLst>
+  </p:timing>
 </p:sld>
 </file>
 
@@ -9595,7 +9912,7 @@
                 </a:solidFill>
                 <a:latin typeface="Arial Black" panose="020B0A04020102020204" pitchFamily="34" charset="0"/>
               </a:rPr>
-              <a:t>Yang turun</a:t>
+              <a:t>Yang menderita sengsara </a:t>
             </a:r>
           </a:p>
           <a:p>
@@ -9609,7 +9926,7 @@
                 </a:solidFill>
                 <a:latin typeface="Arial Black" panose="020B0A04020102020204" pitchFamily="34" charset="0"/>
               </a:rPr>
-              <a:t>ke tempat penantian, </a:t>
+              <a:t>dalam pemerintahan</a:t>
             </a:r>
           </a:p>
           <a:p>
@@ -9623,7 +9940,7 @@
                 </a:solidFill>
                 <a:latin typeface="Arial Black" panose="020B0A04020102020204" pitchFamily="34" charset="0"/>
               </a:rPr>
-              <a:t>pada hari ketiga</a:t>
+              <a:t>Ponsius Pilatus, </a:t>
             </a:r>
           </a:p>
           <a:p>
@@ -9637,7 +9954,7 @@
                 </a:solidFill>
                 <a:latin typeface="Arial Black" panose="020B0A04020102020204" pitchFamily="34" charset="0"/>
               </a:rPr>
-              <a:t>bangkit dari antara</a:t>
+              <a:t>disalibkan, wafat dan</a:t>
             </a:r>
           </a:p>
           <a:p>
@@ -9651,7 +9968,7 @@
                 </a:solidFill>
                 <a:latin typeface="Arial Black" panose="020B0A04020102020204" pitchFamily="34" charset="0"/>
               </a:rPr>
-              <a:t>orang mati.</a:t>
+              <a:t>dimakamkan.</a:t>
             </a:r>
             <a:endParaRPr lang="en-US" sz="6000" cap="none" dirty="0">
               <a:solidFill>
@@ -9665,13 +9982,20 @@
     </p:spTree>
     <p:extLst>
       <p:ext uri="{BB962C8B-B14F-4D97-AF65-F5344CB8AC3E}">
-        <p14:creationId xmlns:p14="http://schemas.microsoft.com/office/powerpoint/2010/main" val="1251693101"/>
+        <p14:creationId xmlns:p14="http://schemas.microsoft.com/office/powerpoint/2010/main" val="1394542805"/>
       </p:ext>
     </p:extLst>
   </p:cSld>
   <p:clrMapOvr>
     <a:masterClrMapping/>
   </p:clrMapOvr>
+  <p:timing>
+    <p:tnLst>
+      <p:par>
+        <p:cTn id="1" dur="indefinite" restart="never" nodeType="tmRoot"/>
+      </p:par>
+    </p:tnLst>
+  </p:timing>
 </p:sld>
 </file>
 
@@ -9710,7 +10034,7 @@
         </p:spPr>
         <p:txBody>
           <a:bodyPr>
-            <a:normAutofit fontScale="92500" lnSpcReduction="10000"/>
+            <a:normAutofit fontScale="85000" lnSpcReduction="20000"/>
           </a:bodyPr>
           <a:lstStyle/>
           <a:p>
@@ -9724,7 +10048,7 @@
                 </a:solidFill>
                 <a:latin typeface="Arial Black" panose="020B0A04020102020204" pitchFamily="34" charset="0"/>
               </a:rPr>
-              <a:t>Yang naik ke surga, </a:t>
+              <a:t>Yang turun</a:t>
             </a:r>
           </a:p>
           <a:p>
@@ -9738,7 +10062,7 @@
                 </a:solidFill>
                 <a:latin typeface="Arial Black" panose="020B0A04020102020204" pitchFamily="34" charset="0"/>
               </a:rPr>
-              <a:t>duduk di sebelah kanan </a:t>
+              <a:t>ke tempat penantian, </a:t>
             </a:r>
           </a:p>
           <a:p>
@@ -9752,7 +10076,7 @@
                 </a:solidFill>
                 <a:latin typeface="Arial Black" panose="020B0A04020102020204" pitchFamily="34" charset="0"/>
               </a:rPr>
-              <a:t>Allah Bapa</a:t>
+              <a:t>pada hari ketiga</a:t>
             </a:r>
           </a:p>
           <a:p>
@@ -9766,7 +10090,21 @@
                 </a:solidFill>
                 <a:latin typeface="Arial Black" panose="020B0A04020102020204" pitchFamily="34" charset="0"/>
               </a:rPr>
-              <a:t>yang Mahakuasa.</a:t>
+              <a:t>bangkit dari antara</a:t>
+            </a:r>
+          </a:p>
+          <a:p>
+            <a:pPr marL="0" indent="0" algn="ctr">
+              <a:buNone/>
+            </a:pPr>
+            <a:r>
+              <a:rPr lang="fi-FI" sz="6000" cap="none" dirty="0">
+                <a:solidFill>
+                  <a:srgbClr val="FFFF00"/>
+                </a:solidFill>
+                <a:latin typeface="Arial Black" panose="020B0A04020102020204" pitchFamily="34" charset="0"/>
+              </a:rPr>
+              <a:t>orang mati.</a:t>
             </a:r>
             <a:endParaRPr lang="en-US" sz="6000" cap="none" dirty="0">
               <a:solidFill>
@@ -9780,13 +10118,20 @@
     </p:spTree>
     <p:extLst>
       <p:ext uri="{BB962C8B-B14F-4D97-AF65-F5344CB8AC3E}">
-        <p14:creationId xmlns:p14="http://schemas.microsoft.com/office/powerpoint/2010/main" val="207519434"/>
+        <p14:creationId xmlns:p14="http://schemas.microsoft.com/office/powerpoint/2010/main" val="1251693101"/>
       </p:ext>
     </p:extLst>
   </p:cSld>
   <p:clrMapOvr>
     <a:masterClrMapping/>
   </p:clrMapOvr>
+  <p:timing>
+    <p:tnLst>
+      <p:par>
+        <p:cTn id="1" dur="indefinite" restart="never" nodeType="tmRoot"/>
+      </p:par>
+    </p:tnLst>
+  </p:timing>
 </p:sld>
 </file>
 
@@ -10019,6 +10364,13 @@
   <p:clrMapOvr>
     <a:masterClrMapping/>
   </p:clrMapOvr>
+  <p:timing>
+    <p:tnLst>
+      <p:par>
+        <p:cTn id="1" dur="indefinite" restart="never" nodeType="tmRoot"/>
+      </p:par>
+    </p:tnLst>
+  </p:timing>
 </p:sld>
 </file>
 
@@ -10057,7 +10409,7 @@
         </p:spPr>
         <p:txBody>
           <a:bodyPr>
-            <a:normAutofit/>
+            <a:normAutofit fontScale="92500" lnSpcReduction="10000"/>
           </a:bodyPr>
           <a:lstStyle/>
           <a:p>
@@ -10071,7 +10423,7 @@
                 </a:solidFill>
                 <a:latin typeface="Arial Black" panose="020B0A04020102020204" pitchFamily="34" charset="0"/>
               </a:rPr>
-              <a:t>Dari situ Ia kan datang </a:t>
+              <a:t>Yang naik ke surga, </a:t>
             </a:r>
           </a:p>
           <a:p>
@@ -10085,7 +10437,7 @@
                 </a:solidFill>
                 <a:latin typeface="Arial Black" panose="020B0A04020102020204" pitchFamily="34" charset="0"/>
               </a:rPr>
-              <a:t>mengadili orang hidup</a:t>
+              <a:t>duduk di sebelah kanan </a:t>
             </a:r>
           </a:p>
           <a:p>
@@ -10099,7 +10451,21 @@
                 </a:solidFill>
                 <a:latin typeface="Arial Black" panose="020B0A04020102020204" pitchFamily="34" charset="0"/>
               </a:rPr>
-              <a:t>dan yang mati.</a:t>
+              <a:t>Allah Bapa</a:t>
+            </a:r>
+          </a:p>
+          <a:p>
+            <a:pPr marL="0" indent="0" algn="ctr">
+              <a:buNone/>
+            </a:pPr>
+            <a:r>
+              <a:rPr lang="fi-FI" sz="6000" cap="none" dirty="0">
+                <a:solidFill>
+                  <a:srgbClr val="FFFF00"/>
+                </a:solidFill>
+                <a:latin typeface="Arial Black" panose="020B0A04020102020204" pitchFamily="34" charset="0"/>
+              </a:rPr>
+              <a:t>yang Mahakuasa.</a:t>
             </a:r>
             <a:endParaRPr lang="en-US" sz="6000" cap="none" dirty="0">
               <a:solidFill>
@@ -10113,13 +10479,20 @@
     </p:spTree>
     <p:extLst>
       <p:ext uri="{BB962C8B-B14F-4D97-AF65-F5344CB8AC3E}">
-        <p14:creationId xmlns:p14="http://schemas.microsoft.com/office/powerpoint/2010/main" val="467487623"/>
+        <p14:creationId xmlns:p14="http://schemas.microsoft.com/office/powerpoint/2010/main" val="207519434"/>
       </p:ext>
     </p:extLst>
   </p:cSld>
   <p:clrMapOvr>
     <a:masterClrMapping/>
   </p:clrMapOvr>
+  <p:timing>
+    <p:tnLst>
+      <p:par>
+        <p:cTn id="1" dur="indefinite" restart="never" nodeType="tmRoot"/>
+      </p:par>
+    </p:tnLst>
+  </p:timing>
 </p:sld>
 </file>
 
@@ -10152,13 +10525,13 @@
         </p:nvSpPr>
         <p:spPr>
           <a:xfrm>
-            <a:off x="894522" y="1331259"/>
-            <a:ext cx="10402955" cy="4195481"/>
+            <a:off x="1088369" y="1331259"/>
+            <a:ext cx="10015262" cy="4195481"/>
           </a:xfrm>
         </p:spPr>
         <p:txBody>
           <a:bodyPr>
-            <a:normAutofit fontScale="85000" lnSpcReduction="10000"/>
+            <a:normAutofit/>
           </a:bodyPr>
           <a:lstStyle/>
           <a:p>
@@ -10172,7 +10545,7 @@
                 </a:solidFill>
                 <a:latin typeface="Arial Black" panose="020B0A04020102020204" pitchFamily="34" charset="0"/>
               </a:rPr>
-              <a:t>Aku percaya akan</a:t>
+              <a:t>Dari situ Ia kan datang </a:t>
             </a:r>
           </a:p>
           <a:p>
@@ -10186,7 +10559,7 @@
                 </a:solidFill>
                 <a:latin typeface="Arial Black" panose="020B0A04020102020204" pitchFamily="34" charset="0"/>
               </a:rPr>
-              <a:t>Roh Kudus,</a:t>
+              <a:t>mengadili orang hidup</a:t>
             </a:r>
           </a:p>
           <a:p>
@@ -10200,21 +10573,7 @@
                 </a:solidFill>
                 <a:latin typeface="Arial Black" panose="020B0A04020102020204" pitchFamily="34" charset="0"/>
               </a:rPr>
-              <a:t>Gereja Katolik yang Kudus, </a:t>
-            </a:r>
-          </a:p>
-          <a:p>
-            <a:pPr marL="0" indent="0" algn="ctr">
-              <a:buNone/>
-            </a:pPr>
-            <a:r>
-              <a:rPr lang="fi-FI" sz="6000" cap="none" dirty="0">
-                <a:solidFill>
-                  <a:srgbClr val="FFFF00"/>
-                </a:solidFill>
-                <a:latin typeface="Arial Black" panose="020B0A04020102020204" pitchFamily="34" charset="0"/>
-              </a:rPr>
-              <a:t>persekutuan Para Kudus,</a:t>
+              <a:t>dan yang mati.</a:t>
             </a:r>
             <a:endParaRPr lang="en-US" sz="6000" cap="none" dirty="0">
               <a:solidFill>
@@ -10228,13 +10587,20 @@
     </p:spTree>
     <p:extLst>
       <p:ext uri="{BB962C8B-B14F-4D97-AF65-F5344CB8AC3E}">
-        <p14:creationId xmlns:p14="http://schemas.microsoft.com/office/powerpoint/2010/main" val="3809884346"/>
+        <p14:creationId xmlns:p14="http://schemas.microsoft.com/office/powerpoint/2010/main" val="467487623"/>
       </p:ext>
     </p:extLst>
   </p:cSld>
   <p:clrMapOvr>
     <a:masterClrMapping/>
   </p:clrMapOvr>
+  <p:timing>
+    <p:tnLst>
+      <p:par>
+        <p:cTn id="1" dur="indefinite" restart="never" nodeType="tmRoot"/>
+      </p:par>
+    </p:tnLst>
+  </p:timing>
 </p:sld>
 </file>
 
@@ -10273,6 +10639,128 @@
         </p:spPr>
         <p:txBody>
           <a:bodyPr>
+            <a:normAutofit fontScale="85000" lnSpcReduction="10000"/>
+          </a:bodyPr>
+          <a:lstStyle/>
+          <a:p>
+            <a:pPr marL="0" indent="0" algn="ctr">
+              <a:buNone/>
+            </a:pPr>
+            <a:r>
+              <a:rPr lang="fi-FI" sz="6000" cap="none" dirty="0">
+                <a:solidFill>
+                  <a:srgbClr val="FFFF00"/>
+                </a:solidFill>
+                <a:latin typeface="Arial Black" panose="020B0A04020102020204" pitchFamily="34" charset="0"/>
+              </a:rPr>
+              <a:t>Aku percaya akan</a:t>
+            </a:r>
+          </a:p>
+          <a:p>
+            <a:pPr marL="0" indent="0" algn="ctr">
+              <a:buNone/>
+            </a:pPr>
+            <a:r>
+              <a:rPr lang="fi-FI" sz="6000" cap="none" dirty="0">
+                <a:solidFill>
+                  <a:srgbClr val="FFFF00"/>
+                </a:solidFill>
+                <a:latin typeface="Arial Black" panose="020B0A04020102020204" pitchFamily="34" charset="0"/>
+              </a:rPr>
+              <a:t>Roh Kudus,</a:t>
+            </a:r>
+          </a:p>
+          <a:p>
+            <a:pPr marL="0" indent="0" algn="ctr">
+              <a:buNone/>
+            </a:pPr>
+            <a:r>
+              <a:rPr lang="fi-FI" sz="6000" cap="none" dirty="0">
+                <a:solidFill>
+                  <a:srgbClr val="FFFF00"/>
+                </a:solidFill>
+                <a:latin typeface="Arial Black" panose="020B0A04020102020204" pitchFamily="34" charset="0"/>
+              </a:rPr>
+              <a:t>Gereja Katolik yang Kudus, </a:t>
+            </a:r>
+          </a:p>
+          <a:p>
+            <a:pPr marL="0" indent="0" algn="ctr">
+              <a:buNone/>
+            </a:pPr>
+            <a:r>
+              <a:rPr lang="fi-FI" sz="6000" cap="none" dirty="0">
+                <a:solidFill>
+                  <a:srgbClr val="FFFF00"/>
+                </a:solidFill>
+                <a:latin typeface="Arial Black" panose="020B0A04020102020204" pitchFamily="34" charset="0"/>
+              </a:rPr>
+              <a:t>persekutuan Para Kudus,</a:t>
+            </a:r>
+            <a:endParaRPr lang="en-US" sz="6000" cap="none" dirty="0">
+              <a:solidFill>
+                <a:srgbClr val="FFFF00"/>
+              </a:solidFill>
+              <a:latin typeface="Arial Black" panose="020B0A04020102020204" pitchFamily="34" charset="0"/>
+            </a:endParaRPr>
+          </a:p>
+        </p:txBody>
+      </p:sp>
+    </p:spTree>
+    <p:extLst>
+      <p:ext uri="{BB962C8B-B14F-4D97-AF65-F5344CB8AC3E}">
+        <p14:creationId xmlns:p14="http://schemas.microsoft.com/office/powerpoint/2010/main" val="3809884346"/>
+      </p:ext>
+    </p:extLst>
+  </p:cSld>
+  <p:clrMapOvr>
+    <a:masterClrMapping/>
+  </p:clrMapOvr>
+  <p:timing>
+    <p:tnLst>
+      <p:par>
+        <p:cTn id="1" dur="indefinite" restart="never" nodeType="tmRoot"/>
+      </p:par>
+    </p:tnLst>
+  </p:timing>
+</p:sld>
+</file>
+
+<file path=ppt/slides/slide33.xml><?xml version="1.0" encoding="utf-8"?>
+<p:sld xmlns:a="http://schemas.openxmlformats.org/drawingml/2006/main" xmlns:r="http://schemas.openxmlformats.org/officeDocument/2006/relationships" xmlns:p="http://schemas.openxmlformats.org/presentationml/2006/main">
+  <p:cSld>
+    <p:spTree>
+      <p:nvGrpSpPr>
+        <p:cNvPr id="1" name=""/>
+        <p:cNvGrpSpPr/>
+        <p:nvPr/>
+      </p:nvGrpSpPr>
+      <p:grpSpPr>
+        <a:xfrm>
+          <a:off x="0" y="0"/>
+          <a:ext cx="0" cy="0"/>
+          <a:chOff x="0" y="0"/>
+          <a:chExt cx="0" cy="0"/>
+        </a:xfrm>
+      </p:grpSpPr>
+      <p:sp>
+        <p:nvSpPr>
+          <p:cNvPr id="3" name="Content Placeholder 2"/>
+          <p:cNvSpPr>
+            <a:spLocks noGrp="1"/>
+          </p:cNvSpPr>
+          <p:nvPr>
+            <p:ph idx="1"/>
+          </p:nvPr>
+        </p:nvSpPr>
+        <p:spPr>
+          <a:xfrm>
+            <a:off x="894522" y="1331259"/>
+            <a:ext cx="10402955" cy="4195481"/>
+          </a:xfrm>
+        </p:spPr>
+        <p:txBody>
+          <a:bodyPr>
             <a:normAutofit lnSpcReduction="10000"/>
           </a:bodyPr>
           <a:lstStyle/>
@@ -10350,10 +10838,17 @@
   <p:clrMapOvr>
     <a:masterClrMapping/>
   </p:clrMapOvr>
+  <p:timing>
+    <p:tnLst>
+      <p:par>
+        <p:cTn id="1" dur="indefinite" restart="never" nodeType="tmRoot"/>
+      </p:par>
+    </p:tnLst>
+  </p:timing>
 </p:sld>
 </file>
 
-<file path=ppt/slides/slide33.xml><?xml version="1.0" encoding="utf-8"?>
+<file path=ppt/slides/slide34.xml><?xml version="1.0" encoding="utf-8"?>
 <p:sld xmlns:a="http://schemas.openxmlformats.org/drawingml/2006/main" xmlns:r="http://schemas.openxmlformats.org/officeDocument/2006/relationships" xmlns:p="http://schemas.openxmlformats.org/presentationml/2006/main">
   <p:cSld>
     <p:spTree>
@@ -10549,10 +11044,17 @@
   <p:clrMapOvr>
     <a:masterClrMapping/>
   </p:clrMapOvr>
+  <p:timing>
+    <p:tnLst>
+      <p:par>
+        <p:cTn id="1" dur="indefinite" restart="never" nodeType="tmRoot"/>
+      </p:par>
+    </p:tnLst>
+  </p:timing>
 </p:sld>
 </file>
 
-<file path=ppt/slides/slide34.xml><?xml version="1.0" encoding="utf-8"?>
+<file path=ppt/slides/slide35.xml><?xml version="1.0" encoding="utf-8"?>
 <p:sld xmlns:a="http://schemas.openxmlformats.org/drawingml/2006/main" xmlns:r="http://schemas.openxmlformats.org/officeDocument/2006/relationships" xmlns:p="http://schemas.openxmlformats.org/presentationml/2006/main">
   <p:cSld>
     <p:spTree>
@@ -10678,10 +11180,17 @@
   <p:clrMapOvr>
     <a:masterClrMapping/>
   </p:clrMapOvr>
+  <p:timing>
+    <p:tnLst>
+      <p:par>
+        <p:cTn id="1" dur="indefinite" restart="never" nodeType="tmRoot"/>
+      </p:par>
+    </p:tnLst>
+  </p:timing>
 </p:sld>
 </file>
 
-<file path=ppt/slides/slide35.xml><?xml version="1.0" encoding="utf-8"?>
+<file path=ppt/slides/slide36.xml><?xml version="1.0" encoding="utf-8"?>
 <p:sld xmlns:a="http://schemas.openxmlformats.org/drawingml/2006/main" xmlns:r="http://schemas.openxmlformats.org/officeDocument/2006/relationships" xmlns:p="http://schemas.openxmlformats.org/presentationml/2006/main">
   <p:cSld>
     <p:spTree>
@@ -10915,10 +11424,17 @@
   <p:clrMapOvr>
     <a:masterClrMapping/>
   </p:clrMapOvr>
+  <p:timing>
+    <p:tnLst>
+      <p:par>
+        <p:cTn id="1" dur="indefinite" restart="never" nodeType="tmRoot"/>
+      </p:par>
+    </p:tnLst>
+  </p:timing>
 </p:sld>
 </file>
 
-<file path=ppt/slides/slide36.xml><?xml version="1.0" encoding="utf-8"?>
+<file path=ppt/slides/slide37.xml><?xml version="1.0" encoding="utf-8"?>
 <p:sld xmlns:a="http://schemas.openxmlformats.org/drawingml/2006/main" xmlns:r="http://schemas.openxmlformats.org/officeDocument/2006/relationships" xmlns:p="http://schemas.openxmlformats.org/presentationml/2006/main">
   <p:cSld>
     <p:spTree>
@@ -10940,7 +11456,7 @@
           <p:cNvPr id="8" name="Content Placeholder 2">
             <a:extLst>
               <a:ext uri="{FF2B5EF4-FFF2-40B4-BE49-F238E27FC236}">
-                <a16:creationId xmlns:a16="http://schemas.microsoft.com/office/drawing/2014/main" xmlns="" id="{E34A56A8-0A73-4175-9D63-37CC3439A2C3}"/>
+                <a16:creationId xmlns="" xmlns:a16="http://schemas.microsoft.com/office/drawing/2014/main" id="{E34A56A8-0A73-4175-9D63-37CC3439A2C3}"/>
               </a:ext>
             </a:extLst>
           </p:cNvPr>
@@ -11084,7 +11600,7 @@
 </p:sld>
 </file>
 
-<file path=ppt/slides/slide37.xml><?xml version="1.0" encoding="utf-8"?>
+<file path=ppt/slides/slide38.xml><?xml version="1.0" encoding="utf-8"?>
 <p:sld xmlns:a="http://schemas.openxmlformats.org/drawingml/2006/main" xmlns:r="http://schemas.openxmlformats.org/officeDocument/2006/relationships" xmlns:p="http://schemas.openxmlformats.org/presentationml/2006/main">
   <p:cSld>
     <p:spTree>
@@ -11259,10 +11775,17 @@
   <p:clrMapOvr>
     <a:masterClrMapping/>
   </p:clrMapOvr>
+  <p:timing>
+    <p:tnLst>
+      <p:par>
+        <p:cTn id="1" dur="indefinite" restart="never" nodeType="tmRoot"/>
+      </p:par>
+    </p:tnLst>
+  </p:timing>
 </p:sld>
 </file>
 
-<file path=ppt/slides/slide38.xml><?xml version="1.0" encoding="utf-8"?>
+<file path=ppt/slides/slide39.xml><?xml version="1.0" encoding="utf-8"?>
 <p:sld xmlns:a="http://schemas.openxmlformats.org/drawingml/2006/main" xmlns:r="http://schemas.openxmlformats.org/officeDocument/2006/relationships" xmlns:p="http://schemas.openxmlformats.org/presentationml/2006/main">
   <p:cSld>
     <p:spTree>
@@ -11284,7 +11807,7 @@
           <p:cNvPr id="6" name="Title 1">
             <a:extLst>
               <a:ext uri="{FF2B5EF4-FFF2-40B4-BE49-F238E27FC236}">
-                <a16:creationId xmlns:a16="http://schemas.microsoft.com/office/drawing/2014/main" xmlns="" id="{92BF8479-39E5-40B9-864C-5C90F4FA43A3}"/>
+                <a16:creationId xmlns="" xmlns:a16="http://schemas.microsoft.com/office/drawing/2014/main" id="{92BF8479-39E5-40B9-864C-5C90F4FA43A3}"/>
               </a:ext>
             </a:extLst>
           </p:cNvPr>
@@ -11349,7 +11872,7 @@
           <p:cNvPr id="10" name="Rectangle 4">
             <a:extLst>
               <a:ext uri="{FF2B5EF4-FFF2-40B4-BE49-F238E27FC236}">
-                <a16:creationId xmlns:a16="http://schemas.microsoft.com/office/drawing/2014/main" xmlns="" id="{51ECECB3-6A8C-4068-B947-90617D76FEE1}"/>
+                <a16:creationId xmlns="" xmlns:a16="http://schemas.microsoft.com/office/drawing/2014/main" id="{51ECECB3-6A8C-4068-B947-90617D76FEE1}"/>
               </a:ext>
             </a:extLst>
           </p:cNvPr>
@@ -11493,18 +12016,7 @@
                 <a:ea typeface="Times New Roman" panose="02020603050405020304" pitchFamily="18" charset="0"/>
                 <a:cs typeface="Calibri" panose="020F0502020204030204" pitchFamily="34" charset="0"/>
               </a:rPr>
-              <a:t> </a:t>
-            </a:r>
-            <a:r>
-              <a:rPr lang="en-ID" altLang="en-US" sz="6000" b="1" dirty="0" smtClean="0">
-                <a:solidFill>
-                  <a:srgbClr val="FFFF00"/>
-                </a:solidFill>
-                <a:latin typeface="Arial Black" panose="020B0A04020102020204" pitchFamily="34" charset="0"/>
-                <a:ea typeface="Times New Roman" panose="02020603050405020304" pitchFamily="18" charset="0"/>
-                <a:cs typeface="Calibri" panose="020F0502020204030204" pitchFamily="34" charset="0"/>
-              </a:rPr>
-              <a:t>kami</a:t>
+              <a:t> kami</a:t>
             </a:r>
           </a:p>
           <a:p>
@@ -11579,14 +12091,6 @@
               </a:rPr>
               <a:t>.</a:t>
             </a:r>
-            <a:endParaRPr lang="en-ID" altLang="en-US" sz="6000" b="1" dirty="0" smtClean="0">
-              <a:solidFill>
-                <a:srgbClr val="FFFF00"/>
-              </a:solidFill>
-              <a:latin typeface="Arial Black" panose="020B0A04020102020204" pitchFamily="34" charset="0"/>
-              <a:ea typeface="Times New Roman" panose="02020603050405020304" pitchFamily="18" charset="0"/>
-              <a:cs typeface="Calibri" panose="020F0502020204030204" pitchFamily="34" charset="0"/>
-            </a:endParaRPr>
           </a:p>
           <a:p>
             <a:pPr marL="0" marR="0" lvl="0" indent="0" algn="ctr" defTabSz="914400" rtl="0" eaLnBrk="0" fontAlgn="base" latinLnBrk="0" hangingPunct="0">
@@ -11693,22 +12197,7 @@
                 <a:ea typeface="Times New Roman" panose="02020603050405020304" pitchFamily="18" charset="0"/>
                 <a:cs typeface="Calibri" panose="020F0502020204030204" pitchFamily="34" charset="0"/>
               </a:rPr>
-              <a:t> </a:t>
-            </a:r>
-            <a:r>
-              <a:rPr kumimoji="0" lang="en-ID" altLang="en-US" sz="6000" b="1" i="0" u="none" strike="noStrike" cap="none" normalizeH="0" dirty="0" smtClean="0">
-                <a:ln>
-                  <a:noFill/>
-                </a:ln>
-                <a:solidFill>
-                  <a:srgbClr val="FFFF00"/>
-                </a:solidFill>
-                <a:effectLst/>
-                <a:latin typeface="Arial Black" panose="020B0A04020102020204" pitchFamily="34" charset="0"/>
-                <a:ea typeface="Times New Roman" panose="02020603050405020304" pitchFamily="18" charset="0"/>
-                <a:cs typeface="Calibri" panose="020F0502020204030204" pitchFamily="34" charset="0"/>
-              </a:rPr>
-              <a:t>kami</a:t>
+              <a:t> kami</a:t>
             </a:r>
           </a:p>
           <a:p>
@@ -11741,22 +12230,7 @@
                 <a:ea typeface="Times New Roman" panose="02020603050405020304" pitchFamily="18" charset="0"/>
                 <a:cs typeface="Calibri" panose="020F0502020204030204" pitchFamily="34" charset="0"/>
               </a:rPr>
-              <a:t> </a:t>
-            </a:r>
-            <a:r>
-              <a:rPr kumimoji="0" lang="en-ID" altLang="en-US" sz="6000" b="1" i="0" u="none" strike="noStrike" cap="none" normalizeH="0" dirty="0" smtClean="0">
-                <a:ln>
-                  <a:noFill/>
-                </a:ln>
-                <a:solidFill>
-                  <a:srgbClr val="FFFF00"/>
-                </a:solidFill>
-                <a:effectLst/>
-                <a:latin typeface="Arial Black" panose="020B0A04020102020204" pitchFamily="34" charset="0"/>
-                <a:ea typeface="Times New Roman" panose="02020603050405020304" pitchFamily="18" charset="0"/>
-                <a:cs typeface="Calibri" panose="020F0502020204030204" pitchFamily="34" charset="0"/>
-              </a:rPr>
-              <a:t>pun </a:t>
+              <a:t> pun </a:t>
             </a:r>
             <a:r>
               <a:rPr kumimoji="0" lang="en-ID" altLang="en-US" sz="6000" b="1" i="0" u="none" strike="noStrike" cap="none" normalizeH="0" dirty="0" err="1" smtClean="0">
@@ -11808,7 +12282,7 @@
           <p:cNvPr id="4" name="Rectangle 4">
             <a:extLst>
               <a:ext uri="{FF2B5EF4-FFF2-40B4-BE49-F238E27FC236}">
-                <a16:creationId xmlns:a16="http://schemas.microsoft.com/office/drawing/2014/main" xmlns="" id="{51ECECB3-6A8C-4068-B947-90617D76FEE1}"/>
+                <a16:creationId xmlns="" xmlns:a16="http://schemas.microsoft.com/office/drawing/2014/main" id="{51ECECB3-6A8C-4068-B947-90617D76FEE1}"/>
               </a:ext>
             </a:extLst>
           </p:cNvPr>
@@ -11939,520 +12413,13 @@
   <p:clrMapOvr>
     <a:masterClrMapping/>
   </p:clrMapOvr>
-</p:sld>
-</file>
-
-<file path=ppt/slides/slide39.xml><?xml version="1.0" encoding="utf-8"?>
-<p:sld xmlns:a="http://schemas.openxmlformats.org/drawingml/2006/main" xmlns:r="http://schemas.openxmlformats.org/officeDocument/2006/relationships" xmlns:p="http://schemas.openxmlformats.org/presentationml/2006/main">
-  <p:cSld>
-    <p:spTree>
-      <p:nvGrpSpPr>
-        <p:cNvPr id="1" name=""/>
-        <p:cNvGrpSpPr/>
-        <p:nvPr/>
-      </p:nvGrpSpPr>
-      <p:grpSpPr>
-        <a:xfrm>
-          <a:off x="0" y="0"/>
-          <a:ext cx="0" cy="0"/>
-          <a:chOff x="0" y="0"/>
-          <a:chExt cx="0" cy="0"/>
-        </a:xfrm>
-      </p:grpSpPr>
-      <p:sp>
-        <p:nvSpPr>
-          <p:cNvPr id="10" name="Rectangle 4">
-            <a:extLst>
-              <a:ext uri="{FF2B5EF4-FFF2-40B4-BE49-F238E27FC236}">
-                <a16:creationId xmlns:a16="http://schemas.microsoft.com/office/drawing/2014/main" xmlns="" id="{51ECECB3-6A8C-4068-B947-90617D76FEE1}"/>
-              </a:ext>
-            </a:extLst>
-          </p:cNvPr>
-          <p:cNvSpPr>
-            <a:spLocks noChangeArrowheads="1"/>
-          </p:cNvSpPr>
-          <p:nvPr/>
-        </p:nvSpPr>
-        <p:spPr bwMode="auto">
-          <a:xfrm>
-            <a:off x="0" y="1476549"/>
-            <a:ext cx="12192000" cy="3370153"/>
-          </a:xfrm>
-          <a:prstGeom prst="rect">
-            <a:avLst/>
-          </a:prstGeom>
-          <a:noFill/>
-          <a:ln>
-            <a:noFill/>
-          </a:ln>
-          <a:effectLst/>
-          <a:extLst>
-            <a:ext uri="{909E8E84-426E-40DD-AFC4-6F175D3DCCD1}">
-              <a14:hiddenFill xmlns:a14="http://schemas.microsoft.com/office/drawing/2010/main">
-                <a:solidFill>
-                  <a:schemeClr val="accent1"/>
-                </a:solidFill>
-              </a14:hiddenFill>
-            </a:ext>
-            <a:ext uri="{91240B29-F687-4F45-9708-019B960494DF}">
-              <a14:hiddenLine xmlns:a14="http://schemas.microsoft.com/office/drawing/2010/main" w="9525">
-                <a:solidFill>
-                  <a:schemeClr val="tx1"/>
-                </a:solidFill>
-                <a:miter lim="800000"/>
-                <a:headEnd/>
-                <a:tailEnd/>
-              </a14:hiddenLine>
-            </a:ext>
-            <a:ext uri="{AF507438-7753-43E0-B8FC-AC1667EBCBE1}">
-              <a14:hiddenEffects xmlns:a14="http://schemas.microsoft.com/office/drawing/2010/main">
-                <a:effectLst>
-                  <a:outerShdw dist="35921" dir="2700000" algn="ctr" rotWithShape="0">
-                    <a:schemeClr val="bg2"/>
-                  </a:outerShdw>
-                </a:effectLst>
-              </a14:hiddenEffects>
-            </a:ext>
-          </a:extLst>
-        </p:spPr>
-        <p:txBody>
-          <a:bodyPr vert="horz" wrap="square" lIns="91440" tIns="45720" rIns="91440" bIns="0" numCol="1" anchor="ctr" anchorCtr="0" compatLnSpc="1">
-            <a:prstTxWarp prst="textNoShape">
-              <a:avLst/>
-            </a:prstTxWarp>
-            <a:spAutoFit/>
-          </a:bodyPr>
-          <a:lstStyle/>
-          <a:p>
-            <a:pPr marL="0" marR="0" lvl="0" indent="0" algn="ctr" defTabSz="914400" rtl="0" eaLnBrk="0" fontAlgn="base" latinLnBrk="0" hangingPunct="0">
-              <a:lnSpc>
-                <a:spcPct val="100000"/>
-              </a:lnSpc>
-              <a:spcBef>
-                <a:spcPct val="0"/>
-              </a:spcBef>
-              <a:spcAft>
-                <a:spcPct val="0"/>
-              </a:spcAft>
-              <a:buClrTx/>
-              <a:buSzTx/>
-              <a:buFontTx/>
-              <a:buNone/>
-              <a:tabLst/>
-            </a:pPr>
-            <a:r>
-              <a:rPr kumimoji="0" lang="en-ID" altLang="en-US" sz="5400" b="1" i="0" u="none" strike="noStrike" cap="none" normalizeH="0" baseline="0" dirty="0" err="1" smtClean="0">
-                <a:ln>
-                  <a:noFill/>
-                </a:ln>
-                <a:solidFill>
-                  <a:srgbClr val="FFFF00"/>
-                </a:solidFill>
-                <a:effectLst/>
-                <a:latin typeface="Arial Black" panose="020B0A04020102020204" pitchFamily="34" charset="0"/>
-                <a:ea typeface="Times New Roman" panose="02020603050405020304" pitchFamily="18" charset="0"/>
-                <a:cs typeface="Calibri" panose="020F0502020204030204" pitchFamily="34" charset="0"/>
-              </a:rPr>
-              <a:t>Pesta</a:t>
-            </a:r>
-            <a:r>
-              <a:rPr kumimoji="0" lang="en-ID" altLang="en-US" sz="5400" b="1" i="0" u="none" strike="noStrike" cap="none" normalizeH="0" baseline="0" dirty="0" smtClean="0">
-                <a:ln>
-                  <a:noFill/>
-                </a:ln>
-                <a:solidFill>
-                  <a:srgbClr val="FFFF00"/>
-                </a:solidFill>
-                <a:effectLst/>
-                <a:latin typeface="Arial Black" panose="020B0A04020102020204" pitchFamily="34" charset="0"/>
-                <a:ea typeface="Times New Roman" panose="02020603050405020304" pitchFamily="18" charset="0"/>
-                <a:cs typeface="Calibri" panose="020F0502020204030204" pitchFamily="34" charset="0"/>
-              </a:rPr>
-              <a:t> </a:t>
-            </a:r>
-            <a:r>
-              <a:rPr kumimoji="0" lang="en-ID" altLang="en-US" sz="5400" b="1" i="0" u="none" strike="noStrike" cap="none" normalizeH="0" baseline="0" dirty="0" err="1" smtClean="0">
-                <a:ln>
-                  <a:noFill/>
-                </a:ln>
-                <a:solidFill>
-                  <a:srgbClr val="FFFF00"/>
-                </a:solidFill>
-                <a:effectLst/>
-                <a:latin typeface="Arial Black" panose="020B0A04020102020204" pitchFamily="34" charset="0"/>
-                <a:ea typeface="Times New Roman" panose="02020603050405020304" pitchFamily="18" charset="0"/>
-                <a:cs typeface="Calibri" panose="020F0502020204030204" pitchFamily="34" charset="0"/>
-              </a:rPr>
-              <a:t>Kau</a:t>
-            </a:r>
-            <a:r>
-              <a:rPr kumimoji="0" lang="en-ID" altLang="en-US" sz="5400" b="1" i="0" u="none" strike="noStrike" cap="none" normalizeH="0" baseline="0" dirty="0" smtClean="0">
-                <a:ln>
-                  <a:noFill/>
-                </a:ln>
-                <a:solidFill>
-                  <a:srgbClr val="FFFF00"/>
-                </a:solidFill>
-                <a:effectLst/>
-                <a:latin typeface="Arial Black" panose="020B0A04020102020204" pitchFamily="34" charset="0"/>
-                <a:ea typeface="Times New Roman" panose="02020603050405020304" pitchFamily="18" charset="0"/>
-                <a:cs typeface="Calibri" panose="020F0502020204030204" pitchFamily="34" charset="0"/>
-              </a:rPr>
-              <a:t> </a:t>
-            </a:r>
-            <a:r>
-              <a:rPr kumimoji="0" lang="en-ID" altLang="en-US" sz="5400" b="1" i="0" u="none" strike="noStrike" cap="none" normalizeH="0" baseline="0" dirty="0" err="1" smtClean="0">
-                <a:ln>
-                  <a:noFill/>
-                </a:ln>
-                <a:solidFill>
-                  <a:srgbClr val="FFFF00"/>
-                </a:solidFill>
-                <a:effectLst/>
-                <a:latin typeface="Arial Black" panose="020B0A04020102020204" pitchFamily="34" charset="0"/>
-                <a:ea typeface="Times New Roman" panose="02020603050405020304" pitchFamily="18" charset="0"/>
-                <a:cs typeface="Calibri" panose="020F0502020204030204" pitchFamily="34" charset="0"/>
-              </a:rPr>
-              <a:t>selenggarakan</a:t>
-            </a:r>
-            <a:r>
-              <a:rPr kumimoji="0" lang="en-ID" altLang="en-US" sz="5400" b="1" i="0" u="none" strike="noStrike" cap="none" normalizeH="0" baseline="0" dirty="0" smtClean="0">
-                <a:ln>
-                  <a:noFill/>
-                </a:ln>
-                <a:solidFill>
-                  <a:srgbClr val="FFFF00"/>
-                </a:solidFill>
-                <a:effectLst/>
-                <a:latin typeface="Arial Black" panose="020B0A04020102020204" pitchFamily="34" charset="0"/>
-                <a:ea typeface="Times New Roman" panose="02020603050405020304" pitchFamily="18" charset="0"/>
-                <a:cs typeface="Calibri" panose="020F0502020204030204" pitchFamily="34" charset="0"/>
-              </a:rPr>
-              <a:t>, </a:t>
-            </a:r>
-          </a:p>
-          <a:p>
-            <a:pPr marL="0" marR="0" lvl="0" indent="0" algn="ctr" defTabSz="914400" rtl="0" eaLnBrk="0" fontAlgn="base" latinLnBrk="0" hangingPunct="0">
-              <a:lnSpc>
-                <a:spcPct val="100000"/>
-              </a:lnSpc>
-              <a:spcBef>
-                <a:spcPct val="0"/>
-              </a:spcBef>
-              <a:spcAft>
-                <a:spcPct val="0"/>
-              </a:spcAft>
-              <a:buClrTx/>
-              <a:buSzTx/>
-              <a:buFontTx/>
-              <a:buNone/>
-              <a:tabLst/>
-            </a:pPr>
-            <a:r>
-              <a:rPr kumimoji="0" lang="en-ID" altLang="en-US" sz="5400" b="1" i="0" u="none" strike="noStrike" cap="none" normalizeH="0" baseline="0" dirty="0" err="1" smtClean="0">
-                <a:ln>
-                  <a:noFill/>
-                </a:ln>
-                <a:solidFill>
-                  <a:srgbClr val="FFFF00"/>
-                </a:solidFill>
-                <a:effectLst/>
-                <a:latin typeface="Arial Black" panose="020B0A04020102020204" pitchFamily="34" charset="0"/>
-                <a:ea typeface="Times New Roman" panose="02020603050405020304" pitchFamily="18" charset="0"/>
-                <a:cs typeface="Calibri" panose="020F0502020204030204" pitchFamily="34" charset="0"/>
-              </a:rPr>
-              <a:t>Kau</a:t>
-            </a:r>
-            <a:r>
-              <a:rPr kumimoji="0" lang="en-ID" altLang="en-US" sz="5400" b="1" i="0" u="none" strike="noStrike" cap="none" normalizeH="0" dirty="0" smtClean="0">
-                <a:ln>
-                  <a:noFill/>
-                </a:ln>
-                <a:solidFill>
-                  <a:srgbClr val="FFFF00"/>
-                </a:solidFill>
-                <a:effectLst/>
-                <a:latin typeface="Arial Black" panose="020B0A04020102020204" pitchFamily="34" charset="0"/>
-                <a:ea typeface="Times New Roman" panose="02020603050405020304" pitchFamily="18" charset="0"/>
-                <a:cs typeface="Calibri" panose="020F0502020204030204" pitchFamily="34" charset="0"/>
-              </a:rPr>
-              <a:t> </a:t>
-            </a:r>
-            <a:r>
-              <a:rPr kumimoji="0" lang="en-ID" altLang="en-US" sz="5400" b="1" i="0" u="none" strike="noStrike" cap="none" normalizeH="0" dirty="0" err="1" smtClean="0">
-                <a:ln>
-                  <a:noFill/>
-                </a:ln>
-                <a:solidFill>
-                  <a:srgbClr val="FFFF00"/>
-                </a:solidFill>
-                <a:effectLst/>
-                <a:latin typeface="Arial Black" panose="020B0A04020102020204" pitchFamily="34" charset="0"/>
-                <a:ea typeface="Times New Roman" panose="02020603050405020304" pitchFamily="18" charset="0"/>
-                <a:cs typeface="Calibri" panose="020F0502020204030204" pitchFamily="34" charset="0"/>
-              </a:rPr>
-              <a:t>sebarkan</a:t>
-            </a:r>
-            <a:r>
-              <a:rPr kumimoji="0" lang="en-ID" altLang="en-US" sz="5400" b="1" i="0" u="none" strike="noStrike" cap="none" normalizeH="0" dirty="0" smtClean="0">
-                <a:ln>
-                  <a:noFill/>
-                </a:ln>
-                <a:solidFill>
-                  <a:srgbClr val="FFFF00"/>
-                </a:solidFill>
-                <a:effectLst/>
-                <a:latin typeface="Arial Black" panose="020B0A04020102020204" pitchFamily="34" charset="0"/>
-                <a:ea typeface="Times New Roman" panose="02020603050405020304" pitchFamily="18" charset="0"/>
-                <a:cs typeface="Calibri" panose="020F0502020204030204" pitchFamily="34" charset="0"/>
-              </a:rPr>
-              <a:t> </a:t>
-            </a:r>
-            <a:r>
-              <a:rPr kumimoji="0" lang="en-ID" altLang="en-US" sz="5400" b="1" i="0" u="none" strike="noStrike" cap="none" normalizeH="0" dirty="0" err="1" smtClean="0">
-                <a:ln>
-                  <a:noFill/>
-                </a:ln>
-                <a:solidFill>
-                  <a:srgbClr val="FFFF00"/>
-                </a:solidFill>
-                <a:effectLst/>
-                <a:latin typeface="Arial Black" panose="020B0A04020102020204" pitchFamily="34" charset="0"/>
-                <a:ea typeface="Times New Roman" panose="02020603050405020304" pitchFamily="18" charset="0"/>
-                <a:cs typeface="Calibri" panose="020F0502020204030204" pitchFamily="34" charset="0"/>
-              </a:rPr>
-              <a:t>undangan</a:t>
-            </a:r>
-            <a:r>
-              <a:rPr kumimoji="0" lang="en-ID" altLang="en-US" sz="5400" b="1" i="0" u="none" strike="noStrike" cap="none" normalizeH="0" dirty="0" smtClean="0">
-                <a:ln>
-                  <a:noFill/>
-                </a:ln>
-                <a:solidFill>
-                  <a:srgbClr val="FFFF00"/>
-                </a:solidFill>
-                <a:effectLst/>
-                <a:latin typeface="Arial Black" panose="020B0A04020102020204" pitchFamily="34" charset="0"/>
-                <a:ea typeface="Times New Roman" panose="02020603050405020304" pitchFamily="18" charset="0"/>
-                <a:cs typeface="Calibri" panose="020F0502020204030204" pitchFamily="34" charset="0"/>
-              </a:rPr>
-              <a:t>.</a:t>
-            </a:r>
-          </a:p>
-          <a:p>
-            <a:pPr marL="0" marR="0" lvl="0" indent="0" algn="ctr" defTabSz="914400" rtl="0" eaLnBrk="0" fontAlgn="base" latinLnBrk="0" hangingPunct="0">
-              <a:lnSpc>
-                <a:spcPct val="100000"/>
-              </a:lnSpc>
-              <a:spcBef>
-                <a:spcPct val="0"/>
-              </a:spcBef>
-              <a:spcAft>
-                <a:spcPct val="0"/>
-              </a:spcAft>
-              <a:buClrTx/>
-              <a:buSzTx/>
-              <a:buFontTx/>
-              <a:buNone/>
-              <a:tabLst/>
-            </a:pPr>
-            <a:r>
-              <a:rPr lang="en-ID" altLang="en-US" sz="5400" b="1" baseline="0" dirty="0" smtClean="0">
-                <a:solidFill>
-                  <a:srgbClr val="FFFF00"/>
-                </a:solidFill>
-                <a:latin typeface="Arial Black" panose="020B0A04020102020204" pitchFamily="34" charset="0"/>
-                <a:ea typeface="Times New Roman" panose="02020603050405020304" pitchFamily="18" charset="0"/>
-                <a:cs typeface="Calibri" panose="020F0502020204030204" pitchFamily="34" charset="0"/>
-              </a:rPr>
-              <a:t>Yang</a:t>
-            </a:r>
-            <a:r>
-              <a:rPr lang="en-ID" altLang="en-US" sz="5400" b="1" dirty="0" smtClean="0">
-                <a:solidFill>
-                  <a:srgbClr val="FFFF00"/>
-                </a:solidFill>
-                <a:latin typeface="Arial Black" panose="020B0A04020102020204" pitchFamily="34" charset="0"/>
-                <a:ea typeface="Times New Roman" panose="02020603050405020304" pitchFamily="18" charset="0"/>
-                <a:cs typeface="Calibri" panose="020F0502020204030204" pitchFamily="34" charset="0"/>
-              </a:rPr>
-              <a:t> </a:t>
-            </a:r>
-            <a:r>
-              <a:rPr lang="en-ID" altLang="en-US" sz="5400" b="1" dirty="0" err="1" smtClean="0">
-                <a:solidFill>
-                  <a:srgbClr val="FFFF00"/>
-                </a:solidFill>
-                <a:latin typeface="Arial Black" panose="020B0A04020102020204" pitchFamily="34" charset="0"/>
-                <a:ea typeface="Times New Roman" panose="02020603050405020304" pitchFamily="18" charset="0"/>
-                <a:cs typeface="Calibri" panose="020F0502020204030204" pitchFamily="34" charset="0"/>
-              </a:rPr>
-              <a:t>serta</a:t>
-            </a:r>
-            <a:r>
-              <a:rPr lang="en-ID" altLang="en-US" sz="5400" b="1" dirty="0" smtClean="0">
-                <a:solidFill>
-                  <a:srgbClr val="FFFF00"/>
-                </a:solidFill>
-                <a:latin typeface="Arial Black" panose="020B0A04020102020204" pitchFamily="34" charset="0"/>
-                <a:ea typeface="Times New Roman" panose="02020603050405020304" pitchFamily="18" charset="0"/>
-                <a:cs typeface="Calibri" panose="020F0502020204030204" pitchFamily="34" charset="0"/>
-              </a:rPr>
-              <a:t> </a:t>
-            </a:r>
-            <a:r>
-              <a:rPr lang="en-ID" altLang="en-US" sz="5400" b="1" dirty="0" err="1" smtClean="0">
-                <a:solidFill>
-                  <a:srgbClr val="FFFF00"/>
-                </a:solidFill>
-                <a:latin typeface="Arial Black" panose="020B0A04020102020204" pitchFamily="34" charset="0"/>
-                <a:ea typeface="Times New Roman" panose="02020603050405020304" pitchFamily="18" charset="0"/>
-                <a:cs typeface="Calibri" panose="020F0502020204030204" pitchFamily="34" charset="0"/>
-              </a:rPr>
-              <a:t>dalam</a:t>
-            </a:r>
-            <a:r>
-              <a:rPr lang="en-ID" altLang="en-US" sz="5400" b="1" dirty="0" smtClean="0">
-                <a:solidFill>
-                  <a:srgbClr val="FFFF00"/>
-                </a:solidFill>
-                <a:latin typeface="Arial Black" panose="020B0A04020102020204" pitchFamily="34" charset="0"/>
-                <a:ea typeface="Times New Roman" panose="02020603050405020304" pitchFamily="18" charset="0"/>
-                <a:cs typeface="Calibri" panose="020F0502020204030204" pitchFamily="34" charset="0"/>
-              </a:rPr>
-              <a:t> </a:t>
-            </a:r>
-          </a:p>
-          <a:p>
-            <a:pPr marL="0" marR="0" lvl="0" indent="0" algn="ctr" defTabSz="914400" rtl="0" eaLnBrk="0" fontAlgn="base" latinLnBrk="0" hangingPunct="0">
-              <a:lnSpc>
-                <a:spcPct val="100000"/>
-              </a:lnSpc>
-              <a:spcBef>
-                <a:spcPct val="0"/>
-              </a:spcBef>
-              <a:spcAft>
-                <a:spcPct val="0"/>
-              </a:spcAft>
-              <a:buClrTx/>
-              <a:buSzTx/>
-              <a:buFontTx/>
-              <a:buNone/>
-              <a:tabLst/>
-            </a:pPr>
-            <a:r>
-              <a:rPr lang="en-ID" altLang="en-US" sz="5400" b="1" dirty="0" err="1" smtClean="0">
-                <a:solidFill>
-                  <a:srgbClr val="FFFF00"/>
-                </a:solidFill>
-                <a:latin typeface="Arial Black" panose="020B0A04020102020204" pitchFamily="34" charset="0"/>
-                <a:ea typeface="Times New Roman" panose="02020603050405020304" pitchFamily="18" charset="0"/>
-                <a:cs typeface="Calibri" panose="020F0502020204030204" pitchFamily="34" charset="0"/>
-              </a:rPr>
-              <a:t>perjamuan</a:t>
-            </a:r>
-            <a:r>
-              <a:rPr lang="en-ID" altLang="en-US" sz="5400" b="1" dirty="0" smtClean="0">
-                <a:solidFill>
-                  <a:srgbClr val="FFFF00"/>
-                </a:solidFill>
-                <a:latin typeface="Arial Black" panose="020B0A04020102020204" pitchFamily="34" charset="0"/>
-                <a:ea typeface="Times New Roman" panose="02020603050405020304" pitchFamily="18" charset="0"/>
-                <a:cs typeface="Calibri" panose="020F0502020204030204" pitchFamily="34" charset="0"/>
-              </a:rPr>
-              <a:t> </a:t>
-            </a:r>
-            <a:r>
-              <a:rPr lang="en-ID" altLang="en-US" sz="5400" b="1" dirty="0" err="1" smtClean="0">
-                <a:solidFill>
-                  <a:srgbClr val="FFFF00"/>
-                </a:solidFill>
-                <a:latin typeface="Arial Black" panose="020B0A04020102020204" pitchFamily="34" charset="0"/>
-                <a:ea typeface="Times New Roman" panose="02020603050405020304" pitchFamily="18" charset="0"/>
-                <a:cs typeface="Calibri" panose="020F0502020204030204" pitchFamily="34" charset="0"/>
-              </a:rPr>
-              <a:t>akan</a:t>
-            </a:r>
-            <a:r>
-              <a:rPr lang="en-ID" altLang="en-US" sz="5400" b="1" dirty="0" smtClean="0">
-                <a:solidFill>
-                  <a:srgbClr val="FFFF00"/>
-                </a:solidFill>
-                <a:latin typeface="Arial Black" panose="020B0A04020102020204" pitchFamily="34" charset="0"/>
-                <a:ea typeface="Times New Roman" panose="02020603050405020304" pitchFamily="18" charset="0"/>
-                <a:cs typeface="Calibri" panose="020F0502020204030204" pitchFamily="34" charset="0"/>
-              </a:rPr>
-              <a:t> </a:t>
-            </a:r>
-            <a:r>
-              <a:rPr lang="en-ID" altLang="en-US" sz="5400" b="1" dirty="0" err="1" smtClean="0">
-                <a:solidFill>
-                  <a:srgbClr val="FFFF00"/>
-                </a:solidFill>
-                <a:latin typeface="Arial Black" panose="020B0A04020102020204" pitchFamily="34" charset="0"/>
-                <a:ea typeface="Times New Roman" panose="02020603050405020304" pitchFamily="18" charset="0"/>
-                <a:cs typeface="Calibri" panose="020F0502020204030204" pitchFamily="34" charset="0"/>
-              </a:rPr>
-              <a:t>hidup</a:t>
-            </a:r>
-            <a:r>
-              <a:rPr lang="en-ID" altLang="en-US" sz="5400" b="1" dirty="0" smtClean="0">
-                <a:solidFill>
-                  <a:srgbClr val="FFFF00"/>
-                </a:solidFill>
-                <a:latin typeface="Arial Black" panose="020B0A04020102020204" pitchFamily="34" charset="0"/>
-                <a:ea typeface="Times New Roman" panose="02020603050405020304" pitchFamily="18" charset="0"/>
-                <a:cs typeface="Calibri" panose="020F0502020204030204" pitchFamily="34" charset="0"/>
-              </a:rPr>
-              <a:t> </a:t>
-            </a:r>
-            <a:r>
-              <a:rPr lang="en-ID" altLang="en-US" sz="5400" b="1" dirty="0" err="1" smtClean="0">
-                <a:solidFill>
-                  <a:srgbClr val="FFFF00"/>
-                </a:solidFill>
-                <a:latin typeface="Arial Black" panose="020B0A04020102020204" pitchFamily="34" charset="0"/>
-                <a:ea typeface="Times New Roman" panose="02020603050405020304" pitchFamily="18" charset="0"/>
-                <a:cs typeface="Calibri" panose="020F0502020204030204" pitchFamily="34" charset="0"/>
-              </a:rPr>
-              <a:t>kekal</a:t>
-            </a:r>
-            <a:r>
-              <a:rPr lang="en-ID" altLang="en-US" sz="5400" b="1" dirty="0" smtClean="0">
-                <a:solidFill>
-                  <a:srgbClr val="FFFF00"/>
-                </a:solidFill>
-                <a:latin typeface="Arial Black" panose="020B0A04020102020204" pitchFamily="34" charset="0"/>
-                <a:ea typeface="Times New Roman" panose="02020603050405020304" pitchFamily="18" charset="0"/>
-                <a:cs typeface="Calibri" panose="020F0502020204030204" pitchFamily="34" charset="0"/>
-              </a:rPr>
-              <a:t>.</a:t>
-            </a:r>
-            <a:endParaRPr kumimoji="0" lang="en-US" altLang="en-US" sz="5400" b="1" i="0" u="none" strike="noStrike" cap="none" normalizeH="0" baseline="0" dirty="0">
-              <a:ln>
-                <a:noFill/>
-              </a:ln>
-              <a:solidFill>
-                <a:srgbClr val="FFFF00"/>
-              </a:solidFill>
-              <a:effectLst/>
-              <a:latin typeface="Arial Black" panose="020B0A04020102020204" pitchFamily="34" charset="0"/>
-              <a:ea typeface="Times New Roman" panose="02020603050405020304" pitchFamily="18" charset="0"/>
-              <a:cs typeface="Calibri" panose="020F0502020204030204" pitchFamily="34" charset="0"/>
-            </a:endParaRPr>
-          </a:p>
-        </p:txBody>
-      </p:sp>
-    </p:spTree>
-    <p:extLst>
-      <p:ext uri="{BB962C8B-B14F-4D97-AF65-F5344CB8AC3E}">
-        <p14:creationId xmlns:p14="http://schemas.microsoft.com/office/powerpoint/2010/main" val="2184571407"/>
-      </p:ext>
-    </p:extLst>
-  </p:cSld>
-  <p:clrMapOvr>
-    <a:masterClrMapping/>
-  </p:clrMapOvr>
+  <p:timing>
+    <p:tnLst>
+      <p:par>
+        <p:cTn id="1" dur="indefinite" restart="never" nodeType="tmRoot"/>
+      </p:par>
+    </p:tnLst>
+  </p:timing>
 </p:sld>
 </file>
 
@@ -12625,6 +12592,13 @@
   <p:clrMapOvr>
     <a:masterClrMapping/>
   </p:clrMapOvr>
+  <p:timing>
+    <p:tnLst>
+      <p:par>
+        <p:cTn id="1" dur="indefinite" restart="never" nodeType="tmRoot"/>
+      </p:par>
+    </p:tnLst>
+  </p:timing>
 </p:sld>
 </file>
 
@@ -12650,7 +12624,7 @@
           <p:cNvPr id="10" name="Rectangle 4">
             <a:extLst>
               <a:ext uri="{FF2B5EF4-FFF2-40B4-BE49-F238E27FC236}">
-                <a16:creationId xmlns:a16="http://schemas.microsoft.com/office/drawing/2014/main" xmlns="" id="{51ECECB3-6A8C-4068-B947-90617D76FEE1}"/>
+                <a16:creationId xmlns="" xmlns:a16="http://schemas.microsoft.com/office/drawing/2014/main" id="{51ECECB3-6A8C-4068-B947-90617D76FEE1}"/>
               </a:ext>
             </a:extLst>
           </p:cNvPr>
@@ -12661,7 +12635,7 @@
         </p:nvSpPr>
         <p:spPr bwMode="auto">
           <a:xfrm>
-            <a:off x="0" y="1476550"/>
+            <a:off x="0" y="1476549"/>
             <a:ext cx="12192000" cy="3370153"/>
           </a:xfrm>
           <a:prstGeom prst="rect">
@@ -12739,7 +12713,7 @@
                 <a:ea typeface="Times New Roman" panose="02020603050405020304" pitchFamily="18" charset="0"/>
                 <a:cs typeface="Calibri" panose="020F0502020204030204" pitchFamily="34" charset="0"/>
               </a:rPr>
-              <a:t>Bagai</a:t>
+              <a:t>Pesta</a:t>
             </a:r>
             <a:r>
               <a:rPr kumimoji="0" lang="en-ID" altLang="en-US" sz="5400" b="1" i="0" u="none" strike="noStrike" cap="none" normalizeH="0" baseline="0" dirty="0" smtClean="0">
@@ -12754,7 +12728,7 @@
                 <a:ea typeface="Times New Roman" panose="02020603050405020304" pitchFamily="18" charset="0"/>
                 <a:cs typeface="Calibri" panose="020F0502020204030204" pitchFamily="34" charset="0"/>
               </a:rPr>
-              <a:t> yang </a:t>
+              <a:t> </a:t>
             </a:r>
             <a:r>
               <a:rPr kumimoji="0" lang="en-ID" altLang="en-US" sz="5400" b="1" i="0" u="none" strike="noStrike" cap="none" normalizeH="0" baseline="0" dirty="0" err="1" smtClean="0">
@@ -12769,7 +12743,7 @@
                 <a:ea typeface="Times New Roman" panose="02020603050405020304" pitchFamily="18" charset="0"/>
                 <a:cs typeface="Calibri" panose="020F0502020204030204" pitchFamily="34" charset="0"/>
               </a:rPr>
-              <a:t>Engkau</a:t>
+              <a:t>Kau</a:t>
             </a:r>
             <a:r>
               <a:rPr kumimoji="0" lang="en-ID" altLang="en-US" sz="5400" b="1" i="0" u="none" strike="noStrike" cap="none" normalizeH="0" baseline="0" dirty="0" smtClean="0">
@@ -12799,7 +12773,7 @@
                 <a:ea typeface="Times New Roman" panose="02020603050405020304" pitchFamily="18" charset="0"/>
                 <a:cs typeface="Calibri" panose="020F0502020204030204" pitchFamily="34" charset="0"/>
               </a:rPr>
-              <a:t>janjikan</a:t>
+              <a:t>selenggarakan</a:t>
             </a:r>
             <a:r>
               <a:rPr kumimoji="0" lang="en-ID" altLang="en-US" sz="5400" b="1" i="0" u="none" strike="noStrike" cap="none" normalizeH="0" baseline="0" dirty="0" smtClean="0">
@@ -12814,67 +12788,7 @@
                 <a:ea typeface="Times New Roman" panose="02020603050405020304" pitchFamily="18" charset="0"/>
                 <a:cs typeface="Calibri" panose="020F0502020204030204" pitchFamily="34" charset="0"/>
               </a:rPr>
-              <a:t> </a:t>
-            </a:r>
-            <a:r>
-              <a:rPr kumimoji="0" lang="en-ID" altLang="en-US" sz="5400" b="1" i="0" u="none" strike="noStrike" cap="none" normalizeH="0" baseline="0" dirty="0" err="1" smtClean="0">
-                <a:ln>
-                  <a:noFill/>
-                </a:ln>
-                <a:solidFill>
-                  <a:srgbClr val="FFFF00"/>
-                </a:solidFill>
-                <a:effectLst/>
-                <a:latin typeface="Arial Black" panose="020B0A04020102020204" pitchFamily="34" charset="0"/>
-                <a:ea typeface="Times New Roman" panose="02020603050405020304" pitchFamily="18" charset="0"/>
-                <a:cs typeface="Calibri" panose="020F0502020204030204" pitchFamily="34" charset="0"/>
-              </a:rPr>
-              <a:t>pada</a:t>
-            </a:r>
-            <a:r>
-              <a:rPr kumimoji="0" lang="en-ID" altLang="en-US" sz="5400" b="1" i="0" u="none" strike="noStrike" cap="none" normalizeH="0" baseline="0" dirty="0" smtClean="0">
-                <a:ln>
-                  <a:noFill/>
-                </a:ln>
-                <a:solidFill>
-                  <a:srgbClr val="FFFF00"/>
-                </a:solidFill>
-                <a:effectLst/>
-                <a:latin typeface="Arial Black" panose="020B0A04020102020204" pitchFamily="34" charset="0"/>
-                <a:ea typeface="Times New Roman" panose="02020603050405020304" pitchFamily="18" charset="0"/>
-                <a:cs typeface="Calibri" panose="020F0502020204030204" pitchFamily="34" charset="0"/>
-              </a:rPr>
-              <a:t> para </a:t>
-            </a:r>
-            <a:r>
-              <a:rPr kumimoji="0" lang="en-ID" altLang="en-US" sz="5400" b="1" i="0" u="none" strike="noStrike" cap="none" normalizeH="0" baseline="0" dirty="0" err="1" smtClean="0">
-                <a:ln>
-                  <a:noFill/>
-                </a:ln>
-                <a:solidFill>
-                  <a:srgbClr val="FFFF00"/>
-                </a:solidFill>
-                <a:effectLst/>
-                <a:latin typeface="Arial Black" panose="020B0A04020102020204" pitchFamily="34" charset="0"/>
-                <a:ea typeface="Times New Roman" panose="02020603050405020304" pitchFamily="18" charset="0"/>
-                <a:cs typeface="Calibri" panose="020F0502020204030204" pitchFamily="34" charset="0"/>
-              </a:rPr>
-              <a:t>rasul</a:t>
-            </a:r>
-            <a:r>
-              <a:rPr kumimoji="0" lang="en-ID" altLang="en-US" sz="5400" b="1" i="0" u="none" strike="noStrike" cap="none" normalizeH="0" baseline="0" dirty="0" smtClean="0">
-                <a:ln>
-                  <a:noFill/>
-                </a:ln>
-                <a:solidFill>
-                  <a:srgbClr val="FFFF00"/>
-                </a:solidFill>
-                <a:effectLst/>
-                <a:latin typeface="Arial Black" panose="020B0A04020102020204" pitchFamily="34" charset="0"/>
-                <a:ea typeface="Times New Roman" panose="02020603050405020304" pitchFamily="18" charset="0"/>
-                <a:cs typeface="Calibri" panose="020F0502020204030204" pitchFamily="34" charset="0"/>
-              </a:rPr>
-              <a:t> Mu.</a:t>
+              <a:t>, </a:t>
             </a:r>
           </a:p>
           <a:p>
@@ -12895,79 +12809,95 @@
               <a:tabLst/>
             </a:pPr>
             <a:r>
-              <a:rPr lang="en-ID" altLang="en-US" sz="5400" b="1" dirty="0" smtClean="0">
-                <a:solidFill>
-                  <a:srgbClr val="FFFF00"/>
-                </a:solidFill>
+              <a:rPr kumimoji="0" lang="en-ID" altLang="en-US" sz="5400" b="1" i="0" u="none" strike="noStrike" cap="none" normalizeH="0" baseline="0" dirty="0" err="1" smtClean="0">
+                <a:ln>
+                  <a:noFill/>
+                </a:ln>
+                <a:solidFill>
+                  <a:srgbClr val="FFFF00"/>
+                </a:solidFill>
+                <a:effectLst/>
                 <a:latin typeface="Arial Black" panose="020B0A04020102020204" pitchFamily="34" charset="0"/>
                 <a:ea typeface="Times New Roman" panose="02020603050405020304" pitchFamily="18" charset="0"/>
                 <a:cs typeface="Calibri" panose="020F0502020204030204" pitchFamily="34" charset="0"/>
               </a:rPr>
-              <a:t>Dan kami </a:t>
-            </a:r>
-            <a:r>
-              <a:rPr lang="en-ID" altLang="en-US" sz="5400" b="1" dirty="0" err="1" smtClean="0">
-                <a:solidFill>
-                  <a:srgbClr val="FFFF00"/>
-                </a:solidFill>
+              <a:t>Kau</a:t>
+            </a:r>
+            <a:r>
+              <a:rPr kumimoji="0" lang="en-ID" altLang="en-US" sz="5400" b="1" i="0" u="none" strike="noStrike" cap="none" normalizeH="0" dirty="0" smtClean="0">
+                <a:ln>
+                  <a:noFill/>
+                </a:ln>
+                <a:solidFill>
+                  <a:srgbClr val="FFFF00"/>
+                </a:solidFill>
+                <a:effectLst/>
                 <a:latin typeface="Arial Black" panose="020B0A04020102020204" pitchFamily="34" charset="0"/>
                 <a:ea typeface="Times New Roman" panose="02020603050405020304" pitchFamily="18" charset="0"/>
                 <a:cs typeface="Calibri" panose="020F0502020204030204" pitchFamily="34" charset="0"/>
               </a:rPr>
-              <a:t>percaya</a:t>
-            </a:r>
-            <a:r>
-              <a:rPr lang="en-ID" altLang="en-US" sz="5400" b="1" dirty="0" smtClean="0">
-                <a:solidFill>
-                  <a:srgbClr val="FFFF00"/>
-                </a:solidFill>
+              <a:t> </a:t>
+            </a:r>
+            <a:r>
+              <a:rPr kumimoji="0" lang="en-ID" altLang="en-US" sz="5400" b="1" i="0" u="none" strike="noStrike" cap="none" normalizeH="0" dirty="0" err="1" smtClean="0">
+                <a:ln>
+                  <a:noFill/>
+                </a:ln>
+                <a:solidFill>
+                  <a:srgbClr val="FFFF00"/>
+                </a:solidFill>
+                <a:effectLst/>
                 <a:latin typeface="Arial Black" panose="020B0A04020102020204" pitchFamily="34" charset="0"/>
                 <a:ea typeface="Times New Roman" panose="02020603050405020304" pitchFamily="18" charset="0"/>
                 <a:cs typeface="Calibri" panose="020F0502020204030204" pitchFamily="34" charset="0"/>
               </a:rPr>
+              <a:t>sebarkan</a:t>
+            </a:r>
+            <a:r>
+              <a:rPr kumimoji="0" lang="en-ID" altLang="en-US" sz="5400" b="1" i="0" u="none" strike="noStrike" cap="none" normalizeH="0" dirty="0" smtClean="0">
+                <a:ln>
+                  <a:noFill/>
+                </a:ln>
+                <a:solidFill>
+                  <a:srgbClr val="FFFF00"/>
+                </a:solidFill>
+                <a:effectLst/>
+                <a:latin typeface="Arial Black" panose="020B0A04020102020204" pitchFamily="34" charset="0"/>
+                <a:ea typeface="Times New Roman" panose="02020603050405020304" pitchFamily="18" charset="0"/>
+                <a:cs typeface="Calibri" panose="020F0502020204030204" pitchFamily="34" charset="0"/>
+              </a:rPr>
               <a:t> </a:t>
             </a:r>
             <a:r>
-              <a:rPr lang="en-ID" altLang="en-US" sz="5400" b="1" dirty="0" err="1" smtClean="0">
-                <a:solidFill>
-                  <a:srgbClr val="FFFF00"/>
-                </a:solidFill>
+              <a:rPr kumimoji="0" lang="en-ID" altLang="en-US" sz="5400" b="1" i="0" u="none" strike="noStrike" cap="none" normalizeH="0" dirty="0" err="1" smtClean="0">
+                <a:ln>
+                  <a:noFill/>
+                </a:ln>
+                <a:solidFill>
+                  <a:srgbClr val="FFFF00"/>
+                </a:solidFill>
+                <a:effectLst/>
                 <a:latin typeface="Arial Black" panose="020B0A04020102020204" pitchFamily="34" charset="0"/>
                 <a:ea typeface="Times New Roman" panose="02020603050405020304" pitchFamily="18" charset="0"/>
                 <a:cs typeface="Calibri" panose="020F0502020204030204" pitchFamily="34" charset="0"/>
               </a:rPr>
-              <a:t>tulus</a:t>
-            </a:r>
-            <a:r>
-              <a:rPr lang="en-ID" altLang="en-US" sz="5400" b="1" dirty="0" smtClean="0">
-                <a:solidFill>
-                  <a:srgbClr val="FFFF00"/>
-                </a:solidFill>
+              <a:t>undangan</a:t>
+            </a:r>
+            <a:r>
+              <a:rPr kumimoji="0" lang="en-ID" altLang="en-US" sz="5400" b="1" i="0" u="none" strike="noStrike" cap="none" normalizeH="0" dirty="0" smtClean="0">
+                <a:ln>
+                  <a:noFill/>
+                </a:ln>
+                <a:solidFill>
+                  <a:srgbClr val="FFFF00"/>
+                </a:solidFill>
+                <a:effectLst/>
                 <a:latin typeface="Arial Black" panose="020B0A04020102020204" pitchFamily="34" charset="0"/>
                 <a:ea typeface="Times New Roman" panose="02020603050405020304" pitchFamily="18" charset="0"/>
                 <a:cs typeface="Calibri" panose="020F0502020204030204" pitchFamily="34" charset="0"/>
               </a:rPr>
-              <a:t> </a:t>
-            </a:r>
-            <a:r>
-              <a:rPr lang="en-ID" altLang="en-US" sz="5400" b="1" dirty="0" err="1" smtClean="0">
-                <a:solidFill>
-                  <a:srgbClr val="FFFF00"/>
-                </a:solidFill>
-                <a:latin typeface="Arial Black" panose="020B0A04020102020204" pitchFamily="34" charset="0"/>
-                <a:ea typeface="Times New Roman" panose="02020603050405020304" pitchFamily="18" charset="0"/>
-                <a:cs typeface="Calibri" panose="020F0502020204030204" pitchFamily="34" charset="0"/>
-              </a:rPr>
-              <a:t>hati</a:t>
-            </a:r>
-            <a:endParaRPr lang="en-ID" altLang="en-US" sz="5400" b="1" dirty="0" smtClean="0">
-              <a:solidFill>
-                <a:srgbClr val="FFFF00"/>
-              </a:solidFill>
-              <a:latin typeface="Arial Black" panose="020B0A04020102020204" pitchFamily="34" charset="0"/>
-              <a:ea typeface="Times New Roman" panose="02020603050405020304" pitchFamily="18" charset="0"/>
-              <a:cs typeface="Calibri" panose="020F0502020204030204" pitchFamily="34" charset="0"/>
-            </a:endParaRPr>
+              <a:t>.</a:t>
+            </a:r>
           </a:p>
           <a:p>
             <a:pPr marL="0" marR="0" lvl="0" indent="0" algn="ctr" defTabSz="914400" rtl="0" eaLnBrk="0" fontAlgn="base" latinLnBrk="0" hangingPunct="0">
@@ -12987,29 +12917,21 @@
               <a:tabLst/>
             </a:pPr>
             <a:r>
-              <a:rPr kumimoji="0" lang="en-ID" altLang="en-US" sz="5400" b="1" i="0" u="none" strike="noStrike" cap="none" normalizeH="0" baseline="0" dirty="0" err="1" smtClean="0">
-                <a:ln>
-                  <a:noFill/>
-                </a:ln>
-                <a:solidFill>
-                  <a:srgbClr val="FFFF00"/>
-                </a:solidFill>
-                <a:effectLst/>
+              <a:rPr lang="en-ID" altLang="en-US" sz="5400" b="1" baseline="0" dirty="0" smtClean="0">
+                <a:solidFill>
+                  <a:srgbClr val="FFFF00"/>
+                </a:solidFill>
                 <a:latin typeface="Arial Black" panose="020B0A04020102020204" pitchFamily="34" charset="0"/>
                 <a:ea typeface="Times New Roman" panose="02020603050405020304" pitchFamily="18" charset="0"/>
                 <a:cs typeface="Calibri" panose="020F0502020204030204" pitchFamily="34" charset="0"/>
               </a:rPr>
-              <a:t>Dikau</a:t>
-            </a:r>
-            <a:r>
-              <a:rPr kumimoji="0" lang="en-ID" altLang="en-US" sz="5400" b="1" i="0" u="none" strike="noStrike" cap="none" normalizeH="0" dirty="0" smtClean="0">
-                <a:ln>
-                  <a:noFill/>
-                </a:ln>
-                <a:solidFill>
-                  <a:srgbClr val="FFFF00"/>
-                </a:solidFill>
-                <a:effectLst/>
+              <a:t>Yang</a:t>
+            </a:r>
+            <a:r>
+              <a:rPr lang="en-ID" altLang="en-US" sz="5400" b="1" dirty="0" smtClean="0">
+                <a:solidFill>
+                  <a:srgbClr val="FFFF00"/>
+                </a:solidFill>
                 <a:latin typeface="Arial Black" panose="020B0A04020102020204" pitchFamily="34" charset="0"/>
                 <a:ea typeface="Times New Roman" panose="02020603050405020304" pitchFamily="18" charset="0"/>
                 <a:cs typeface="Calibri" panose="020F0502020204030204" pitchFamily="34" charset="0"/>
@@ -13017,29 +12939,21 @@
               <a:t> </a:t>
             </a:r>
             <a:r>
-              <a:rPr kumimoji="0" lang="en-ID" altLang="en-US" sz="5400" b="1" i="0" u="none" strike="noStrike" cap="none" normalizeH="0" dirty="0" err="1" smtClean="0">
-                <a:ln>
-                  <a:noFill/>
-                </a:ln>
-                <a:solidFill>
-                  <a:srgbClr val="FFFF00"/>
-                </a:solidFill>
-                <a:effectLst/>
+              <a:rPr lang="en-ID" altLang="en-US" sz="5400" b="1" dirty="0" err="1" smtClean="0">
+                <a:solidFill>
+                  <a:srgbClr val="FFFF00"/>
+                </a:solidFill>
                 <a:latin typeface="Arial Black" panose="020B0A04020102020204" pitchFamily="34" charset="0"/>
                 <a:ea typeface="Times New Roman" panose="02020603050405020304" pitchFamily="18" charset="0"/>
                 <a:cs typeface="Calibri" panose="020F0502020204030204" pitchFamily="34" charset="0"/>
               </a:rPr>
-              <a:t>tak</a:t>
-            </a:r>
-            <a:r>
-              <a:rPr kumimoji="0" lang="en-ID" altLang="en-US" sz="5400" b="1" i="0" u="none" strike="noStrike" cap="none" normalizeH="0" dirty="0" smtClean="0">
-                <a:ln>
-                  <a:noFill/>
-                </a:ln>
-                <a:solidFill>
-                  <a:srgbClr val="FFFF00"/>
-                </a:solidFill>
-                <a:effectLst/>
+              <a:t>serta</a:t>
+            </a:r>
+            <a:r>
+              <a:rPr lang="en-ID" altLang="en-US" sz="5400" b="1" dirty="0" smtClean="0">
+                <a:solidFill>
+                  <a:srgbClr val="FFFF00"/>
+                </a:solidFill>
                 <a:latin typeface="Arial Black" panose="020B0A04020102020204" pitchFamily="34" charset="0"/>
                 <a:ea typeface="Times New Roman" panose="02020603050405020304" pitchFamily="18" charset="0"/>
                 <a:cs typeface="Calibri" panose="020F0502020204030204" pitchFamily="34" charset="0"/>
@@ -13047,59 +12961,127 @@
               <a:t> </a:t>
             </a:r>
             <a:r>
-              <a:rPr kumimoji="0" lang="en-ID" altLang="en-US" sz="5400" b="1" i="0" u="none" strike="noStrike" cap="none" normalizeH="0" dirty="0" err="1" smtClean="0">
-                <a:ln>
-                  <a:noFill/>
-                </a:ln>
-                <a:solidFill>
-                  <a:srgbClr val="FFFF00"/>
-                </a:solidFill>
-                <a:effectLst/>
+              <a:rPr lang="en-ID" altLang="en-US" sz="5400" b="1" dirty="0" err="1" smtClean="0">
+                <a:solidFill>
+                  <a:srgbClr val="FFFF00"/>
+                </a:solidFill>
                 <a:latin typeface="Arial Black" panose="020B0A04020102020204" pitchFamily="34" charset="0"/>
                 <a:ea typeface="Times New Roman" panose="02020603050405020304" pitchFamily="18" charset="0"/>
                 <a:cs typeface="Calibri" panose="020F0502020204030204" pitchFamily="34" charset="0"/>
               </a:rPr>
-              <a:t>ingkar</a:t>
-            </a:r>
-            <a:r>
-              <a:rPr kumimoji="0" lang="en-ID" altLang="en-US" sz="5400" b="1" i="0" u="none" strike="noStrike" cap="none" normalizeH="0" dirty="0" smtClean="0">
-                <a:ln>
-                  <a:noFill/>
-                </a:ln>
-                <a:solidFill>
-                  <a:srgbClr val="FFFF00"/>
-                </a:solidFill>
-                <a:effectLst/>
+              <a:t>dalam</a:t>
+            </a:r>
+            <a:r>
+              <a:rPr lang="en-ID" altLang="en-US" sz="5400" b="1" dirty="0" smtClean="0">
+                <a:solidFill>
+                  <a:srgbClr val="FFFF00"/>
+                </a:solidFill>
                 <a:latin typeface="Arial Black" panose="020B0A04020102020204" pitchFamily="34" charset="0"/>
                 <a:ea typeface="Times New Roman" panose="02020603050405020304" pitchFamily="18" charset="0"/>
                 <a:cs typeface="Calibri" panose="020F0502020204030204" pitchFamily="34" charset="0"/>
               </a:rPr>
               <a:t> </a:t>
             </a:r>
-            <a:r>
-              <a:rPr kumimoji="0" lang="en-ID" altLang="en-US" sz="5400" b="1" i="0" u="none" strike="noStrike" cap="none" normalizeH="0" dirty="0" err="1" smtClean="0">
-                <a:ln>
-                  <a:noFill/>
-                </a:ln>
-                <a:solidFill>
-                  <a:srgbClr val="FFFF00"/>
-                </a:solidFill>
-                <a:effectLst/>
+          </a:p>
+          <a:p>
+            <a:pPr marL="0" marR="0" lvl="0" indent="0" algn="ctr" defTabSz="914400" rtl="0" eaLnBrk="0" fontAlgn="base" latinLnBrk="0" hangingPunct="0">
+              <a:lnSpc>
+                <a:spcPct val="100000"/>
+              </a:lnSpc>
+              <a:spcBef>
+                <a:spcPct val="0"/>
+              </a:spcBef>
+              <a:spcAft>
+                <a:spcPct val="0"/>
+              </a:spcAft>
+              <a:buClrTx/>
+              <a:buSzTx/>
+              <a:buFontTx/>
+              <a:buNone/>
+              <a:tabLst/>
+            </a:pPr>
+            <a:r>
+              <a:rPr lang="en-ID" altLang="en-US" sz="5400" b="1" dirty="0" err="1" smtClean="0">
+                <a:solidFill>
+                  <a:srgbClr val="FFFF00"/>
+                </a:solidFill>
                 <a:latin typeface="Arial Black" panose="020B0A04020102020204" pitchFamily="34" charset="0"/>
                 <a:ea typeface="Times New Roman" panose="02020603050405020304" pitchFamily="18" charset="0"/>
                 <a:cs typeface="Calibri" panose="020F0502020204030204" pitchFamily="34" charset="0"/>
               </a:rPr>
-              <a:t>janji</a:t>
-            </a:r>
-            <a:r>
-              <a:rPr kumimoji="0" lang="en-ID" altLang="en-US" sz="5400" b="1" i="0" u="none" strike="noStrike" cap="none" normalizeH="0" dirty="0" smtClean="0">
-                <a:ln>
-                  <a:noFill/>
-                </a:ln>
-                <a:solidFill>
-                  <a:srgbClr val="FFFF00"/>
-                </a:solidFill>
-                <a:effectLst/>
+              <a:t>perjamuan</a:t>
+            </a:r>
+            <a:r>
+              <a:rPr lang="en-ID" altLang="en-US" sz="5400" b="1" dirty="0" smtClean="0">
+                <a:solidFill>
+                  <a:srgbClr val="FFFF00"/>
+                </a:solidFill>
+                <a:latin typeface="Arial Black" panose="020B0A04020102020204" pitchFamily="34" charset="0"/>
+                <a:ea typeface="Times New Roman" panose="02020603050405020304" pitchFamily="18" charset="0"/>
+                <a:cs typeface="Calibri" panose="020F0502020204030204" pitchFamily="34" charset="0"/>
+              </a:rPr>
+              <a:t> </a:t>
+            </a:r>
+            <a:r>
+              <a:rPr lang="en-ID" altLang="en-US" sz="5400" b="1" dirty="0" err="1" smtClean="0">
+                <a:solidFill>
+                  <a:srgbClr val="FFFF00"/>
+                </a:solidFill>
+                <a:latin typeface="Arial Black" panose="020B0A04020102020204" pitchFamily="34" charset="0"/>
+                <a:ea typeface="Times New Roman" panose="02020603050405020304" pitchFamily="18" charset="0"/>
+                <a:cs typeface="Calibri" panose="020F0502020204030204" pitchFamily="34" charset="0"/>
+              </a:rPr>
+              <a:t>akan</a:t>
+            </a:r>
+            <a:r>
+              <a:rPr lang="en-ID" altLang="en-US" sz="5400" b="1" dirty="0" smtClean="0">
+                <a:solidFill>
+                  <a:srgbClr val="FFFF00"/>
+                </a:solidFill>
+                <a:latin typeface="Arial Black" panose="020B0A04020102020204" pitchFamily="34" charset="0"/>
+                <a:ea typeface="Times New Roman" panose="02020603050405020304" pitchFamily="18" charset="0"/>
+                <a:cs typeface="Calibri" panose="020F0502020204030204" pitchFamily="34" charset="0"/>
+              </a:rPr>
+              <a:t> </a:t>
+            </a:r>
+            <a:r>
+              <a:rPr lang="en-ID" altLang="en-US" sz="5400" b="1" dirty="0" err="1" smtClean="0">
+                <a:solidFill>
+                  <a:srgbClr val="FFFF00"/>
+                </a:solidFill>
+                <a:latin typeface="Arial Black" panose="020B0A04020102020204" pitchFamily="34" charset="0"/>
+                <a:ea typeface="Times New Roman" panose="02020603050405020304" pitchFamily="18" charset="0"/>
+                <a:cs typeface="Calibri" panose="020F0502020204030204" pitchFamily="34" charset="0"/>
+              </a:rPr>
+              <a:t>hidup</a:t>
+            </a:r>
+            <a:r>
+              <a:rPr lang="en-ID" altLang="en-US" sz="5400" b="1" dirty="0" smtClean="0">
+                <a:solidFill>
+                  <a:srgbClr val="FFFF00"/>
+                </a:solidFill>
+                <a:latin typeface="Arial Black" panose="020B0A04020102020204" pitchFamily="34" charset="0"/>
+                <a:ea typeface="Times New Roman" panose="02020603050405020304" pitchFamily="18" charset="0"/>
+                <a:cs typeface="Calibri" panose="020F0502020204030204" pitchFamily="34" charset="0"/>
+              </a:rPr>
+              <a:t> </a:t>
+            </a:r>
+            <a:r>
+              <a:rPr lang="en-ID" altLang="en-US" sz="5400" b="1" dirty="0" err="1" smtClean="0">
+                <a:solidFill>
+                  <a:srgbClr val="FFFF00"/>
+                </a:solidFill>
+                <a:latin typeface="Arial Black" panose="020B0A04020102020204" pitchFamily="34" charset="0"/>
+                <a:ea typeface="Times New Roman" panose="02020603050405020304" pitchFamily="18" charset="0"/>
+                <a:cs typeface="Calibri" panose="020F0502020204030204" pitchFamily="34" charset="0"/>
+              </a:rPr>
+              <a:t>kekal</a:t>
+            </a:r>
+            <a:r>
+              <a:rPr lang="en-ID" altLang="en-US" sz="5400" b="1" dirty="0" smtClean="0">
+                <a:solidFill>
+                  <a:srgbClr val="FFFF00"/>
+                </a:solidFill>
                 <a:latin typeface="Arial Black" panose="020B0A04020102020204" pitchFamily="34" charset="0"/>
                 <a:ea typeface="Times New Roman" panose="02020603050405020304" pitchFamily="18" charset="0"/>
                 <a:cs typeface="Calibri" panose="020F0502020204030204" pitchFamily="34" charset="0"/>
@@ -13124,13 +13106,20 @@
     </p:spTree>
     <p:extLst>
       <p:ext uri="{BB962C8B-B14F-4D97-AF65-F5344CB8AC3E}">
-        <p14:creationId xmlns:p14="http://schemas.microsoft.com/office/powerpoint/2010/main" val="4214848859"/>
+        <p14:creationId xmlns:p14="http://schemas.microsoft.com/office/powerpoint/2010/main" val="2184571407"/>
       </p:ext>
     </p:extLst>
   </p:cSld>
   <p:clrMapOvr>
     <a:masterClrMapping/>
   </p:clrMapOvr>
+  <p:timing>
+    <p:tnLst>
+      <p:par>
+        <p:cTn id="1" dur="indefinite" restart="never" nodeType="tmRoot"/>
+      </p:par>
+    </p:tnLst>
+  </p:timing>
 </p:sld>
 </file>
 
@@ -13156,7 +13145,7 @@
           <p:cNvPr id="10" name="Rectangle 4">
             <a:extLst>
               <a:ext uri="{FF2B5EF4-FFF2-40B4-BE49-F238E27FC236}">
-                <a16:creationId xmlns:a16="http://schemas.microsoft.com/office/drawing/2014/main" xmlns="" id="{51ECECB3-6A8C-4068-B947-90617D76FEE1}"/>
+                <a16:creationId xmlns="" xmlns:a16="http://schemas.microsoft.com/office/drawing/2014/main" id="{51ECECB3-6A8C-4068-B947-90617D76FEE1}"/>
               </a:ext>
             </a:extLst>
           </p:cNvPr>
@@ -13167,7 +13156,7 @@
         </p:nvSpPr>
         <p:spPr bwMode="auto">
           <a:xfrm>
-            <a:off x="0" y="1476551"/>
+            <a:off x="0" y="1476550"/>
             <a:ext cx="12192000" cy="3370153"/>
           </a:xfrm>
           <a:prstGeom prst="rect">
@@ -13233,6 +13222,21 @@
               <a:tabLst/>
             </a:pPr>
             <a:r>
+              <a:rPr kumimoji="0" lang="en-ID" altLang="en-US" sz="5400" b="1" i="0" u="none" strike="noStrike" cap="none" normalizeH="0" baseline="0" dirty="0" err="1" smtClean="0">
+                <a:ln>
+                  <a:noFill/>
+                </a:ln>
+                <a:solidFill>
+                  <a:srgbClr val="FFFF00"/>
+                </a:solidFill>
+                <a:effectLst/>
+                <a:latin typeface="Arial Black" panose="020B0A04020102020204" pitchFamily="34" charset="0"/>
+                <a:ea typeface="Times New Roman" panose="02020603050405020304" pitchFamily="18" charset="0"/>
+                <a:cs typeface="Calibri" panose="020F0502020204030204" pitchFamily="34" charset="0"/>
+              </a:rPr>
+              <a:t>Bagai</a:t>
+            </a:r>
+            <a:r>
               <a:rPr kumimoji="0" lang="en-ID" altLang="en-US" sz="5400" b="1" i="0" u="none" strike="noStrike" cap="none" normalizeH="0" baseline="0" dirty="0" smtClean="0">
                 <a:ln>
                   <a:noFill/>
@@ -13245,7 +13249,7 @@
                 <a:ea typeface="Times New Roman" panose="02020603050405020304" pitchFamily="18" charset="0"/>
                 <a:cs typeface="Calibri" panose="020F0502020204030204" pitchFamily="34" charset="0"/>
               </a:rPr>
-              <a:t>Kala </a:t>
+              <a:t> yang </a:t>
             </a:r>
             <a:r>
               <a:rPr kumimoji="0" lang="en-ID" altLang="en-US" sz="5400" b="1" i="0" u="none" strike="noStrike" cap="none" normalizeH="0" baseline="0" dirty="0" err="1" smtClean="0">
@@ -13260,10 +13264,10 @@
                 <a:ea typeface="Times New Roman" panose="02020603050405020304" pitchFamily="18" charset="0"/>
                 <a:cs typeface="Calibri" panose="020F0502020204030204" pitchFamily="34" charset="0"/>
               </a:rPr>
-              <a:t>Kau</a:t>
-            </a:r>
-            <a:r>
-              <a:rPr kumimoji="0" lang="en-ID" altLang="en-US" sz="5400" b="1" i="0" u="none" strike="noStrike" cap="none" normalizeH="0" dirty="0" smtClean="0">
+              <a:t>Engkau</a:t>
+            </a:r>
+            <a:r>
+              <a:rPr kumimoji="0" lang="en-ID" altLang="en-US" sz="5400" b="1" i="0" u="none" strike="noStrike" cap="none" normalizeH="0" baseline="0" dirty="0" smtClean="0">
                 <a:ln>
                   <a:noFill/>
                 </a:ln>
@@ -13278,7 +13282,7 @@
               <a:t> </a:t>
             </a:r>
             <a:r>
-              <a:rPr kumimoji="0" lang="en-ID" altLang="en-US" sz="5400" b="1" i="0" u="none" strike="noStrike" cap="none" normalizeH="0" dirty="0" err="1" smtClean="0">
+              <a:rPr kumimoji="0" lang="en-ID" altLang="en-US" sz="5400" b="1" i="0" u="none" strike="noStrike" cap="none" normalizeH="0" baseline="0" dirty="0" err="1" smtClean="0">
                 <a:ln>
                   <a:noFill/>
                 </a:ln>
@@ -13290,10 +13294,10 @@
                 <a:ea typeface="Times New Roman" panose="02020603050405020304" pitchFamily="18" charset="0"/>
                 <a:cs typeface="Calibri" panose="020F0502020204030204" pitchFamily="34" charset="0"/>
               </a:rPr>
-              <a:t>serahkan</a:t>
-            </a:r>
-            <a:r>
-              <a:rPr kumimoji="0" lang="en-ID" altLang="en-US" sz="5400" b="1" i="0" u="none" strike="noStrike" cap="none" normalizeH="0" dirty="0" smtClean="0">
+              <a:t>janjikan</a:t>
+            </a:r>
+            <a:r>
+              <a:rPr kumimoji="0" lang="en-ID" altLang="en-US" sz="5400" b="1" i="0" u="none" strike="noStrike" cap="none" normalizeH="0" baseline="0" dirty="0" smtClean="0">
                 <a:ln>
                   <a:noFill/>
                 </a:ln>
@@ -13305,7 +13309,67 @@
                 <a:ea typeface="Times New Roman" panose="02020603050405020304" pitchFamily="18" charset="0"/>
                 <a:cs typeface="Calibri" panose="020F0502020204030204" pitchFamily="34" charset="0"/>
               </a:rPr>
-              <a:t> roti </a:t>
+              <a:t> </a:t>
+            </a:r>
+            <a:r>
+              <a:rPr kumimoji="0" lang="en-ID" altLang="en-US" sz="5400" b="1" i="0" u="none" strike="noStrike" cap="none" normalizeH="0" baseline="0" dirty="0" err="1" smtClean="0">
+                <a:ln>
+                  <a:noFill/>
+                </a:ln>
+                <a:solidFill>
+                  <a:srgbClr val="FFFF00"/>
+                </a:solidFill>
+                <a:effectLst/>
+                <a:latin typeface="Arial Black" panose="020B0A04020102020204" pitchFamily="34" charset="0"/>
+                <a:ea typeface="Times New Roman" panose="02020603050405020304" pitchFamily="18" charset="0"/>
+                <a:cs typeface="Calibri" panose="020F0502020204030204" pitchFamily="34" charset="0"/>
+              </a:rPr>
+              <a:t>pada</a:t>
+            </a:r>
+            <a:r>
+              <a:rPr kumimoji="0" lang="en-ID" altLang="en-US" sz="5400" b="1" i="0" u="none" strike="noStrike" cap="none" normalizeH="0" baseline="0" dirty="0" smtClean="0">
+                <a:ln>
+                  <a:noFill/>
+                </a:ln>
+                <a:solidFill>
+                  <a:srgbClr val="FFFF00"/>
+                </a:solidFill>
+                <a:effectLst/>
+                <a:latin typeface="Arial Black" panose="020B0A04020102020204" pitchFamily="34" charset="0"/>
+                <a:ea typeface="Times New Roman" panose="02020603050405020304" pitchFamily="18" charset="0"/>
+                <a:cs typeface="Calibri" panose="020F0502020204030204" pitchFamily="34" charset="0"/>
+              </a:rPr>
+              <a:t> para </a:t>
+            </a:r>
+            <a:r>
+              <a:rPr kumimoji="0" lang="en-ID" altLang="en-US" sz="5400" b="1" i="0" u="none" strike="noStrike" cap="none" normalizeH="0" baseline="0" dirty="0" err="1" smtClean="0">
+                <a:ln>
+                  <a:noFill/>
+                </a:ln>
+                <a:solidFill>
+                  <a:srgbClr val="FFFF00"/>
+                </a:solidFill>
+                <a:effectLst/>
+                <a:latin typeface="Arial Black" panose="020B0A04020102020204" pitchFamily="34" charset="0"/>
+                <a:ea typeface="Times New Roman" panose="02020603050405020304" pitchFamily="18" charset="0"/>
+                <a:cs typeface="Calibri" panose="020F0502020204030204" pitchFamily="34" charset="0"/>
+              </a:rPr>
+              <a:t>rasul</a:t>
+            </a:r>
+            <a:r>
+              <a:rPr kumimoji="0" lang="en-ID" altLang="en-US" sz="5400" b="1" i="0" u="none" strike="noStrike" cap="none" normalizeH="0" baseline="0" dirty="0" smtClean="0">
+                <a:ln>
+                  <a:noFill/>
+                </a:ln>
+                <a:solidFill>
+                  <a:srgbClr val="FFFF00"/>
+                </a:solidFill>
+                <a:effectLst/>
+                <a:latin typeface="Arial Black" panose="020B0A04020102020204" pitchFamily="34" charset="0"/>
+                <a:ea typeface="Times New Roman" panose="02020603050405020304" pitchFamily="18" charset="0"/>
+                <a:cs typeface="Calibri" panose="020F0502020204030204" pitchFamily="34" charset="0"/>
+              </a:rPr>
+              <a:t> Mu.</a:t>
             </a:r>
           </a:p>
           <a:p>
@@ -13326,65 +13390,79 @@
               <a:tabLst/>
             </a:pPr>
             <a:r>
-              <a:rPr kumimoji="0" lang="en-ID" altLang="en-US" sz="5400" b="1" i="0" u="none" strike="noStrike" cap="none" normalizeH="0" dirty="0" err="1" smtClean="0">
-                <a:ln>
-                  <a:noFill/>
-                </a:ln>
-                <a:solidFill>
-                  <a:srgbClr val="FFFF00"/>
-                </a:solidFill>
-                <a:effectLst/>
+              <a:rPr lang="en-ID" altLang="en-US" sz="5400" b="1" dirty="0" smtClean="0">
+                <a:solidFill>
+                  <a:srgbClr val="FFFF00"/>
+                </a:solidFill>
                 <a:latin typeface="Arial Black" panose="020B0A04020102020204" pitchFamily="34" charset="0"/>
                 <a:ea typeface="Times New Roman" panose="02020603050405020304" pitchFamily="18" charset="0"/>
                 <a:cs typeface="Calibri" panose="020F0502020204030204" pitchFamily="34" charset="0"/>
               </a:rPr>
-              <a:t>pada</a:t>
-            </a:r>
-            <a:r>
-              <a:rPr kumimoji="0" lang="en-ID" altLang="en-US" sz="5400" b="1" i="0" u="none" strike="noStrike" cap="none" normalizeH="0" dirty="0" smtClean="0">
-                <a:ln>
-                  <a:noFill/>
-                </a:ln>
-                <a:solidFill>
-                  <a:srgbClr val="FFFF00"/>
-                </a:solidFill>
-                <a:effectLst/>
+              <a:t>Dan kami </a:t>
+            </a:r>
+            <a:r>
+              <a:rPr lang="en-ID" altLang="en-US" sz="5400" b="1" dirty="0" err="1" smtClean="0">
+                <a:solidFill>
+                  <a:srgbClr val="FFFF00"/>
+                </a:solidFill>
                 <a:latin typeface="Arial Black" panose="020B0A04020102020204" pitchFamily="34" charset="0"/>
                 <a:ea typeface="Times New Roman" panose="02020603050405020304" pitchFamily="18" charset="0"/>
                 <a:cs typeface="Calibri" panose="020F0502020204030204" pitchFamily="34" charset="0"/>
               </a:rPr>
-              <a:t> para </a:t>
-            </a:r>
-            <a:r>
-              <a:rPr kumimoji="0" lang="en-ID" altLang="en-US" sz="5400" b="1" i="0" u="none" strike="noStrike" cap="none" normalizeH="0" dirty="0" err="1" smtClean="0">
-                <a:ln>
-                  <a:noFill/>
-                </a:ln>
-                <a:solidFill>
-                  <a:srgbClr val="FFFF00"/>
-                </a:solidFill>
-                <a:effectLst/>
+              <a:t>percaya</a:t>
+            </a:r>
+            <a:r>
+              <a:rPr lang="en-ID" altLang="en-US" sz="5400" b="1" dirty="0" smtClean="0">
+                <a:solidFill>
+                  <a:srgbClr val="FFFF00"/>
+                </a:solidFill>
                 <a:latin typeface="Arial Black" panose="020B0A04020102020204" pitchFamily="34" charset="0"/>
                 <a:ea typeface="Times New Roman" panose="02020603050405020304" pitchFamily="18" charset="0"/>
                 <a:cs typeface="Calibri" panose="020F0502020204030204" pitchFamily="34" charset="0"/>
               </a:rPr>
-              <a:t>murid</a:t>
-            </a:r>
-            <a:r>
-              <a:rPr kumimoji="0" lang="en-ID" altLang="en-US" sz="5400" b="1" i="0" u="none" strike="noStrike" cap="none" normalizeH="0" dirty="0" smtClean="0">
-                <a:ln>
-                  <a:noFill/>
-                </a:ln>
-                <a:solidFill>
-                  <a:srgbClr val="FFFF00"/>
-                </a:solidFill>
-                <a:effectLst/>
+              <a:t> </a:t>
+            </a:r>
+            <a:r>
+              <a:rPr lang="en-ID" altLang="en-US" sz="5400" b="1" dirty="0" err="1" smtClean="0">
+                <a:solidFill>
+                  <a:srgbClr val="FFFF00"/>
+                </a:solidFill>
                 <a:latin typeface="Arial Black" panose="020B0A04020102020204" pitchFamily="34" charset="0"/>
                 <a:ea typeface="Times New Roman" panose="02020603050405020304" pitchFamily="18" charset="0"/>
                 <a:cs typeface="Calibri" panose="020F0502020204030204" pitchFamily="34" charset="0"/>
               </a:rPr>
-              <a:t> Mu, </a:t>
-            </a:r>
+              <a:t>tulus</a:t>
+            </a:r>
+            <a:r>
+              <a:rPr lang="en-ID" altLang="en-US" sz="5400" b="1" dirty="0" smtClean="0">
+                <a:solidFill>
+                  <a:srgbClr val="FFFF00"/>
+                </a:solidFill>
+                <a:latin typeface="Arial Black" panose="020B0A04020102020204" pitchFamily="34" charset="0"/>
+                <a:ea typeface="Times New Roman" panose="02020603050405020304" pitchFamily="18" charset="0"/>
+                <a:cs typeface="Calibri" panose="020F0502020204030204" pitchFamily="34" charset="0"/>
+              </a:rPr>
+              <a:t> </a:t>
+            </a:r>
+            <a:r>
+              <a:rPr lang="en-ID" altLang="en-US" sz="5400" b="1" dirty="0" err="1" smtClean="0">
+                <a:solidFill>
+                  <a:srgbClr val="FFFF00"/>
+                </a:solidFill>
+                <a:latin typeface="Arial Black" panose="020B0A04020102020204" pitchFamily="34" charset="0"/>
+                <a:ea typeface="Times New Roman" panose="02020603050405020304" pitchFamily="18" charset="0"/>
+                <a:cs typeface="Calibri" panose="020F0502020204030204" pitchFamily="34" charset="0"/>
+              </a:rPr>
+              <a:t>hati</a:t>
+            </a:r>
+            <a:endParaRPr lang="en-ID" altLang="en-US" sz="5400" b="1" dirty="0" smtClean="0">
+              <a:solidFill>
+                <a:srgbClr val="FFFF00"/>
+              </a:solidFill>
+              <a:latin typeface="Arial Black" panose="020B0A04020102020204" pitchFamily="34" charset="0"/>
+              <a:ea typeface="Times New Roman" panose="02020603050405020304" pitchFamily="18" charset="0"/>
+              <a:cs typeface="Calibri" panose="020F0502020204030204" pitchFamily="34" charset="0"/>
+            </a:endParaRPr>
           </a:p>
           <a:p>
             <a:pPr marL="0" marR="0" lvl="0" indent="0" algn="ctr" defTabSz="914400" rtl="0" eaLnBrk="0" fontAlgn="base" latinLnBrk="0" hangingPunct="0">
@@ -13404,6 +13482,36 @@
               <a:tabLst/>
             </a:pPr>
             <a:r>
+              <a:rPr kumimoji="0" lang="en-ID" altLang="en-US" sz="5400" b="1" i="0" u="none" strike="noStrike" cap="none" normalizeH="0" baseline="0" dirty="0" err="1" smtClean="0">
+                <a:ln>
+                  <a:noFill/>
+                </a:ln>
+                <a:solidFill>
+                  <a:srgbClr val="FFFF00"/>
+                </a:solidFill>
+                <a:effectLst/>
+                <a:latin typeface="Arial Black" panose="020B0A04020102020204" pitchFamily="34" charset="0"/>
+                <a:ea typeface="Times New Roman" panose="02020603050405020304" pitchFamily="18" charset="0"/>
+                <a:cs typeface="Calibri" panose="020F0502020204030204" pitchFamily="34" charset="0"/>
+              </a:rPr>
+              <a:t>Dikau</a:t>
+            </a:r>
+            <a:r>
+              <a:rPr kumimoji="0" lang="en-ID" altLang="en-US" sz="5400" b="1" i="0" u="none" strike="noStrike" cap="none" normalizeH="0" dirty="0" smtClean="0">
+                <a:ln>
+                  <a:noFill/>
+                </a:ln>
+                <a:solidFill>
+                  <a:srgbClr val="FFFF00"/>
+                </a:solidFill>
+                <a:effectLst/>
+                <a:latin typeface="Arial Black" panose="020B0A04020102020204" pitchFamily="34" charset="0"/>
+                <a:ea typeface="Times New Roman" panose="02020603050405020304" pitchFamily="18" charset="0"/>
+                <a:cs typeface="Calibri" panose="020F0502020204030204" pitchFamily="34" charset="0"/>
+              </a:rPr>
+              <a:t> </a:t>
+            </a:r>
+            <a:r>
               <a:rPr kumimoji="0" lang="en-ID" altLang="en-US" sz="5400" b="1" i="0" u="none" strike="noStrike" cap="none" normalizeH="0" dirty="0" err="1" smtClean="0">
                 <a:ln>
                   <a:noFill/>
@@ -13416,7 +13524,7 @@
                 <a:ea typeface="Times New Roman" panose="02020603050405020304" pitchFamily="18" charset="0"/>
                 <a:cs typeface="Calibri" panose="020F0502020204030204" pitchFamily="34" charset="0"/>
               </a:rPr>
-              <a:t>Engkau</a:t>
+              <a:t>tak</a:t>
             </a:r>
             <a:r>
               <a:rPr kumimoji="0" lang="en-ID" altLang="en-US" sz="5400" b="1" i="0" u="none" strike="noStrike" cap="none" normalizeH="0" dirty="0" smtClean="0">
@@ -13446,7 +13554,7 @@
                 <a:ea typeface="Times New Roman" panose="02020603050405020304" pitchFamily="18" charset="0"/>
                 <a:cs typeface="Calibri" panose="020F0502020204030204" pitchFamily="34" charset="0"/>
               </a:rPr>
-              <a:t>nyatakan</a:t>
+              <a:t>ingkar</a:t>
             </a:r>
             <a:r>
               <a:rPr kumimoji="0" lang="en-ID" altLang="en-US" sz="5400" b="1" i="0" u="none" strike="noStrike" cap="none" normalizeH="0" dirty="0" smtClean="0">
@@ -13476,7 +13584,7 @@
                 <a:ea typeface="Times New Roman" panose="02020603050405020304" pitchFamily="18" charset="0"/>
                 <a:cs typeface="Calibri" panose="020F0502020204030204" pitchFamily="34" charset="0"/>
               </a:rPr>
-              <a:t>penuh</a:t>
+              <a:t>janji</a:t>
             </a:r>
             <a:r>
               <a:rPr kumimoji="0" lang="en-ID" altLang="en-US" sz="5400" b="1" i="0" u="none" strike="noStrike" cap="none" normalizeH="0" dirty="0" smtClean="0">
@@ -13491,88 +13599,7 @@
                 <a:ea typeface="Times New Roman" panose="02020603050405020304" pitchFamily="18" charset="0"/>
                 <a:cs typeface="Calibri" panose="020F0502020204030204" pitchFamily="34" charset="0"/>
               </a:rPr>
-              <a:t> </a:t>
-            </a:r>
-            <a:r>
-              <a:rPr kumimoji="0" lang="en-ID" altLang="en-US" sz="5400" b="1" i="0" u="none" strike="noStrike" cap="none" normalizeH="0" dirty="0" err="1" smtClean="0">
-                <a:ln>
-                  <a:noFill/>
-                </a:ln>
-                <a:solidFill>
-                  <a:srgbClr val="FFFF00"/>
-                </a:solidFill>
-                <a:effectLst/>
-                <a:latin typeface="Arial Black" panose="020B0A04020102020204" pitchFamily="34" charset="0"/>
-                <a:ea typeface="Times New Roman" panose="02020603050405020304" pitchFamily="18" charset="0"/>
-                <a:cs typeface="Calibri" panose="020F0502020204030204" pitchFamily="34" charset="0"/>
-              </a:rPr>
-              <a:t>cinta</a:t>
-            </a:r>
-            <a:r>
-              <a:rPr kumimoji="0" lang="en-ID" altLang="en-US" sz="5400" b="1" i="0" u="none" strike="noStrike" cap="none" normalizeH="0" dirty="0" smtClean="0">
-                <a:ln>
-                  <a:noFill/>
-                </a:ln>
-                <a:solidFill>
-                  <a:srgbClr val="FFFF00"/>
-                </a:solidFill>
-                <a:effectLst/>
-                <a:latin typeface="Arial Black" panose="020B0A04020102020204" pitchFamily="34" charset="0"/>
-                <a:ea typeface="Times New Roman" panose="02020603050405020304" pitchFamily="18" charset="0"/>
-                <a:cs typeface="Calibri" panose="020F0502020204030204" pitchFamily="34" charset="0"/>
-              </a:rPr>
-              <a:t> : </a:t>
-            </a:r>
-          </a:p>
-          <a:p>
-            <a:pPr marL="0" marR="0" lvl="0" indent="0" algn="ctr" defTabSz="914400" rtl="0" eaLnBrk="0" fontAlgn="base" latinLnBrk="0" hangingPunct="0">
-              <a:lnSpc>
-                <a:spcPct val="100000"/>
-              </a:lnSpc>
-              <a:spcBef>
-                <a:spcPct val="0"/>
-              </a:spcBef>
-              <a:spcAft>
-                <a:spcPct val="0"/>
-              </a:spcAft>
-              <a:buClrTx/>
-              <a:buSzTx/>
-              <a:buFontTx/>
-              <a:buNone/>
-              <a:tabLst/>
-            </a:pPr>
-            <a:r>
-              <a:rPr lang="en-ID" altLang="en-US" sz="5400" b="1" baseline="0" dirty="0" err="1" smtClean="0">
-                <a:solidFill>
-                  <a:srgbClr val="FFFF00"/>
-                </a:solidFill>
-                <a:latin typeface="Arial Black" panose="020B0A04020102020204" pitchFamily="34" charset="0"/>
-                <a:ea typeface="Times New Roman" panose="02020603050405020304" pitchFamily="18" charset="0"/>
-                <a:cs typeface="Calibri" panose="020F0502020204030204" pitchFamily="34" charset="0"/>
-              </a:rPr>
-              <a:t>Trimalah</a:t>
-            </a:r>
-            <a:r>
-              <a:rPr lang="en-ID" altLang="en-US" sz="5400" b="1" dirty="0" smtClean="0">
-                <a:solidFill>
-                  <a:srgbClr val="FFFF00"/>
-                </a:solidFill>
-                <a:latin typeface="Arial Black" panose="020B0A04020102020204" pitchFamily="34" charset="0"/>
-                <a:ea typeface="Times New Roman" panose="02020603050405020304" pitchFamily="18" charset="0"/>
-                <a:cs typeface="Calibri" panose="020F0502020204030204" pitchFamily="34" charset="0"/>
-              </a:rPr>
-              <a:t> </a:t>
-            </a:r>
-            <a:r>
-              <a:rPr lang="en-ID" altLang="en-US" sz="5400" b="1" dirty="0" err="1" smtClean="0">
-                <a:solidFill>
-                  <a:srgbClr val="FFFF00"/>
-                </a:solidFill>
-                <a:latin typeface="Arial Black" panose="020B0A04020102020204" pitchFamily="34" charset="0"/>
-                <a:ea typeface="Times New Roman" panose="02020603050405020304" pitchFamily="18" charset="0"/>
-                <a:cs typeface="Calibri" panose="020F0502020204030204" pitchFamily="34" charset="0"/>
-              </a:rPr>
-              <a:t>hidupku</a:t>
+              <a:t>.</a:t>
             </a:r>
             <a:endParaRPr kumimoji="0" lang="en-US" altLang="en-US" sz="5400" b="1" i="0" u="none" strike="noStrike" cap="none" normalizeH="0" baseline="0" dirty="0">
               <a:ln>
@@ -13592,13 +13619,20 @@
     </p:spTree>
     <p:extLst>
       <p:ext uri="{BB962C8B-B14F-4D97-AF65-F5344CB8AC3E}">
-        <p14:creationId xmlns:p14="http://schemas.microsoft.com/office/powerpoint/2010/main" val="976722369"/>
+        <p14:creationId xmlns:p14="http://schemas.microsoft.com/office/powerpoint/2010/main" val="4214848859"/>
       </p:ext>
     </p:extLst>
   </p:cSld>
   <p:clrMapOvr>
     <a:masterClrMapping/>
   </p:clrMapOvr>
+  <p:timing>
+    <p:tnLst>
+      <p:par>
+        <p:cTn id="1" dur="indefinite" restart="never" nodeType="tmRoot"/>
+      </p:par>
+    </p:tnLst>
+  </p:timing>
 </p:sld>
 </file>
 
@@ -13624,7 +13658,482 @@
           <p:cNvPr id="10" name="Rectangle 4">
             <a:extLst>
               <a:ext uri="{FF2B5EF4-FFF2-40B4-BE49-F238E27FC236}">
-                <a16:creationId xmlns:a16="http://schemas.microsoft.com/office/drawing/2014/main" xmlns="" id="{51ECECB3-6A8C-4068-B947-90617D76FEE1}"/>
+                <a16:creationId xmlns="" xmlns:a16="http://schemas.microsoft.com/office/drawing/2014/main" id="{51ECECB3-6A8C-4068-B947-90617D76FEE1}"/>
+              </a:ext>
+            </a:extLst>
+          </p:cNvPr>
+          <p:cNvSpPr>
+            <a:spLocks noChangeArrowheads="1"/>
+          </p:cNvSpPr>
+          <p:nvPr/>
+        </p:nvSpPr>
+        <p:spPr bwMode="auto">
+          <a:xfrm>
+            <a:off x="0" y="1476551"/>
+            <a:ext cx="12192000" cy="3370153"/>
+          </a:xfrm>
+          <a:prstGeom prst="rect">
+            <a:avLst/>
+          </a:prstGeom>
+          <a:noFill/>
+          <a:ln>
+            <a:noFill/>
+          </a:ln>
+          <a:effectLst/>
+          <a:extLst>
+            <a:ext uri="{909E8E84-426E-40DD-AFC4-6F175D3DCCD1}">
+              <a14:hiddenFill xmlns:a14="http://schemas.microsoft.com/office/drawing/2010/main">
+                <a:solidFill>
+                  <a:schemeClr val="accent1"/>
+                </a:solidFill>
+              </a14:hiddenFill>
+            </a:ext>
+            <a:ext uri="{91240B29-F687-4F45-9708-019B960494DF}">
+              <a14:hiddenLine xmlns:a14="http://schemas.microsoft.com/office/drawing/2010/main" w="9525">
+                <a:solidFill>
+                  <a:schemeClr val="tx1"/>
+                </a:solidFill>
+                <a:miter lim="800000"/>
+                <a:headEnd/>
+                <a:tailEnd/>
+              </a14:hiddenLine>
+            </a:ext>
+            <a:ext uri="{AF507438-7753-43E0-B8FC-AC1667EBCBE1}">
+              <a14:hiddenEffects xmlns:a14="http://schemas.microsoft.com/office/drawing/2010/main">
+                <a:effectLst>
+                  <a:outerShdw dist="35921" dir="2700000" algn="ctr" rotWithShape="0">
+                    <a:schemeClr val="bg2"/>
+                  </a:outerShdw>
+                </a:effectLst>
+              </a14:hiddenEffects>
+            </a:ext>
+          </a:extLst>
+        </p:spPr>
+        <p:txBody>
+          <a:bodyPr vert="horz" wrap="square" lIns="91440" tIns="45720" rIns="91440" bIns="0" numCol="1" anchor="ctr" anchorCtr="0" compatLnSpc="1">
+            <a:prstTxWarp prst="textNoShape">
+              <a:avLst/>
+            </a:prstTxWarp>
+            <a:spAutoFit/>
+          </a:bodyPr>
+          <a:lstStyle/>
+          <a:p>
+            <a:pPr marL="0" marR="0" lvl="0" indent="0" algn="ctr" defTabSz="914400" rtl="0" eaLnBrk="0" fontAlgn="base" latinLnBrk="0" hangingPunct="0">
+              <a:lnSpc>
+                <a:spcPct val="100000"/>
+              </a:lnSpc>
+              <a:spcBef>
+                <a:spcPct val="0"/>
+              </a:spcBef>
+              <a:spcAft>
+                <a:spcPct val="0"/>
+              </a:spcAft>
+              <a:buClrTx/>
+              <a:buSzTx/>
+              <a:buFontTx/>
+              <a:buNone/>
+              <a:tabLst/>
+            </a:pPr>
+            <a:r>
+              <a:rPr kumimoji="0" lang="en-ID" altLang="en-US" sz="5400" b="1" i="0" u="none" strike="noStrike" cap="none" normalizeH="0" baseline="0" dirty="0" smtClean="0">
+                <a:ln>
+                  <a:noFill/>
+                </a:ln>
+                <a:solidFill>
+                  <a:srgbClr val="FFFF00"/>
+                </a:solidFill>
+                <a:effectLst/>
+                <a:latin typeface="Arial Black" panose="020B0A04020102020204" pitchFamily="34" charset="0"/>
+                <a:ea typeface="Times New Roman" panose="02020603050405020304" pitchFamily="18" charset="0"/>
+                <a:cs typeface="Calibri" panose="020F0502020204030204" pitchFamily="34" charset="0"/>
+              </a:rPr>
+              <a:t>Kala </a:t>
+            </a:r>
+            <a:r>
+              <a:rPr kumimoji="0" lang="en-ID" altLang="en-US" sz="5400" b="1" i="0" u="none" strike="noStrike" cap="none" normalizeH="0" baseline="0" dirty="0" err="1" smtClean="0">
+                <a:ln>
+                  <a:noFill/>
+                </a:ln>
+                <a:solidFill>
+                  <a:srgbClr val="FFFF00"/>
+                </a:solidFill>
+                <a:effectLst/>
+                <a:latin typeface="Arial Black" panose="020B0A04020102020204" pitchFamily="34" charset="0"/>
+                <a:ea typeface="Times New Roman" panose="02020603050405020304" pitchFamily="18" charset="0"/>
+                <a:cs typeface="Calibri" panose="020F0502020204030204" pitchFamily="34" charset="0"/>
+              </a:rPr>
+              <a:t>Kau</a:t>
+            </a:r>
+            <a:r>
+              <a:rPr kumimoji="0" lang="en-ID" altLang="en-US" sz="5400" b="1" i="0" u="none" strike="noStrike" cap="none" normalizeH="0" dirty="0" smtClean="0">
+                <a:ln>
+                  <a:noFill/>
+                </a:ln>
+                <a:solidFill>
+                  <a:srgbClr val="FFFF00"/>
+                </a:solidFill>
+                <a:effectLst/>
+                <a:latin typeface="Arial Black" panose="020B0A04020102020204" pitchFamily="34" charset="0"/>
+                <a:ea typeface="Times New Roman" panose="02020603050405020304" pitchFamily="18" charset="0"/>
+                <a:cs typeface="Calibri" panose="020F0502020204030204" pitchFamily="34" charset="0"/>
+              </a:rPr>
+              <a:t> </a:t>
+            </a:r>
+            <a:r>
+              <a:rPr kumimoji="0" lang="en-ID" altLang="en-US" sz="5400" b="1" i="0" u="none" strike="noStrike" cap="none" normalizeH="0" dirty="0" err="1" smtClean="0">
+                <a:ln>
+                  <a:noFill/>
+                </a:ln>
+                <a:solidFill>
+                  <a:srgbClr val="FFFF00"/>
+                </a:solidFill>
+                <a:effectLst/>
+                <a:latin typeface="Arial Black" panose="020B0A04020102020204" pitchFamily="34" charset="0"/>
+                <a:ea typeface="Times New Roman" panose="02020603050405020304" pitchFamily="18" charset="0"/>
+                <a:cs typeface="Calibri" panose="020F0502020204030204" pitchFamily="34" charset="0"/>
+              </a:rPr>
+              <a:t>serahkan</a:t>
+            </a:r>
+            <a:r>
+              <a:rPr kumimoji="0" lang="en-ID" altLang="en-US" sz="5400" b="1" i="0" u="none" strike="noStrike" cap="none" normalizeH="0" dirty="0" smtClean="0">
+                <a:ln>
+                  <a:noFill/>
+                </a:ln>
+                <a:solidFill>
+                  <a:srgbClr val="FFFF00"/>
+                </a:solidFill>
+                <a:effectLst/>
+                <a:latin typeface="Arial Black" panose="020B0A04020102020204" pitchFamily="34" charset="0"/>
+                <a:ea typeface="Times New Roman" panose="02020603050405020304" pitchFamily="18" charset="0"/>
+                <a:cs typeface="Calibri" panose="020F0502020204030204" pitchFamily="34" charset="0"/>
+              </a:rPr>
+              <a:t> roti </a:t>
+            </a:r>
+          </a:p>
+          <a:p>
+            <a:pPr marL="0" marR="0" lvl="0" indent="0" algn="ctr" defTabSz="914400" rtl="0" eaLnBrk="0" fontAlgn="base" latinLnBrk="0" hangingPunct="0">
+              <a:lnSpc>
+                <a:spcPct val="100000"/>
+              </a:lnSpc>
+              <a:spcBef>
+                <a:spcPct val="0"/>
+              </a:spcBef>
+              <a:spcAft>
+                <a:spcPct val="0"/>
+              </a:spcAft>
+              <a:buClrTx/>
+              <a:buSzTx/>
+              <a:buFontTx/>
+              <a:buNone/>
+              <a:tabLst/>
+            </a:pPr>
+            <a:r>
+              <a:rPr kumimoji="0" lang="en-ID" altLang="en-US" sz="5400" b="1" i="0" u="none" strike="noStrike" cap="none" normalizeH="0" dirty="0" err="1" smtClean="0">
+                <a:ln>
+                  <a:noFill/>
+                </a:ln>
+                <a:solidFill>
+                  <a:srgbClr val="FFFF00"/>
+                </a:solidFill>
+                <a:effectLst/>
+                <a:latin typeface="Arial Black" panose="020B0A04020102020204" pitchFamily="34" charset="0"/>
+                <a:ea typeface="Times New Roman" panose="02020603050405020304" pitchFamily="18" charset="0"/>
+                <a:cs typeface="Calibri" panose="020F0502020204030204" pitchFamily="34" charset="0"/>
+              </a:rPr>
+              <a:t>pada</a:t>
+            </a:r>
+            <a:r>
+              <a:rPr kumimoji="0" lang="en-ID" altLang="en-US" sz="5400" b="1" i="0" u="none" strike="noStrike" cap="none" normalizeH="0" dirty="0" smtClean="0">
+                <a:ln>
+                  <a:noFill/>
+                </a:ln>
+                <a:solidFill>
+                  <a:srgbClr val="FFFF00"/>
+                </a:solidFill>
+                <a:effectLst/>
+                <a:latin typeface="Arial Black" panose="020B0A04020102020204" pitchFamily="34" charset="0"/>
+                <a:ea typeface="Times New Roman" panose="02020603050405020304" pitchFamily="18" charset="0"/>
+                <a:cs typeface="Calibri" panose="020F0502020204030204" pitchFamily="34" charset="0"/>
+              </a:rPr>
+              <a:t> para </a:t>
+            </a:r>
+            <a:r>
+              <a:rPr kumimoji="0" lang="en-ID" altLang="en-US" sz="5400" b="1" i="0" u="none" strike="noStrike" cap="none" normalizeH="0" dirty="0" err="1" smtClean="0">
+                <a:ln>
+                  <a:noFill/>
+                </a:ln>
+                <a:solidFill>
+                  <a:srgbClr val="FFFF00"/>
+                </a:solidFill>
+                <a:effectLst/>
+                <a:latin typeface="Arial Black" panose="020B0A04020102020204" pitchFamily="34" charset="0"/>
+                <a:ea typeface="Times New Roman" panose="02020603050405020304" pitchFamily="18" charset="0"/>
+                <a:cs typeface="Calibri" panose="020F0502020204030204" pitchFamily="34" charset="0"/>
+              </a:rPr>
+              <a:t>murid</a:t>
+            </a:r>
+            <a:r>
+              <a:rPr kumimoji="0" lang="en-ID" altLang="en-US" sz="5400" b="1" i="0" u="none" strike="noStrike" cap="none" normalizeH="0" dirty="0" smtClean="0">
+                <a:ln>
+                  <a:noFill/>
+                </a:ln>
+                <a:solidFill>
+                  <a:srgbClr val="FFFF00"/>
+                </a:solidFill>
+                <a:effectLst/>
+                <a:latin typeface="Arial Black" panose="020B0A04020102020204" pitchFamily="34" charset="0"/>
+                <a:ea typeface="Times New Roman" panose="02020603050405020304" pitchFamily="18" charset="0"/>
+                <a:cs typeface="Calibri" panose="020F0502020204030204" pitchFamily="34" charset="0"/>
+              </a:rPr>
+              <a:t> Mu, </a:t>
+            </a:r>
+          </a:p>
+          <a:p>
+            <a:pPr marL="0" marR="0" lvl="0" indent="0" algn="ctr" defTabSz="914400" rtl="0" eaLnBrk="0" fontAlgn="base" latinLnBrk="0" hangingPunct="0">
+              <a:lnSpc>
+                <a:spcPct val="100000"/>
+              </a:lnSpc>
+              <a:spcBef>
+                <a:spcPct val="0"/>
+              </a:spcBef>
+              <a:spcAft>
+                <a:spcPct val="0"/>
+              </a:spcAft>
+              <a:buClrTx/>
+              <a:buSzTx/>
+              <a:buFontTx/>
+              <a:buNone/>
+              <a:tabLst/>
+            </a:pPr>
+            <a:r>
+              <a:rPr kumimoji="0" lang="en-ID" altLang="en-US" sz="5400" b="1" i="0" u="none" strike="noStrike" cap="none" normalizeH="0" dirty="0" err="1" smtClean="0">
+                <a:ln>
+                  <a:noFill/>
+                </a:ln>
+                <a:solidFill>
+                  <a:srgbClr val="FFFF00"/>
+                </a:solidFill>
+                <a:effectLst/>
+                <a:latin typeface="Arial Black" panose="020B0A04020102020204" pitchFamily="34" charset="0"/>
+                <a:ea typeface="Times New Roman" panose="02020603050405020304" pitchFamily="18" charset="0"/>
+                <a:cs typeface="Calibri" panose="020F0502020204030204" pitchFamily="34" charset="0"/>
+              </a:rPr>
+              <a:t>Engkau</a:t>
+            </a:r>
+            <a:r>
+              <a:rPr kumimoji="0" lang="en-ID" altLang="en-US" sz="5400" b="1" i="0" u="none" strike="noStrike" cap="none" normalizeH="0" dirty="0" smtClean="0">
+                <a:ln>
+                  <a:noFill/>
+                </a:ln>
+                <a:solidFill>
+                  <a:srgbClr val="FFFF00"/>
+                </a:solidFill>
+                <a:effectLst/>
+                <a:latin typeface="Arial Black" panose="020B0A04020102020204" pitchFamily="34" charset="0"/>
+                <a:ea typeface="Times New Roman" panose="02020603050405020304" pitchFamily="18" charset="0"/>
+                <a:cs typeface="Calibri" panose="020F0502020204030204" pitchFamily="34" charset="0"/>
+              </a:rPr>
+              <a:t> </a:t>
+            </a:r>
+            <a:r>
+              <a:rPr kumimoji="0" lang="en-ID" altLang="en-US" sz="5400" b="1" i="0" u="none" strike="noStrike" cap="none" normalizeH="0" dirty="0" err="1" smtClean="0">
+                <a:ln>
+                  <a:noFill/>
+                </a:ln>
+                <a:solidFill>
+                  <a:srgbClr val="FFFF00"/>
+                </a:solidFill>
+                <a:effectLst/>
+                <a:latin typeface="Arial Black" panose="020B0A04020102020204" pitchFamily="34" charset="0"/>
+                <a:ea typeface="Times New Roman" panose="02020603050405020304" pitchFamily="18" charset="0"/>
+                <a:cs typeface="Calibri" panose="020F0502020204030204" pitchFamily="34" charset="0"/>
+              </a:rPr>
+              <a:t>nyatakan</a:t>
+            </a:r>
+            <a:r>
+              <a:rPr kumimoji="0" lang="en-ID" altLang="en-US" sz="5400" b="1" i="0" u="none" strike="noStrike" cap="none" normalizeH="0" dirty="0" smtClean="0">
+                <a:ln>
+                  <a:noFill/>
+                </a:ln>
+                <a:solidFill>
+                  <a:srgbClr val="FFFF00"/>
+                </a:solidFill>
+                <a:effectLst/>
+                <a:latin typeface="Arial Black" panose="020B0A04020102020204" pitchFamily="34" charset="0"/>
+                <a:ea typeface="Times New Roman" panose="02020603050405020304" pitchFamily="18" charset="0"/>
+                <a:cs typeface="Calibri" panose="020F0502020204030204" pitchFamily="34" charset="0"/>
+              </a:rPr>
+              <a:t> </a:t>
+            </a:r>
+            <a:r>
+              <a:rPr kumimoji="0" lang="en-ID" altLang="en-US" sz="5400" b="1" i="0" u="none" strike="noStrike" cap="none" normalizeH="0" dirty="0" err="1" smtClean="0">
+                <a:ln>
+                  <a:noFill/>
+                </a:ln>
+                <a:solidFill>
+                  <a:srgbClr val="FFFF00"/>
+                </a:solidFill>
+                <a:effectLst/>
+                <a:latin typeface="Arial Black" panose="020B0A04020102020204" pitchFamily="34" charset="0"/>
+                <a:ea typeface="Times New Roman" panose="02020603050405020304" pitchFamily="18" charset="0"/>
+                <a:cs typeface="Calibri" panose="020F0502020204030204" pitchFamily="34" charset="0"/>
+              </a:rPr>
+              <a:t>penuh</a:t>
+            </a:r>
+            <a:r>
+              <a:rPr kumimoji="0" lang="en-ID" altLang="en-US" sz="5400" b="1" i="0" u="none" strike="noStrike" cap="none" normalizeH="0" dirty="0" smtClean="0">
+                <a:ln>
+                  <a:noFill/>
+                </a:ln>
+                <a:solidFill>
+                  <a:srgbClr val="FFFF00"/>
+                </a:solidFill>
+                <a:effectLst/>
+                <a:latin typeface="Arial Black" panose="020B0A04020102020204" pitchFamily="34" charset="0"/>
+                <a:ea typeface="Times New Roman" panose="02020603050405020304" pitchFamily="18" charset="0"/>
+                <a:cs typeface="Calibri" panose="020F0502020204030204" pitchFamily="34" charset="0"/>
+              </a:rPr>
+              <a:t> </a:t>
+            </a:r>
+            <a:r>
+              <a:rPr kumimoji="0" lang="en-ID" altLang="en-US" sz="5400" b="1" i="0" u="none" strike="noStrike" cap="none" normalizeH="0" dirty="0" err="1" smtClean="0">
+                <a:ln>
+                  <a:noFill/>
+                </a:ln>
+                <a:solidFill>
+                  <a:srgbClr val="FFFF00"/>
+                </a:solidFill>
+                <a:effectLst/>
+                <a:latin typeface="Arial Black" panose="020B0A04020102020204" pitchFamily="34" charset="0"/>
+                <a:ea typeface="Times New Roman" panose="02020603050405020304" pitchFamily="18" charset="0"/>
+                <a:cs typeface="Calibri" panose="020F0502020204030204" pitchFamily="34" charset="0"/>
+              </a:rPr>
+              <a:t>cinta</a:t>
+            </a:r>
+            <a:r>
+              <a:rPr kumimoji="0" lang="en-ID" altLang="en-US" sz="5400" b="1" i="0" u="none" strike="noStrike" cap="none" normalizeH="0" dirty="0" smtClean="0">
+                <a:ln>
+                  <a:noFill/>
+                </a:ln>
+                <a:solidFill>
+                  <a:srgbClr val="FFFF00"/>
+                </a:solidFill>
+                <a:effectLst/>
+                <a:latin typeface="Arial Black" panose="020B0A04020102020204" pitchFamily="34" charset="0"/>
+                <a:ea typeface="Times New Roman" panose="02020603050405020304" pitchFamily="18" charset="0"/>
+                <a:cs typeface="Calibri" panose="020F0502020204030204" pitchFamily="34" charset="0"/>
+              </a:rPr>
+              <a:t> : </a:t>
+            </a:r>
+          </a:p>
+          <a:p>
+            <a:pPr marL="0" marR="0" lvl="0" indent="0" algn="ctr" defTabSz="914400" rtl="0" eaLnBrk="0" fontAlgn="base" latinLnBrk="0" hangingPunct="0">
+              <a:lnSpc>
+                <a:spcPct val="100000"/>
+              </a:lnSpc>
+              <a:spcBef>
+                <a:spcPct val="0"/>
+              </a:spcBef>
+              <a:spcAft>
+                <a:spcPct val="0"/>
+              </a:spcAft>
+              <a:buClrTx/>
+              <a:buSzTx/>
+              <a:buFontTx/>
+              <a:buNone/>
+              <a:tabLst/>
+            </a:pPr>
+            <a:r>
+              <a:rPr lang="en-ID" altLang="en-US" sz="5400" b="1" baseline="0" dirty="0" err="1" smtClean="0">
+                <a:solidFill>
+                  <a:srgbClr val="FFFF00"/>
+                </a:solidFill>
+                <a:latin typeface="Arial Black" panose="020B0A04020102020204" pitchFamily="34" charset="0"/>
+                <a:ea typeface="Times New Roman" panose="02020603050405020304" pitchFamily="18" charset="0"/>
+                <a:cs typeface="Calibri" panose="020F0502020204030204" pitchFamily="34" charset="0"/>
+              </a:rPr>
+              <a:t>Trimalah</a:t>
+            </a:r>
+            <a:r>
+              <a:rPr lang="en-ID" altLang="en-US" sz="5400" b="1" dirty="0" smtClean="0">
+                <a:solidFill>
+                  <a:srgbClr val="FFFF00"/>
+                </a:solidFill>
+                <a:latin typeface="Arial Black" panose="020B0A04020102020204" pitchFamily="34" charset="0"/>
+                <a:ea typeface="Times New Roman" panose="02020603050405020304" pitchFamily="18" charset="0"/>
+                <a:cs typeface="Calibri" panose="020F0502020204030204" pitchFamily="34" charset="0"/>
+              </a:rPr>
+              <a:t> </a:t>
+            </a:r>
+            <a:r>
+              <a:rPr lang="en-ID" altLang="en-US" sz="5400" b="1" dirty="0" err="1" smtClean="0">
+                <a:solidFill>
+                  <a:srgbClr val="FFFF00"/>
+                </a:solidFill>
+                <a:latin typeface="Arial Black" panose="020B0A04020102020204" pitchFamily="34" charset="0"/>
+                <a:ea typeface="Times New Roman" panose="02020603050405020304" pitchFamily="18" charset="0"/>
+                <a:cs typeface="Calibri" panose="020F0502020204030204" pitchFamily="34" charset="0"/>
+              </a:rPr>
+              <a:t>hidupku</a:t>
+            </a:r>
+            <a:endParaRPr kumimoji="0" lang="en-US" altLang="en-US" sz="5400" b="1" i="0" u="none" strike="noStrike" cap="none" normalizeH="0" baseline="0" dirty="0">
+              <a:ln>
+                <a:noFill/>
+              </a:ln>
+              <a:solidFill>
+                <a:srgbClr val="FFFF00"/>
+              </a:solidFill>
+              <a:effectLst/>
+              <a:latin typeface="Arial Black" panose="020B0A04020102020204" pitchFamily="34" charset="0"/>
+              <a:ea typeface="Times New Roman" panose="02020603050405020304" pitchFamily="18" charset="0"/>
+              <a:cs typeface="Calibri" panose="020F0502020204030204" pitchFamily="34" charset="0"/>
+            </a:endParaRPr>
+          </a:p>
+        </p:txBody>
+      </p:sp>
+    </p:spTree>
+    <p:extLst>
+      <p:ext uri="{BB962C8B-B14F-4D97-AF65-F5344CB8AC3E}">
+        <p14:creationId xmlns:p14="http://schemas.microsoft.com/office/powerpoint/2010/main" val="976722369"/>
+      </p:ext>
+    </p:extLst>
+  </p:cSld>
+  <p:clrMapOvr>
+    <a:masterClrMapping/>
+  </p:clrMapOvr>
+  <p:timing>
+    <p:tnLst>
+      <p:par>
+        <p:cTn id="1" dur="indefinite" restart="never" nodeType="tmRoot"/>
+      </p:par>
+    </p:tnLst>
+  </p:timing>
+</p:sld>
+</file>
+
+<file path=ppt/slides/slide43.xml><?xml version="1.0" encoding="utf-8"?>
+<p:sld xmlns:a="http://schemas.openxmlformats.org/drawingml/2006/main" xmlns:r="http://schemas.openxmlformats.org/officeDocument/2006/relationships" xmlns:p="http://schemas.openxmlformats.org/presentationml/2006/main">
+  <p:cSld>
+    <p:spTree>
+      <p:nvGrpSpPr>
+        <p:cNvPr id="1" name=""/>
+        <p:cNvGrpSpPr/>
+        <p:nvPr/>
+      </p:nvGrpSpPr>
+      <p:grpSpPr>
+        <a:xfrm>
+          <a:off x="0" y="0"/>
+          <a:ext cx="0" cy="0"/>
+          <a:chOff x="0" y="0"/>
+          <a:chExt cx="0" cy="0"/>
+        </a:xfrm>
+      </p:grpSpPr>
+      <p:sp>
+        <p:nvSpPr>
+          <p:cNvPr id="10" name="Rectangle 4">
+            <a:extLst>
+              <a:ext uri="{FF2B5EF4-FFF2-40B4-BE49-F238E27FC236}">
+                <a16:creationId xmlns="" xmlns:a16="http://schemas.microsoft.com/office/drawing/2014/main" id="{51ECECB3-6A8C-4068-B947-90617D76FEE1}"/>
               </a:ext>
             </a:extLst>
           </p:cNvPr>
@@ -14104,10 +14613,17 @@
   <p:clrMapOvr>
     <a:masterClrMapping/>
   </p:clrMapOvr>
+  <p:timing>
+    <p:tnLst>
+      <p:par>
+        <p:cTn id="1" dur="indefinite" restart="never" nodeType="tmRoot"/>
+      </p:par>
+    </p:tnLst>
+  </p:timing>
 </p:sld>
 </file>
 
-<file path=ppt/slides/slide43.xml><?xml version="1.0" encoding="utf-8"?>
+<file path=ppt/slides/slide44.xml><?xml version="1.0" encoding="utf-8"?>
 <p:sld xmlns:a="http://schemas.openxmlformats.org/drawingml/2006/main" xmlns:r="http://schemas.openxmlformats.org/officeDocument/2006/relationships" xmlns:p="http://schemas.openxmlformats.org/presentationml/2006/main">
   <p:cSld>
     <p:spTree>
@@ -14455,287 +14971,13 @@
   <p:clrMapOvr>
     <a:masterClrMapping/>
   </p:clrMapOvr>
-</p:sld>
-</file>
-
-<file path=ppt/slides/slide44.xml><?xml version="1.0" encoding="utf-8"?>
-<p:sld xmlns:a="http://schemas.openxmlformats.org/drawingml/2006/main" xmlns:r="http://schemas.openxmlformats.org/officeDocument/2006/relationships" xmlns:p="http://schemas.openxmlformats.org/presentationml/2006/main">
-  <p:cSld>
-    <p:spTree>
-      <p:nvGrpSpPr>
-        <p:cNvPr id="1" name=""/>
-        <p:cNvGrpSpPr/>
-        <p:nvPr/>
-      </p:nvGrpSpPr>
-      <p:grpSpPr>
-        <a:xfrm>
-          <a:off x="0" y="0"/>
-          <a:ext cx="0" cy="0"/>
-          <a:chOff x="0" y="0"/>
-          <a:chExt cx="0" cy="0"/>
-        </a:xfrm>
-      </p:grpSpPr>
-      <p:sp>
-        <p:nvSpPr>
-          <p:cNvPr id="3" name="Content Placeholder 2"/>
-          <p:cNvSpPr>
-            <a:spLocks noGrp="1"/>
-          </p:cNvSpPr>
-          <p:nvPr>
-            <p:ph idx="1"/>
-          </p:nvPr>
-        </p:nvSpPr>
-        <p:spPr>
-          <a:xfrm>
-            <a:off x="238537" y="1498484"/>
-            <a:ext cx="11714923" cy="4195481"/>
-          </a:xfrm>
-        </p:spPr>
-        <p:txBody>
-          <a:bodyPr>
-            <a:noAutofit/>
-          </a:bodyPr>
-          <a:lstStyle/>
-          <a:p>
-            <a:pPr marL="0" lvl="0" indent="0" algn="ctr">
-              <a:spcAft>
-                <a:spcPts val="800"/>
-              </a:spcAft>
-              <a:buNone/>
-              <a:tabLst>
-                <a:tab pos="540385" algn="l"/>
-              </a:tabLst>
-            </a:pPr>
-            <a:r>
-              <a:rPr lang="en-ID" sz="6000" b="1" cap="none" dirty="0" err="1" smtClean="0">
-                <a:solidFill>
-                  <a:srgbClr val="FFFF00"/>
-                </a:solidFill>
-                <a:effectLst/>
-                <a:latin typeface="Arial Black" panose="020B0A04020102020204" pitchFamily="34" charset="0"/>
-                <a:ea typeface="Calibri" panose="020F0502020204030204" pitchFamily="34" charset="0"/>
-                <a:cs typeface="Calibri" panose="020F0502020204030204" pitchFamily="34" charset="0"/>
-              </a:rPr>
-              <a:t>Sungguh</a:t>
-            </a:r>
-            <a:r>
-              <a:rPr lang="en-ID" sz="6000" b="1" cap="none" dirty="0" smtClean="0">
-                <a:solidFill>
-                  <a:srgbClr val="FFFF00"/>
-                </a:solidFill>
-                <a:effectLst/>
-                <a:latin typeface="Arial Black" panose="020B0A04020102020204" pitchFamily="34" charset="0"/>
-                <a:ea typeface="Calibri" panose="020F0502020204030204" pitchFamily="34" charset="0"/>
-                <a:cs typeface="Calibri" panose="020F0502020204030204" pitchFamily="34" charset="0"/>
-              </a:rPr>
-              <a:t> </a:t>
-            </a:r>
-            <a:r>
-              <a:rPr lang="en-ID" sz="6000" b="1" cap="none" dirty="0" err="1" smtClean="0">
-                <a:solidFill>
-                  <a:srgbClr val="FFFF00"/>
-                </a:solidFill>
-                <a:effectLst/>
-                <a:latin typeface="Arial Black" panose="020B0A04020102020204" pitchFamily="34" charset="0"/>
-                <a:ea typeface="Calibri" panose="020F0502020204030204" pitchFamily="34" charset="0"/>
-                <a:cs typeface="Calibri" panose="020F0502020204030204" pitchFamily="34" charset="0"/>
-              </a:rPr>
-              <a:t>engkau</a:t>
-            </a:r>
-            <a:endParaRPr lang="en-ID" sz="6000" b="1" cap="none" dirty="0" smtClean="0">
-              <a:solidFill>
-                <a:srgbClr val="FFFF00"/>
-              </a:solidFill>
-              <a:effectLst/>
-              <a:latin typeface="Arial Black" panose="020B0A04020102020204" pitchFamily="34" charset="0"/>
-              <a:ea typeface="Calibri" panose="020F0502020204030204" pitchFamily="34" charset="0"/>
-              <a:cs typeface="Calibri" panose="020F0502020204030204" pitchFamily="34" charset="0"/>
-            </a:endParaRPr>
-          </a:p>
-          <a:p>
-            <a:pPr marL="0" lvl="0" indent="0" algn="ctr">
-              <a:spcAft>
-                <a:spcPts val="800"/>
-              </a:spcAft>
-              <a:buNone/>
-              <a:tabLst>
-                <a:tab pos="540385" algn="l"/>
-              </a:tabLst>
-            </a:pPr>
-            <a:r>
-              <a:rPr lang="en-ID" sz="6000" b="1" cap="none" dirty="0" smtClean="0">
-                <a:solidFill>
-                  <a:srgbClr val="FFFF00"/>
-                </a:solidFill>
-                <a:effectLst/>
-                <a:latin typeface="Arial Black" panose="020B0A04020102020204" pitchFamily="34" charset="0"/>
-                <a:ea typeface="Calibri" panose="020F0502020204030204" pitchFamily="34" charset="0"/>
-                <a:cs typeface="Calibri" panose="020F0502020204030204" pitchFamily="34" charset="0"/>
-              </a:rPr>
-              <a:t> </a:t>
-            </a:r>
-            <a:r>
-              <a:rPr lang="en-ID" sz="6000" b="1" cap="none" dirty="0" err="1" smtClean="0">
-                <a:solidFill>
-                  <a:srgbClr val="FFFF00"/>
-                </a:solidFill>
-                <a:effectLst/>
-                <a:latin typeface="Arial Black" panose="020B0A04020102020204" pitchFamily="34" charset="0"/>
-                <a:ea typeface="Calibri" panose="020F0502020204030204" pitchFamily="34" charset="0"/>
-                <a:cs typeface="Calibri" panose="020F0502020204030204" pitchFamily="34" charset="0"/>
-              </a:rPr>
-              <a:t>sahabatKu</a:t>
-            </a:r>
-            <a:r>
-              <a:rPr lang="en-ID" sz="6000" b="1" cap="none" dirty="0" smtClean="0">
-                <a:solidFill>
-                  <a:srgbClr val="FFFF00"/>
-                </a:solidFill>
-                <a:effectLst/>
-                <a:latin typeface="Arial Black" panose="020B0A04020102020204" pitchFamily="34" charset="0"/>
-                <a:ea typeface="Calibri" panose="020F0502020204030204" pitchFamily="34" charset="0"/>
-                <a:cs typeface="Calibri" panose="020F0502020204030204" pitchFamily="34" charset="0"/>
-              </a:rPr>
-              <a:t>, </a:t>
-            </a:r>
-            <a:r>
-              <a:rPr lang="en-ID" sz="6000" b="1" cap="none" dirty="0" err="1" smtClean="0">
-                <a:solidFill>
-                  <a:srgbClr val="FFFF00"/>
-                </a:solidFill>
-                <a:effectLst/>
-                <a:latin typeface="Arial Black" panose="020B0A04020102020204" pitchFamily="34" charset="0"/>
-                <a:ea typeface="Calibri" panose="020F0502020204030204" pitchFamily="34" charset="0"/>
-                <a:cs typeface="Calibri" panose="020F0502020204030204" pitchFamily="34" charset="0"/>
-              </a:rPr>
-              <a:t>jikalau</a:t>
-            </a:r>
-            <a:r>
-              <a:rPr lang="en-ID" sz="6000" b="1" cap="none" dirty="0" smtClean="0">
-                <a:solidFill>
-                  <a:srgbClr val="FFFF00"/>
-                </a:solidFill>
-                <a:effectLst/>
-                <a:latin typeface="Arial Black" panose="020B0A04020102020204" pitchFamily="34" charset="0"/>
-                <a:ea typeface="Calibri" panose="020F0502020204030204" pitchFamily="34" charset="0"/>
-                <a:cs typeface="Calibri" panose="020F0502020204030204" pitchFamily="34" charset="0"/>
-              </a:rPr>
-              <a:t> </a:t>
-            </a:r>
-            <a:r>
-              <a:rPr lang="en-ID" sz="6000" b="1" cap="none" dirty="0" err="1" smtClean="0">
-                <a:solidFill>
-                  <a:srgbClr val="FFFF00"/>
-                </a:solidFill>
-                <a:effectLst/>
-                <a:latin typeface="Arial Black" panose="020B0A04020102020204" pitchFamily="34" charset="0"/>
-                <a:ea typeface="Calibri" panose="020F0502020204030204" pitchFamily="34" charset="0"/>
-                <a:cs typeface="Calibri" panose="020F0502020204030204" pitchFamily="34" charset="0"/>
-              </a:rPr>
-              <a:t>engkau</a:t>
-            </a:r>
-            <a:endParaRPr lang="en-ID" sz="6000" b="1" cap="none" dirty="0" smtClean="0">
-              <a:solidFill>
-                <a:srgbClr val="FFFF00"/>
-              </a:solidFill>
-              <a:effectLst/>
-              <a:latin typeface="Arial Black" panose="020B0A04020102020204" pitchFamily="34" charset="0"/>
-              <a:ea typeface="Calibri" panose="020F0502020204030204" pitchFamily="34" charset="0"/>
-              <a:cs typeface="Calibri" panose="020F0502020204030204" pitchFamily="34" charset="0"/>
-            </a:endParaRPr>
-          </a:p>
-          <a:p>
-            <a:pPr marL="0" lvl="0" indent="0" algn="ctr">
-              <a:spcAft>
-                <a:spcPts val="800"/>
-              </a:spcAft>
-              <a:buNone/>
-              <a:tabLst>
-                <a:tab pos="540385" algn="l"/>
-              </a:tabLst>
-            </a:pPr>
-            <a:r>
-              <a:rPr lang="en-ID" sz="6000" b="1" cap="none" dirty="0" smtClean="0">
-                <a:solidFill>
-                  <a:srgbClr val="FFFF00"/>
-                </a:solidFill>
-                <a:effectLst/>
-                <a:latin typeface="Arial Black" panose="020B0A04020102020204" pitchFamily="34" charset="0"/>
-                <a:ea typeface="Calibri" panose="020F0502020204030204" pitchFamily="34" charset="0"/>
-                <a:cs typeface="Calibri" panose="020F0502020204030204" pitchFamily="34" charset="0"/>
-              </a:rPr>
-              <a:t> </a:t>
-            </a:r>
-            <a:r>
-              <a:rPr lang="en-ID" sz="6000" b="1" cap="none" dirty="0" err="1" smtClean="0">
-                <a:solidFill>
-                  <a:srgbClr val="FFFF00"/>
-                </a:solidFill>
-                <a:effectLst/>
-                <a:latin typeface="Arial Black" panose="020B0A04020102020204" pitchFamily="34" charset="0"/>
-                <a:ea typeface="Calibri" panose="020F0502020204030204" pitchFamily="34" charset="0"/>
-                <a:cs typeface="Calibri" panose="020F0502020204030204" pitchFamily="34" charset="0"/>
-              </a:rPr>
-              <a:t>menaati</a:t>
-            </a:r>
-            <a:r>
-              <a:rPr lang="en-ID" sz="6000" b="1" cap="none" dirty="0" smtClean="0">
-                <a:solidFill>
-                  <a:srgbClr val="FFFF00"/>
-                </a:solidFill>
-                <a:effectLst/>
-                <a:latin typeface="Arial Black" panose="020B0A04020102020204" pitchFamily="34" charset="0"/>
-                <a:ea typeface="Calibri" panose="020F0502020204030204" pitchFamily="34" charset="0"/>
-                <a:cs typeface="Calibri" panose="020F0502020204030204" pitchFamily="34" charset="0"/>
-              </a:rPr>
-              <a:t> </a:t>
-            </a:r>
-            <a:r>
-              <a:rPr lang="en-ID" sz="6000" b="1" cap="none" dirty="0" err="1" smtClean="0">
-                <a:solidFill>
-                  <a:srgbClr val="FFFF00"/>
-                </a:solidFill>
-                <a:effectLst/>
-                <a:latin typeface="Arial Black" panose="020B0A04020102020204" pitchFamily="34" charset="0"/>
-                <a:ea typeface="Calibri" panose="020F0502020204030204" pitchFamily="34" charset="0"/>
-                <a:cs typeface="Calibri" panose="020F0502020204030204" pitchFamily="34" charset="0"/>
-              </a:rPr>
-              <a:t>perintahKu</a:t>
-            </a:r>
-            <a:r>
-              <a:rPr lang="en-ID" sz="6000" b="1" cap="none" dirty="0" smtClean="0">
-                <a:solidFill>
-                  <a:srgbClr val="FFFF00"/>
-                </a:solidFill>
-                <a:effectLst/>
-                <a:latin typeface="Arial Black" panose="020B0A04020102020204" pitchFamily="34" charset="0"/>
-                <a:ea typeface="Calibri" panose="020F0502020204030204" pitchFamily="34" charset="0"/>
-                <a:cs typeface="Calibri" panose="020F0502020204030204" pitchFamily="34" charset="0"/>
-              </a:rPr>
-              <a:t>. </a:t>
-            </a:r>
-            <a:endParaRPr lang="en-ID" sz="6000" cap="none" dirty="0">
-              <a:solidFill>
-                <a:srgbClr val="FFFF00"/>
-              </a:solidFill>
-              <a:effectLst/>
-              <a:latin typeface="Arial Black" panose="020B0A04020102020204" pitchFamily="34" charset="0"/>
-              <a:ea typeface="Calibri" panose="020F0502020204030204" pitchFamily="34" charset="0"/>
-              <a:cs typeface="Times New Roman" panose="02020603050405020304" pitchFamily="18" charset="0"/>
-            </a:endParaRPr>
-          </a:p>
-        </p:txBody>
-      </p:sp>
-    </p:spTree>
-    <p:extLst>
-      <p:ext uri="{BB962C8B-B14F-4D97-AF65-F5344CB8AC3E}">
-        <p14:creationId xmlns:p14="http://schemas.microsoft.com/office/powerpoint/2010/main" val="2980192846"/>
-      </p:ext>
-    </p:extLst>
-  </p:cSld>
-  <p:clrMapOvr>
-    <a:masterClrMapping/>
-  </p:clrMapOvr>
+  <p:timing>
+    <p:tnLst>
+      <p:par>
+        <p:cTn id="1" dur="indefinite" restart="never" nodeType="tmRoot"/>
+      </p:par>
+    </p:tnLst>
+  </p:timing>
 </p:sld>
 </file>
 
@@ -14797,6 +15039,294 @@
                 <a:ea typeface="Calibri" panose="020F0502020204030204" pitchFamily="34" charset="0"/>
                 <a:cs typeface="Calibri" panose="020F0502020204030204" pitchFamily="34" charset="0"/>
               </a:rPr>
+              <a:t>Sungguh</a:t>
+            </a:r>
+            <a:r>
+              <a:rPr lang="en-ID" sz="6000" b="1" cap="none" dirty="0" smtClean="0">
+                <a:solidFill>
+                  <a:srgbClr val="FFFF00"/>
+                </a:solidFill>
+                <a:effectLst/>
+                <a:latin typeface="Arial Black" panose="020B0A04020102020204" pitchFamily="34" charset="0"/>
+                <a:ea typeface="Calibri" panose="020F0502020204030204" pitchFamily="34" charset="0"/>
+                <a:cs typeface="Calibri" panose="020F0502020204030204" pitchFamily="34" charset="0"/>
+              </a:rPr>
+              <a:t> </a:t>
+            </a:r>
+            <a:r>
+              <a:rPr lang="en-ID" sz="6000" b="1" cap="none" dirty="0" err="1" smtClean="0">
+                <a:solidFill>
+                  <a:srgbClr val="FFFF00"/>
+                </a:solidFill>
+                <a:effectLst/>
+                <a:latin typeface="Arial Black" panose="020B0A04020102020204" pitchFamily="34" charset="0"/>
+                <a:ea typeface="Calibri" panose="020F0502020204030204" pitchFamily="34" charset="0"/>
+                <a:cs typeface="Calibri" panose="020F0502020204030204" pitchFamily="34" charset="0"/>
+              </a:rPr>
+              <a:t>engkau</a:t>
+            </a:r>
+            <a:endParaRPr lang="en-ID" sz="6000" b="1" cap="none" dirty="0" smtClean="0">
+              <a:solidFill>
+                <a:srgbClr val="FFFF00"/>
+              </a:solidFill>
+              <a:effectLst/>
+              <a:latin typeface="Arial Black" panose="020B0A04020102020204" pitchFamily="34" charset="0"/>
+              <a:ea typeface="Calibri" panose="020F0502020204030204" pitchFamily="34" charset="0"/>
+              <a:cs typeface="Calibri" panose="020F0502020204030204" pitchFamily="34" charset="0"/>
+            </a:endParaRPr>
+          </a:p>
+          <a:p>
+            <a:pPr marL="0" lvl="0" indent="0" algn="ctr">
+              <a:spcAft>
+                <a:spcPts val="800"/>
+              </a:spcAft>
+              <a:buNone/>
+              <a:tabLst>
+                <a:tab pos="540385" algn="l"/>
+              </a:tabLst>
+            </a:pPr>
+            <a:r>
+              <a:rPr lang="en-ID" sz="6000" b="1" cap="none" dirty="0" smtClean="0">
+                <a:solidFill>
+                  <a:srgbClr val="FFFF00"/>
+                </a:solidFill>
+                <a:effectLst/>
+                <a:latin typeface="Arial Black" panose="020B0A04020102020204" pitchFamily="34" charset="0"/>
+                <a:ea typeface="Calibri" panose="020F0502020204030204" pitchFamily="34" charset="0"/>
+                <a:cs typeface="Calibri" panose="020F0502020204030204" pitchFamily="34" charset="0"/>
+              </a:rPr>
+              <a:t> </a:t>
+            </a:r>
+            <a:r>
+              <a:rPr lang="en-ID" sz="6000" b="1" cap="none" dirty="0" err="1" smtClean="0">
+                <a:solidFill>
+                  <a:srgbClr val="FFFF00"/>
+                </a:solidFill>
+                <a:effectLst/>
+                <a:latin typeface="Arial Black" panose="020B0A04020102020204" pitchFamily="34" charset="0"/>
+                <a:ea typeface="Calibri" panose="020F0502020204030204" pitchFamily="34" charset="0"/>
+                <a:cs typeface="Calibri" panose="020F0502020204030204" pitchFamily="34" charset="0"/>
+              </a:rPr>
+              <a:t>sahabatKu</a:t>
+            </a:r>
+            <a:r>
+              <a:rPr lang="en-ID" sz="6000" b="1" cap="none" dirty="0" smtClean="0">
+                <a:solidFill>
+                  <a:srgbClr val="FFFF00"/>
+                </a:solidFill>
+                <a:effectLst/>
+                <a:latin typeface="Arial Black" panose="020B0A04020102020204" pitchFamily="34" charset="0"/>
+                <a:ea typeface="Calibri" panose="020F0502020204030204" pitchFamily="34" charset="0"/>
+                <a:cs typeface="Calibri" panose="020F0502020204030204" pitchFamily="34" charset="0"/>
+              </a:rPr>
+              <a:t>, </a:t>
+            </a:r>
+            <a:r>
+              <a:rPr lang="en-ID" sz="6000" b="1" cap="none" dirty="0" err="1" smtClean="0">
+                <a:solidFill>
+                  <a:srgbClr val="FFFF00"/>
+                </a:solidFill>
+                <a:effectLst/>
+                <a:latin typeface="Arial Black" panose="020B0A04020102020204" pitchFamily="34" charset="0"/>
+                <a:ea typeface="Calibri" panose="020F0502020204030204" pitchFamily="34" charset="0"/>
+                <a:cs typeface="Calibri" panose="020F0502020204030204" pitchFamily="34" charset="0"/>
+              </a:rPr>
+              <a:t>jikalau</a:t>
+            </a:r>
+            <a:r>
+              <a:rPr lang="en-ID" sz="6000" b="1" cap="none" dirty="0" smtClean="0">
+                <a:solidFill>
+                  <a:srgbClr val="FFFF00"/>
+                </a:solidFill>
+                <a:effectLst/>
+                <a:latin typeface="Arial Black" panose="020B0A04020102020204" pitchFamily="34" charset="0"/>
+                <a:ea typeface="Calibri" panose="020F0502020204030204" pitchFamily="34" charset="0"/>
+                <a:cs typeface="Calibri" panose="020F0502020204030204" pitchFamily="34" charset="0"/>
+              </a:rPr>
+              <a:t> </a:t>
+            </a:r>
+            <a:r>
+              <a:rPr lang="en-ID" sz="6000" b="1" cap="none" dirty="0" err="1" smtClean="0">
+                <a:solidFill>
+                  <a:srgbClr val="FFFF00"/>
+                </a:solidFill>
+                <a:effectLst/>
+                <a:latin typeface="Arial Black" panose="020B0A04020102020204" pitchFamily="34" charset="0"/>
+                <a:ea typeface="Calibri" panose="020F0502020204030204" pitchFamily="34" charset="0"/>
+                <a:cs typeface="Calibri" panose="020F0502020204030204" pitchFamily="34" charset="0"/>
+              </a:rPr>
+              <a:t>engkau</a:t>
+            </a:r>
+            <a:endParaRPr lang="en-ID" sz="6000" b="1" cap="none" dirty="0" smtClean="0">
+              <a:solidFill>
+                <a:srgbClr val="FFFF00"/>
+              </a:solidFill>
+              <a:effectLst/>
+              <a:latin typeface="Arial Black" panose="020B0A04020102020204" pitchFamily="34" charset="0"/>
+              <a:ea typeface="Calibri" panose="020F0502020204030204" pitchFamily="34" charset="0"/>
+              <a:cs typeface="Calibri" panose="020F0502020204030204" pitchFamily="34" charset="0"/>
+            </a:endParaRPr>
+          </a:p>
+          <a:p>
+            <a:pPr marL="0" lvl="0" indent="0" algn="ctr">
+              <a:spcAft>
+                <a:spcPts val="800"/>
+              </a:spcAft>
+              <a:buNone/>
+              <a:tabLst>
+                <a:tab pos="540385" algn="l"/>
+              </a:tabLst>
+            </a:pPr>
+            <a:r>
+              <a:rPr lang="en-ID" sz="6000" b="1" cap="none" dirty="0" smtClean="0">
+                <a:solidFill>
+                  <a:srgbClr val="FFFF00"/>
+                </a:solidFill>
+                <a:effectLst/>
+                <a:latin typeface="Arial Black" panose="020B0A04020102020204" pitchFamily="34" charset="0"/>
+                <a:ea typeface="Calibri" panose="020F0502020204030204" pitchFamily="34" charset="0"/>
+                <a:cs typeface="Calibri" panose="020F0502020204030204" pitchFamily="34" charset="0"/>
+              </a:rPr>
+              <a:t> </a:t>
+            </a:r>
+            <a:r>
+              <a:rPr lang="en-ID" sz="6000" b="1" cap="none" dirty="0" err="1" smtClean="0">
+                <a:solidFill>
+                  <a:srgbClr val="FFFF00"/>
+                </a:solidFill>
+                <a:effectLst/>
+                <a:latin typeface="Arial Black" panose="020B0A04020102020204" pitchFamily="34" charset="0"/>
+                <a:ea typeface="Calibri" panose="020F0502020204030204" pitchFamily="34" charset="0"/>
+                <a:cs typeface="Calibri" panose="020F0502020204030204" pitchFamily="34" charset="0"/>
+              </a:rPr>
+              <a:t>menaati</a:t>
+            </a:r>
+            <a:r>
+              <a:rPr lang="en-ID" sz="6000" b="1" cap="none" dirty="0" smtClean="0">
+                <a:solidFill>
+                  <a:srgbClr val="FFFF00"/>
+                </a:solidFill>
+                <a:effectLst/>
+                <a:latin typeface="Arial Black" panose="020B0A04020102020204" pitchFamily="34" charset="0"/>
+                <a:ea typeface="Calibri" panose="020F0502020204030204" pitchFamily="34" charset="0"/>
+                <a:cs typeface="Calibri" panose="020F0502020204030204" pitchFamily="34" charset="0"/>
+              </a:rPr>
+              <a:t> </a:t>
+            </a:r>
+            <a:r>
+              <a:rPr lang="en-ID" sz="6000" b="1" cap="none" dirty="0" err="1" smtClean="0">
+                <a:solidFill>
+                  <a:srgbClr val="FFFF00"/>
+                </a:solidFill>
+                <a:effectLst/>
+                <a:latin typeface="Arial Black" panose="020B0A04020102020204" pitchFamily="34" charset="0"/>
+                <a:ea typeface="Calibri" panose="020F0502020204030204" pitchFamily="34" charset="0"/>
+                <a:cs typeface="Calibri" panose="020F0502020204030204" pitchFamily="34" charset="0"/>
+              </a:rPr>
+              <a:t>perintahKu</a:t>
+            </a:r>
+            <a:r>
+              <a:rPr lang="en-ID" sz="6000" b="1" cap="none" dirty="0" smtClean="0">
+                <a:solidFill>
+                  <a:srgbClr val="FFFF00"/>
+                </a:solidFill>
+                <a:effectLst/>
+                <a:latin typeface="Arial Black" panose="020B0A04020102020204" pitchFamily="34" charset="0"/>
+                <a:ea typeface="Calibri" panose="020F0502020204030204" pitchFamily="34" charset="0"/>
+                <a:cs typeface="Calibri" panose="020F0502020204030204" pitchFamily="34" charset="0"/>
+              </a:rPr>
+              <a:t>. </a:t>
+            </a:r>
+            <a:endParaRPr lang="en-ID" sz="6000" cap="none" dirty="0">
+              <a:solidFill>
+                <a:srgbClr val="FFFF00"/>
+              </a:solidFill>
+              <a:effectLst/>
+              <a:latin typeface="Arial Black" panose="020B0A04020102020204" pitchFamily="34" charset="0"/>
+              <a:ea typeface="Calibri" panose="020F0502020204030204" pitchFamily="34" charset="0"/>
+              <a:cs typeface="Times New Roman" panose="02020603050405020304" pitchFamily="18" charset="0"/>
+            </a:endParaRPr>
+          </a:p>
+        </p:txBody>
+      </p:sp>
+    </p:spTree>
+    <p:extLst>
+      <p:ext uri="{BB962C8B-B14F-4D97-AF65-F5344CB8AC3E}">
+        <p14:creationId xmlns:p14="http://schemas.microsoft.com/office/powerpoint/2010/main" val="2980192846"/>
+      </p:ext>
+    </p:extLst>
+  </p:cSld>
+  <p:clrMapOvr>
+    <a:masterClrMapping/>
+  </p:clrMapOvr>
+  <p:timing>
+    <p:tnLst>
+      <p:par>
+        <p:cTn id="1" dur="indefinite" restart="never" nodeType="tmRoot"/>
+      </p:par>
+    </p:tnLst>
+  </p:timing>
+</p:sld>
+</file>
+
+<file path=ppt/slides/slide46.xml><?xml version="1.0" encoding="utf-8"?>
+<p:sld xmlns:a="http://schemas.openxmlformats.org/drawingml/2006/main" xmlns:r="http://schemas.openxmlformats.org/officeDocument/2006/relationships" xmlns:p="http://schemas.openxmlformats.org/presentationml/2006/main">
+  <p:cSld>
+    <p:spTree>
+      <p:nvGrpSpPr>
+        <p:cNvPr id="1" name=""/>
+        <p:cNvGrpSpPr/>
+        <p:nvPr/>
+      </p:nvGrpSpPr>
+      <p:grpSpPr>
+        <a:xfrm>
+          <a:off x="0" y="0"/>
+          <a:ext cx="0" cy="0"/>
+          <a:chOff x="0" y="0"/>
+          <a:chExt cx="0" cy="0"/>
+        </a:xfrm>
+      </p:grpSpPr>
+      <p:sp>
+        <p:nvSpPr>
+          <p:cNvPr id="3" name="Content Placeholder 2"/>
+          <p:cNvSpPr>
+            <a:spLocks noGrp="1"/>
+          </p:cNvSpPr>
+          <p:nvPr>
+            <p:ph idx="1"/>
+          </p:nvPr>
+        </p:nvSpPr>
+        <p:spPr>
+          <a:xfrm>
+            <a:off x="238537" y="1498484"/>
+            <a:ext cx="11714923" cy="4195481"/>
+          </a:xfrm>
+        </p:spPr>
+        <p:txBody>
+          <a:bodyPr>
+            <a:noAutofit/>
+          </a:bodyPr>
+          <a:lstStyle/>
+          <a:p>
+            <a:pPr marL="0" lvl="0" indent="0" algn="ctr">
+              <a:spcAft>
+                <a:spcPts val="800"/>
+              </a:spcAft>
+              <a:buNone/>
+              <a:tabLst>
+                <a:tab pos="540385" algn="l"/>
+              </a:tabLst>
+            </a:pPr>
+            <a:r>
+              <a:rPr lang="en-ID" sz="6000" b="1" cap="none" dirty="0" err="1" smtClean="0">
+                <a:solidFill>
+                  <a:srgbClr val="FFFF00"/>
+                </a:solidFill>
+                <a:effectLst/>
+                <a:latin typeface="Arial Black" panose="020B0A04020102020204" pitchFamily="34" charset="0"/>
+                <a:ea typeface="Calibri" panose="020F0502020204030204" pitchFamily="34" charset="0"/>
+                <a:cs typeface="Calibri" panose="020F0502020204030204" pitchFamily="34" charset="0"/>
+              </a:rPr>
               <a:t>Pergilah</a:t>
             </a:r>
             <a:r>
@@ -15082,6 +15612,13 @@
   <p:clrMapOvr>
     <a:masterClrMapping/>
   </p:clrMapOvr>
+  <p:timing>
+    <p:tnLst>
+      <p:par>
+        <p:cTn id="1" dur="indefinite" restart="never" nodeType="tmRoot"/>
+      </p:par>
+    </p:tnLst>
+  </p:timing>
 </p:sld>
 </file>
 
@@ -15961,6 +16498,13 @@
   <p:clrMapOvr>
     <a:masterClrMapping/>
   </p:clrMapOvr>
+  <p:timing>
+    <p:tnLst>
+      <p:par>
+        <p:cTn id="1" dur="indefinite" restart="never" nodeType="tmRoot"/>
+      </p:par>
+    </p:tnLst>
+  </p:timing>
 </p:sld>
 </file>
 
@@ -16791,6 +17335,13 @@
   <p:clrMapOvr>
     <a:masterClrMapping/>
   </p:clrMapOvr>
+  <p:timing>
+    <p:tnLst>
+      <p:par>
+        <p:cTn id="1" dur="indefinite" restart="never" nodeType="tmRoot"/>
+      </p:par>
+    </p:tnLst>
+  </p:timing>
 </p:sld>
 </file>
 

</xml_diff>